<commit_message>
Removed 3rd year content
</commit_message>
<xml_diff>
--- a/GAM130/01/Expo announcement Deck REVISED.pptx
+++ b/GAM130/01/Expo announcement Deck REVISED.pptx
@@ -12,12 +12,11 @@
     <p:sldId id="258" r:id="rId9"/>
     <p:sldId id="259" r:id="rId10"/>
     <p:sldId id="262" r:id="rId11"/>
-    <p:sldId id="313" r:id="rId12"/>
-    <p:sldId id="314" r:id="rId13"/>
-    <p:sldId id="315" r:id="rId14"/>
-    <p:sldId id="261" r:id="rId15"/>
-    <p:sldId id="310" r:id="rId16"/>
-    <p:sldId id="263" r:id="rId17"/>
+    <p:sldId id="314" r:id="rId12"/>
+    <p:sldId id="315" r:id="rId13"/>
+    <p:sldId id="261" r:id="rId14"/>
+    <p:sldId id="310" r:id="rId15"/>
+    <p:sldId id="263" r:id="rId16"/>
   </p:sldIdLst>
   <p:sldSz cx="12192000" cy="6858000"/>
   <p:notesSz cx="6858000" cy="9144000"/>
@@ -2618,788 +2617,6 @@
 </file>
 
 <file path=ppt/diagrams/colors4.xml><?xml version="1.0" encoding="utf-8"?>
-<dgm:colorsDef xmlns:dgm="http://schemas.openxmlformats.org/drawingml/2006/diagram" xmlns:a="http://schemas.openxmlformats.org/drawingml/2006/main" uniqueId="urn:microsoft.com/office/officeart/2005/8/colors/colorful2">
-  <dgm:title val=""/>
-  <dgm:desc val=""/>
-  <dgm:catLst>
-    <dgm:cat type="colorful" pri="10200"/>
-  </dgm:catLst>
-  <dgm:styleLbl name="node0">
-    <dgm:fillClrLst meth="repeat">
-      <a:schemeClr val="accent1"/>
-    </dgm:fillClrLst>
-    <dgm:linClrLst meth="repeat">
-      <a:schemeClr val="lt1"/>
-    </dgm:linClrLst>
-    <dgm:effectClrLst/>
-    <dgm:txLinClrLst/>
-    <dgm:txFillClrLst/>
-    <dgm:txEffectClrLst/>
-  </dgm:styleLbl>
-  <dgm:styleLbl name="node1">
-    <dgm:fillClrLst>
-      <a:schemeClr val="accent2"/>
-      <a:schemeClr val="accent3"/>
-    </dgm:fillClrLst>
-    <dgm:linClrLst meth="repeat">
-      <a:schemeClr val="lt1"/>
-    </dgm:linClrLst>
-    <dgm:effectClrLst/>
-    <dgm:txLinClrLst/>
-    <dgm:txFillClrLst/>
-    <dgm:txEffectClrLst/>
-  </dgm:styleLbl>
-  <dgm:styleLbl name="alignNode1">
-    <dgm:fillClrLst>
-      <a:schemeClr val="accent2"/>
-      <a:schemeClr val="accent3"/>
-    </dgm:fillClrLst>
-    <dgm:linClrLst>
-      <a:schemeClr val="accent2"/>
-      <a:schemeClr val="accent3"/>
-    </dgm:linClrLst>
-    <dgm:effectClrLst/>
-    <dgm:txLinClrLst/>
-    <dgm:txFillClrLst/>
-    <dgm:txEffectClrLst/>
-  </dgm:styleLbl>
-  <dgm:styleLbl name="lnNode1">
-    <dgm:fillClrLst>
-      <a:schemeClr val="accent2"/>
-      <a:schemeClr val="accent3"/>
-    </dgm:fillClrLst>
-    <dgm:linClrLst meth="repeat">
-      <a:schemeClr val="lt1"/>
-    </dgm:linClrLst>
-    <dgm:effectClrLst/>
-    <dgm:txLinClrLst/>
-    <dgm:txFillClrLst/>
-    <dgm:txEffectClrLst/>
-  </dgm:styleLbl>
-  <dgm:styleLbl name="vennNode1">
-    <dgm:fillClrLst>
-      <a:schemeClr val="accent2">
-        <a:alpha val="50000"/>
-      </a:schemeClr>
-      <a:schemeClr val="accent3">
-        <a:alpha val="50000"/>
-      </a:schemeClr>
-    </dgm:fillClrLst>
-    <dgm:linClrLst meth="repeat">
-      <a:schemeClr val="lt1"/>
-    </dgm:linClrLst>
-    <dgm:effectClrLst/>
-    <dgm:txLinClrLst/>
-    <dgm:txFillClrLst/>
-    <dgm:txEffectClrLst/>
-  </dgm:styleLbl>
-  <dgm:styleLbl name="node2">
-    <dgm:fillClrLst>
-      <a:schemeClr val="accent3"/>
-    </dgm:fillClrLst>
-    <dgm:linClrLst meth="repeat">
-      <a:schemeClr val="lt1"/>
-    </dgm:linClrLst>
-    <dgm:effectClrLst/>
-    <dgm:txLinClrLst/>
-    <dgm:txFillClrLst/>
-    <dgm:txEffectClrLst/>
-  </dgm:styleLbl>
-  <dgm:styleLbl name="node3">
-    <dgm:fillClrLst>
-      <a:schemeClr val="accent4"/>
-    </dgm:fillClrLst>
-    <dgm:linClrLst meth="repeat">
-      <a:schemeClr val="lt1"/>
-    </dgm:linClrLst>
-    <dgm:effectClrLst/>
-    <dgm:txLinClrLst/>
-    <dgm:txFillClrLst/>
-    <dgm:txEffectClrLst/>
-  </dgm:styleLbl>
-  <dgm:styleLbl name="node4">
-    <dgm:fillClrLst>
-      <a:schemeClr val="accent5"/>
-    </dgm:fillClrLst>
-    <dgm:linClrLst meth="repeat">
-      <a:schemeClr val="lt1"/>
-    </dgm:linClrLst>
-    <dgm:effectClrLst/>
-    <dgm:txLinClrLst/>
-    <dgm:txFillClrLst/>
-    <dgm:txEffectClrLst/>
-  </dgm:styleLbl>
-  <dgm:styleLbl name="fgImgPlace1">
-    <dgm:fillClrLst>
-      <a:schemeClr val="accent2">
-        <a:tint val="50000"/>
-      </a:schemeClr>
-      <a:schemeClr val="accent3">
-        <a:tint val="50000"/>
-      </a:schemeClr>
-    </dgm:fillClrLst>
-    <dgm:linClrLst meth="repeat">
-      <a:schemeClr val="lt1"/>
-    </dgm:linClrLst>
-    <dgm:effectClrLst/>
-    <dgm:txLinClrLst/>
-    <dgm:txFillClrLst meth="repeat">
-      <a:schemeClr val="lt1"/>
-    </dgm:txFillClrLst>
-    <dgm:txEffectClrLst/>
-  </dgm:styleLbl>
-  <dgm:styleLbl name="alignImgPlace1">
-    <dgm:fillClrLst>
-      <a:schemeClr val="accent2">
-        <a:tint val="50000"/>
-      </a:schemeClr>
-      <a:schemeClr val="accent3">
-        <a:tint val="20000"/>
-      </a:schemeClr>
-    </dgm:fillClrLst>
-    <dgm:linClrLst meth="repeat">
-      <a:schemeClr val="lt1"/>
-    </dgm:linClrLst>
-    <dgm:effectClrLst/>
-    <dgm:txLinClrLst/>
-    <dgm:txFillClrLst meth="repeat">
-      <a:schemeClr val="lt1"/>
-    </dgm:txFillClrLst>
-    <dgm:txEffectClrLst/>
-  </dgm:styleLbl>
-  <dgm:styleLbl name="bgImgPlace1">
-    <dgm:fillClrLst>
-      <a:schemeClr val="accent2">
-        <a:tint val="50000"/>
-      </a:schemeClr>
-      <a:schemeClr val="accent3">
-        <a:tint val="20000"/>
-      </a:schemeClr>
-    </dgm:fillClrLst>
-    <dgm:linClrLst meth="repeat">
-      <a:schemeClr val="lt1"/>
-    </dgm:linClrLst>
-    <dgm:effectClrLst/>
-    <dgm:txLinClrLst/>
-    <dgm:txFillClrLst meth="repeat">
-      <a:schemeClr val="lt1"/>
-    </dgm:txFillClrLst>
-    <dgm:txEffectClrLst/>
-  </dgm:styleLbl>
-  <dgm:styleLbl name="sibTrans2D1">
-    <dgm:fillClrLst>
-      <a:schemeClr val="accent2"/>
-      <a:schemeClr val="accent3"/>
-    </dgm:fillClrLst>
-    <dgm:linClrLst meth="repeat">
-      <a:schemeClr val="lt1"/>
-    </dgm:linClrLst>
-    <dgm:effectClrLst/>
-    <dgm:txLinClrLst/>
-    <dgm:txFillClrLst/>
-    <dgm:txEffectClrLst/>
-  </dgm:styleLbl>
-  <dgm:styleLbl name="fgSibTrans2D1">
-    <dgm:fillClrLst>
-      <a:schemeClr val="accent2"/>
-      <a:schemeClr val="accent3"/>
-    </dgm:fillClrLst>
-    <dgm:linClrLst meth="repeat">
-      <a:schemeClr val="lt1"/>
-    </dgm:linClrLst>
-    <dgm:effectClrLst/>
-    <dgm:txLinClrLst/>
-    <dgm:txFillClrLst meth="repeat">
-      <a:schemeClr val="lt1"/>
-    </dgm:txFillClrLst>
-    <dgm:txEffectClrLst/>
-  </dgm:styleLbl>
-  <dgm:styleLbl name="bgSibTrans2D1">
-    <dgm:fillClrLst>
-      <a:schemeClr val="accent2"/>
-      <a:schemeClr val="accent3"/>
-    </dgm:fillClrLst>
-    <dgm:linClrLst meth="repeat">
-      <a:schemeClr val="lt1"/>
-    </dgm:linClrLst>
-    <dgm:effectClrLst/>
-    <dgm:txLinClrLst/>
-    <dgm:txFillClrLst meth="repeat">
-      <a:schemeClr val="lt1"/>
-    </dgm:txFillClrLst>
-    <dgm:txEffectClrLst/>
-  </dgm:styleLbl>
-  <dgm:styleLbl name="sibTrans1D1">
-    <dgm:fillClrLst/>
-    <dgm:linClrLst>
-      <a:schemeClr val="accent2"/>
-      <a:schemeClr val="accent3"/>
-    </dgm:linClrLst>
-    <dgm:effectClrLst/>
-    <dgm:txLinClrLst/>
-    <dgm:txFillClrLst meth="repeat">
-      <a:schemeClr val="tx1"/>
-    </dgm:txFillClrLst>
-    <dgm:txEffectClrLst/>
-  </dgm:styleLbl>
-  <dgm:styleLbl name="callout">
-    <dgm:fillClrLst meth="repeat">
-      <a:schemeClr val="accent2"/>
-    </dgm:fillClrLst>
-    <dgm:linClrLst meth="repeat">
-      <a:schemeClr val="accent2">
-        <a:tint val="50000"/>
-      </a:schemeClr>
-    </dgm:linClrLst>
-    <dgm:effectClrLst/>
-    <dgm:txLinClrLst/>
-    <dgm:txFillClrLst meth="repeat">
-      <a:schemeClr val="tx1"/>
-    </dgm:txFillClrLst>
-    <dgm:txEffectClrLst/>
-  </dgm:styleLbl>
-  <dgm:styleLbl name="asst0">
-    <dgm:fillClrLst meth="repeat">
-      <a:schemeClr val="accent2"/>
-    </dgm:fillClrLst>
-    <dgm:linClrLst meth="repeat">
-      <a:schemeClr val="lt1">
-        <a:shade val="80000"/>
-      </a:schemeClr>
-    </dgm:linClrLst>
-    <dgm:effectClrLst/>
-    <dgm:txLinClrLst/>
-    <dgm:txFillClrLst/>
-    <dgm:txEffectClrLst/>
-  </dgm:styleLbl>
-  <dgm:styleLbl name="asst1">
-    <dgm:fillClrLst meth="repeat">
-      <a:schemeClr val="accent3"/>
-    </dgm:fillClrLst>
-    <dgm:linClrLst meth="repeat">
-      <a:schemeClr val="lt1">
-        <a:shade val="80000"/>
-      </a:schemeClr>
-    </dgm:linClrLst>
-    <dgm:effectClrLst/>
-    <dgm:txLinClrLst/>
-    <dgm:txFillClrLst/>
-    <dgm:txEffectClrLst/>
-  </dgm:styleLbl>
-  <dgm:styleLbl name="asst2">
-    <dgm:fillClrLst>
-      <a:schemeClr val="accent4"/>
-    </dgm:fillClrLst>
-    <dgm:linClrLst meth="repeat">
-      <a:schemeClr val="lt1"/>
-    </dgm:linClrLst>
-    <dgm:effectClrLst/>
-    <dgm:txLinClrLst/>
-    <dgm:txFillClrLst/>
-    <dgm:txEffectClrLst/>
-  </dgm:styleLbl>
-  <dgm:styleLbl name="asst3">
-    <dgm:fillClrLst>
-      <a:schemeClr val="accent5"/>
-    </dgm:fillClrLst>
-    <dgm:linClrLst meth="repeat">
-      <a:schemeClr val="lt1"/>
-    </dgm:linClrLst>
-    <dgm:effectClrLst/>
-    <dgm:txLinClrLst/>
-    <dgm:txFillClrLst/>
-    <dgm:txEffectClrLst/>
-  </dgm:styleLbl>
-  <dgm:styleLbl name="asst4">
-    <dgm:fillClrLst>
-      <a:schemeClr val="accent6"/>
-    </dgm:fillClrLst>
-    <dgm:linClrLst meth="repeat">
-      <a:schemeClr val="lt1"/>
-    </dgm:linClrLst>
-    <dgm:effectClrLst/>
-    <dgm:txLinClrLst/>
-    <dgm:txFillClrLst/>
-    <dgm:txEffectClrLst/>
-  </dgm:styleLbl>
-  <dgm:styleLbl name="parChTrans2D1">
-    <dgm:fillClrLst meth="repeat">
-      <a:schemeClr val="accent2"/>
-    </dgm:fillClrLst>
-    <dgm:linClrLst meth="repeat">
-      <a:schemeClr val="lt1"/>
-    </dgm:linClrLst>
-    <dgm:effectClrLst/>
-    <dgm:txLinClrLst/>
-    <dgm:txFillClrLst meth="repeat">
-      <a:schemeClr val="lt1"/>
-    </dgm:txFillClrLst>
-    <dgm:txEffectClrLst/>
-  </dgm:styleLbl>
-  <dgm:styleLbl name="parChTrans2D2">
-    <dgm:fillClrLst meth="repeat">
-      <a:schemeClr val="accent3"/>
-    </dgm:fillClrLst>
-    <dgm:linClrLst meth="repeat">
-      <a:schemeClr val="lt1"/>
-    </dgm:linClrLst>
-    <dgm:effectClrLst/>
-    <dgm:txLinClrLst/>
-    <dgm:txFillClrLst/>
-    <dgm:txEffectClrLst/>
-  </dgm:styleLbl>
-  <dgm:styleLbl name="parChTrans2D3">
-    <dgm:fillClrLst meth="repeat">
-      <a:schemeClr val="accent4"/>
-    </dgm:fillClrLst>
-    <dgm:linClrLst meth="repeat">
-      <a:schemeClr val="lt1"/>
-    </dgm:linClrLst>
-    <dgm:effectClrLst/>
-    <dgm:txLinClrLst/>
-    <dgm:txFillClrLst/>
-    <dgm:txEffectClrLst/>
-  </dgm:styleLbl>
-  <dgm:styleLbl name="parChTrans2D4">
-    <dgm:fillClrLst meth="repeat">
-      <a:schemeClr val="accent5"/>
-    </dgm:fillClrLst>
-    <dgm:linClrLst meth="repeat">
-      <a:schemeClr val="lt1"/>
-    </dgm:linClrLst>
-    <dgm:effectClrLst/>
-    <dgm:txLinClrLst/>
-    <dgm:txFillClrLst meth="repeat">
-      <a:schemeClr val="lt1"/>
-    </dgm:txFillClrLst>
-    <dgm:txEffectClrLst/>
-  </dgm:styleLbl>
-  <dgm:styleLbl name="parChTrans1D1">
-    <dgm:fillClrLst meth="repeat">
-      <a:schemeClr val="accent2"/>
-    </dgm:fillClrLst>
-    <dgm:linClrLst meth="repeat">
-      <a:schemeClr val="accent2"/>
-    </dgm:linClrLst>
-    <dgm:effectClrLst/>
-    <dgm:txLinClrLst/>
-    <dgm:txFillClrLst meth="repeat">
-      <a:schemeClr val="tx1"/>
-    </dgm:txFillClrLst>
-    <dgm:txEffectClrLst/>
-  </dgm:styleLbl>
-  <dgm:styleLbl name="parChTrans1D2">
-    <dgm:fillClrLst meth="repeat">
-      <a:schemeClr val="accent2">
-        <a:tint val="90000"/>
-      </a:schemeClr>
-    </dgm:fillClrLst>
-    <dgm:linClrLst meth="repeat">
-      <a:schemeClr val="accent3"/>
-    </dgm:linClrLst>
-    <dgm:effectClrLst/>
-    <dgm:txLinClrLst/>
-    <dgm:txFillClrLst meth="repeat">
-      <a:schemeClr val="tx1"/>
-    </dgm:txFillClrLst>
-    <dgm:txEffectClrLst/>
-  </dgm:styleLbl>
-  <dgm:styleLbl name="parChTrans1D3">
-    <dgm:fillClrLst meth="repeat">
-      <a:schemeClr val="accent2">
-        <a:tint val="70000"/>
-      </a:schemeClr>
-    </dgm:fillClrLst>
-    <dgm:linClrLst meth="repeat">
-      <a:schemeClr val="accent4"/>
-    </dgm:linClrLst>
-    <dgm:effectClrLst/>
-    <dgm:txLinClrLst/>
-    <dgm:txFillClrLst meth="repeat">
-      <a:schemeClr val="tx1"/>
-    </dgm:txFillClrLst>
-    <dgm:txEffectClrLst/>
-  </dgm:styleLbl>
-  <dgm:styleLbl name="parChTrans1D4">
-    <dgm:fillClrLst meth="repeat">
-      <a:schemeClr val="accent2">
-        <a:tint val="50000"/>
-      </a:schemeClr>
-    </dgm:fillClrLst>
-    <dgm:linClrLst meth="repeat">
-      <a:schemeClr val="accent5"/>
-    </dgm:linClrLst>
-    <dgm:effectClrLst/>
-    <dgm:txLinClrLst/>
-    <dgm:txFillClrLst meth="repeat">
-      <a:schemeClr val="tx1"/>
-    </dgm:txFillClrLst>
-    <dgm:txEffectClrLst/>
-  </dgm:styleLbl>
-  <dgm:styleLbl name="fgAcc1">
-    <dgm:fillClrLst meth="repeat">
-      <a:schemeClr val="lt1">
-        <a:alpha val="90000"/>
-      </a:schemeClr>
-    </dgm:fillClrLst>
-    <dgm:linClrLst>
-      <a:schemeClr val="accent2"/>
-      <a:schemeClr val="accent3"/>
-    </dgm:linClrLst>
-    <dgm:effectClrLst/>
-    <dgm:txLinClrLst/>
-    <dgm:txFillClrLst meth="repeat">
-      <a:schemeClr val="dk1"/>
-    </dgm:txFillClrLst>
-    <dgm:txEffectClrLst/>
-  </dgm:styleLbl>
-  <dgm:styleLbl name="conFgAcc1">
-    <dgm:fillClrLst meth="repeat">
-      <a:schemeClr val="lt1">
-        <a:alpha val="90000"/>
-      </a:schemeClr>
-    </dgm:fillClrLst>
-    <dgm:linClrLst>
-      <a:schemeClr val="accent2"/>
-      <a:schemeClr val="accent3"/>
-    </dgm:linClrLst>
-    <dgm:effectClrLst/>
-    <dgm:txLinClrLst/>
-    <dgm:txFillClrLst meth="repeat">
-      <a:schemeClr val="dk1"/>
-    </dgm:txFillClrLst>
-    <dgm:txEffectClrLst/>
-  </dgm:styleLbl>
-  <dgm:styleLbl name="alignAcc1">
-    <dgm:fillClrLst meth="repeat">
-      <a:schemeClr val="lt1">
-        <a:alpha val="90000"/>
-      </a:schemeClr>
-    </dgm:fillClrLst>
-    <dgm:linClrLst>
-      <a:schemeClr val="accent2"/>
-      <a:schemeClr val="accent3"/>
-    </dgm:linClrLst>
-    <dgm:effectClrLst/>
-    <dgm:txLinClrLst/>
-    <dgm:txFillClrLst meth="repeat">
-      <a:schemeClr val="dk1"/>
-    </dgm:txFillClrLst>
-    <dgm:txEffectClrLst/>
-  </dgm:styleLbl>
-  <dgm:styleLbl name="trAlignAcc1">
-    <dgm:fillClrLst meth="repeat">
-      <a:schemeClr val="lt1">
-        <a:alpha val="40000"/>
-      </a:schemeClr>
-    </dgm:fillClrLst>
-    <dgm:linClrLst meth="repeat">
-      <a:schemeClr val="accent2"/>
-    </dgm:linClrLst>
-    <dgm:effectClrLst/>
-    <dgm:txLinClrLst/>
-    <dgm:txFillClrLst meth="repeat">
-      <a:schemeClr val="dk1"/>
-    </dgm:txFillClrLst>
-    <dgm:txEffectClrLst/>
-  </dgm:styleLbl>
-  <dgm:styleLbl name="bgAcc1">
-    <dgm:fillClrLst meth="repeat">
-      <a:schemeClr val="lt1">
-        <a:alpha val="90000"/>
-      </a:schemeClr>
-    </dgm:fillClrLst>
-    <dgm:linClrLst>
-      <a:schemeClr val="accent2"/>
-      <a:schemeClr val="accent3"/>
-    </dgm:linClrLst>
-    <dgm:effectClrLst/>
-    <dgm:txLinClrLst/>
-    <dgm:txFillClrLst meth="repeat">
-      <a:schemeClr val="dk1"/>
-    </dgm:txFillClrLst>
-    <dgm:txEffectClrLst/>
-  </dgm:styleLbl>
-  <dgm:styleLbl name="solidFgAcc1">
-    <dgm:fillClrLst meth="repeat">
-      <a:schemeClr val="lt1"/>
-    </dgm:fillClrLst>
-    <dgm:linClrLst>
-      <a:schemeClr val="accent2"/>
-      <a:schemeClr val="accent3"/>
-    </dgm:linClrLst>
-    <dgm:effectClrLst/>
-    <dgm:txLinClrLst/>
-    <dgm:txFillClrLst meth="repeat">
-      <a:schemeClr val="dk1"/>
-    </dgm:txFillClrLst>
-    <dgm:txEffectClrLst/>
-  </dgm:styleLbl>
-  <dgm:styleLbl name="solidAlignAcc1">
-    <dgm:fillClrLst meth="repeat">
-      <a:schemeClr val="lt1"/>
-    </dgm:fillClrLst>
-    <dgm:linClrLst>
-      <a:schemeClr val="accent2"/>
-      <a:schemeClr val="accent3"/>
-    </dgm:linClrLst>
-    <dgm:effectClrLst/>
-    <dgm:txLinClrLst/>
-    <dgm:txFillClrLst meth="repeat">
-      <a:schemeClr val="dk1"/>
-    </dgm:txFillClrLst>
-    <dgm:txEffectClrLst/>
-  </dgm:styleLbl>
-  <dgm:styleLbl name="solidBgAcc1">
-    <dgm:fillClrLst meth="repeat">
-      <a:schemeClr val="lt1"/>
-    </dgm:fillClrLst>
-    <dgm:linClrLst>
-      <a:schemeClr val="accent2"/>
-      <a:schemeClr val="accent3"/>
-    </dgm:linClrLst>
-    <dgm:effectClrLst/>
-    <dgm:txLinClrLst/>
-    <dgm:txFillClrLst meth="repeat">
-      <a:schemeClr val="dk1"/>
-    </dgm:txFillClrLst>
-    <dgm:txEffectClrLst/>
-  </dgm:styleLbl>
-  <dgm:styleLbl name="fgAccFollowNode1">
-    <dgm:fillClrLst>
-      <a:schemeClr val="accent2">
-        <a:tint val="40000"/>
-        <a:alpha val="90000"/>
-      </a:schemeClr>
-      <a:schemeClr val="accent3">
-        <a:tint val="40000"/>
-        <a:alpha val="90000"/>
-      </a:schemeClr>
-    </dgm:fillClrLst>
-    <dgm:linClrLst>
-      <a:schemeClr val="accent2">
-        <a:tint val="40000"/>
-        <a:alpha val="90000"/>
-      </a:schemeClr>
-      <a:schemeClr val="accent3">
-        <a:tint val="40000"/>
-        <a:alpha val="90000"/>
-      </a:schemeClr>
-    </dgm:linClrLst>
-    <dgm:effectClrLst/>
-    <dgm:txLinClrLst/>
-    <dgm:txFillClrLst meth="repeat">
-      <a:schemeClr val="dk1"/>
-    </dgm:txFillClrLst>
-    <dgm:txEffectClrLst/>
-  </dgm:styleLbl>
-  <dgm:styleLbl name="alignAccFollowNode1">
-    <dgm:fillClrLst>
-      <a:schemeClr val="accent2">
-        <a:tint val="40000"/>
-        <a:alpha val="90000"/>
-      </a:schemeClr>
-      <a:schemeClr val="accent3">
-        <a:tint val="40000"/>
-        <a:alpha val="90000"/>
-      </a:schemeClr>
-    </dgm:fillClrLst>
-    <dgm:linClrLst>
-      <a:schemeClr val="accent2">
-        <a:tint val="40000"/>
-        <a:alpha val="90000"/>
-      </a:schemeClr>
-      <a:schemeClr val="accent3">
-        <a:tint val="40000"/>
-        <a:alpha val="90000"/>
-      </a:schemeClr>
-    </dgm:linClrLst>
-    <dgm:effectClrLst/>
-    <dgm:txLinClrLst/>
-    <dgm:txFillClrLst meth="repeat">
-      <a:schemeClr val="dk1"/>
-    </dgm:txFillClrLst>
-    <dgm:txEffectClrLst/>
-  </dgm:styleLbl>
-  <dgm:styleLbl name="bgAccFollowNode1">
-    <dgm:fillClrLst>
-      <a:schemeClr val="accent2">
-        <a:tint val="40000"/>
-        <a:alpha val="90000"/>
-      </a:schemeClr>
-      <a:schemeClr val="accent3">
-        <a:tint val="40000"/>
-        <a:alpha val="90000"/>
-      </a:schemeClr>
-    </dgm:fillClrLst>
-    <dgm:linClrLst>
-      <a:schemeClr val="accent2">
-        <a:tint val="40000"/>
-        <a:alpha val="90000"/>
-      </a:schemeClr>
-      <a:schemeClr val="accent3">
-        <a:tint val="40000"/>
-        <a:alpha val="90000"/>
-      </a:schemeClr>
-    </dgm:linClrLst>
-    <dgm:effectClrLst/>
-    <dgm:txLinClrLst/>
-    <dgm:txFillClrLst meth="repeat">
-      <a:schemeClr val="dk1"/>
-    </dgm:txFillClrLst>
-    <dgm:txEffectClrLst/>
-  </dgm:styleLbl>
-  <dgm:styleLbl name="fgAcc0">
-    <dgm:fillClrLst meth="repeat">
-      <a:schemeClr val="lt1">
-        <a:alpha val="90000"/>
-      </a:schemeClr>
-    </dgm:fillClrLst>
-    <dgm:linClrLst>
-      <a:schemeClr val="accent1"/>
-    </dgm:linClrLst>
-    <dgm:effectClrLst/>
-    <dgm:txLinClrLst/>
-    <dgm:txFillClrLst meth="repeat">
-      <a:schemeClr val="dk1"/>
-    </dgm:txFillClrLst>
-    <dgm:txEffectClrLst/>
-  </dgm:styleLbl>
-  <dgm:styleLbl name="fgAcc2">
-    <dgm:fillClrLst meth="repeat">
-      <a:schemeClr val="lt1">
-        <a:alpha val="90000"/>
-      </a:schemeClr>
-    </dgm:fillClrLst>
-    <dgm:linClrLst>
-      <a:schemeClr val="accent3"/>
-    </dgm:linClrLst>
-    <dgm:effectClrLst/>
-    <dgm:txLinClrLst/>
-    <dgm:txFillClrLst meth="repeat">
-      <a:schemeClr val="dk1"/>
-    </dgm:txFillClrLst>
-    <dgm:txEffectClrLst/>
-  </dgm:styleLbl>
-  <dgm:styleLbl name="fgAcc3">
-    <dgm:fillClrLst meth="repeat">
-      <a:schemeClr val="lt1">
-        <a:alpha val="90000"/>
-      </a:schemeClr>
-    </dgm:fillClrLst>
-    <dgm:linClrLst>
-      <a:schemeClr val="accent4"/>
-    </dgm:linClrLst>
-    <dgm:effectClrLst/>
-    <dgm:txLinClrLst/>
-    <dgm:txFillClrLst meth="repeat">
-      <a:schemeClr val="dk1"/>
-    </dgm:txFillClrLst>
-    <dgm:txEffectClrLst/>
-  </dgm:styleLbl>
-  <dgm:styleLbl name="fgAcc4">
-    <dgm:fillClrLst meth="repeat">
-      <a:schemeClr val="lt1">
-        <a:alpha val="90000"/>
-      </a:schemeClr>
-    </dgm:fillClrLst>
-    <dgm:linClrLst>
-      <a:schemeClr val="accent5"/>
-    </dgm:linClrLst>
-    <dgm:effectClrLst/>
-    <dgm:txLinClrLst/>
-    <dgm:txFillClrLst meth="repeat">
-      <a:schemeClr val="dk1"/>
-    </dgm:txFillClrLst>
-    <dgm:txEffectClrLst/>
-  </dgm:styleLbl>
-  <dgm:styleLbl name="bgShp">
-    <dgm:fillClrLst meth="repeat">
-      <a:schemeClr val="accent2">
-        <a:tint val="40000"/>
-      </a:schemeClr>
-    </dgm:fillClrLst>
-    <dgm:linClrLst meth="repeat">
-      <a:schemeClr val="dk1"/>
-    </dgm:linClrLst>
-    <dgm:effectClrLst/>
-    <dgm:txLinClrLst/>
-    <dgm:txFillClrLst meth="repeat">
-      <a:schemeClr val="dk1"/>
-    </dgm:txFillClrLst>
-    <dgm:txEffectClrLst/>
-  </dgm:styleLbl>
-  <dgm:styleLbl name="dkBgShp">
-    <dgm:fillClrLst meth="repeat">
-      <a:schemeClr val="accent2">
-        <a:shade val="90000"/>
-      </a:schemeClr>
-    </dgm:fillClrLst>
-    <dgm:linClrLst meth="repeat">
-      <a:schemeClr val="dk1"/>
-    </dgm:linClrLst>
-    <dgm:effectClrLst/>
-    <dgm:txLinClrLst/>
-    <dgm:txFillClrLst meth="repeat">
-      <a:schemeClr val="lt1"/>
-    </dgm:txFillClrLst>
-    <dgm:txEffectClrLst/>
-  </dgm:styleLbl>
-  <dgm:styleLbl name="trBgShp">
-    <dgm:fillClrLst meth="repeat">
-      <a:schemeClr val="accent2">
-        <a:tint val="50000"/>
-        <a:alpha val="40000"/>
-      </a:schemeClr>
-    </dgm:fillClrLst>
-    <dgm:linClrLst meth="repeat">
-      <a:schemeClr val="accent2"/>
-    </dgm:linClrLst>
-    <dgm:effectClrLst/>
-    <dgm:txLinClrLst/>
-    <dgm:txFillClrLst meth="repeat">
-      <a:schemeClr val="lt1"/>
-    </dgm:txFillClrLst>
-    <dgm:txEffectClrLst/>
-  </dgm:styleLbl>
-  <dgm:styleLbl name="fgShp">
-    <dgm:fillClrLst meth="repeat">
-      <a:schemeClr val="accent2">
-        <a:tint val="40000"/>
-      </a:schemeClr>
-    </dgm:fillClrLst>
-    <dgm:linClrLst meth="repeat">
-      <a:schemeClr val="lt1"/>
-    </dgm:linClrLst>
-    <dgm:effectClrLst/>
-    <dgm:txLinClrLst/>
-    <dgm:txFillClrLst meth="repeat">
-      <a:schemeClr val="dk1"/>
-    </dgm:txFillClrLst>
-    <dgm:txEffectClrLst/>
-  </dgm:styleLbl>
-  <dgm:styleLbl name="revTx">
-    <dgm:fillClrLst meth="repeat">
-      <a:schemeClr val="lt1">
-        <a:alpha val="0"/>
-      </a:schemeClr>
-    </dgm:fillClrLst>
-    <dgm:linClrLst meth="repeat">
-      <a:schemeClr val="dk1">
-        <a:alpha val="0"/>
-      </a:schemeClr>
-    </dgm:linClrLst>
-    <dgm:effectClrLst/>
-    <dgm:txLinClrLst/>
-    <dgm:txFillClrLst meth="repeat">
-      <a:schemeClr val="tx1"/>
-    </dgm:txFillClrLst>
-    <dgm:txEffectClrLst/>
-  </dgm:styleLbl>
-</dgm:colorsDef>
-</file>
-
-<file path=ppt/diagrams/colors5.xml><?xml version="1.0" encoding="utf-8"?>
 <dgm:colorsDef xmlns:dgm="http://schemas.openxmlformats.org/drawingml/2006/diagram" xmlns:a="http://schemas.openxmlformats.org/drawingml/2006/main" uniqueId="urn:microsoft.com/office/officeart/2005/8/colors/colorful1">
   <dgm:title val=""/>
   <dgm:desc val=""/>
@@ -4403,10 +3620,14 @@
             </a:lnSpc>
           </a:pPr>
           <a:r>
+            <a:rPr lang="en-GB" dirty="0"/>
+            <a:t>Teams will have a table, with one monitor and keyboard. Please chat to your supervisor if you need </a:t>
+          </a:r>
+          <a:r>
             <a:rPr lang="en-GB"/>
-            <a:t>Teams will have pods (like that of an indie game expo) which will host a playable build of their game.</a:t>
+            <a:t>additional support.</a:t>
           </a:r>
-          <a:endParaRPr lang="en-US"/>
+          <a:endParaRPr lang="en-US" dirty="0"/>
         </a:p>
       </dgm:t>
     </dgm:pt>
@@ -4889,327 +4110,6 @@
 <file path=ppt/diagrams/data2.xml><?xml version="1.0" encoding="utf-8"?>
 <dgm:dataModel xmlns:dgm="http://schemas.openxmlformats.org/drawingml/2006/diagram" xmlns:a="http://schemas.openxmlformats.org/drawingml/2006/main">
   <dgm:ptLst>
-    <dgm:pt modelId="{59E1E3AD-0172-452F-B82A-4E58920FF251}" type="doc">
-      <dgm:prSet loTypeId="urn:microsoft.com/office/officeart/2005/8/layout/vList2" loCatId="list" qsTypeId="urn:microsoft.com/office/officeart/2005/8/quickstyle/simple1" qsCatId="simple" csTypeId="urn:microsoft.com/office/officeart/2005/8/colors/colorful2" csCatId="colorful" phldr="1"/>
-      <dgm:spPr/>
-      <dgm:t>
-        <a:bodyPr/>
-        <a:lstStyle/>
-        <a:p>
-          <a:endParaRPr lang="en-US"/>
-        </a:p>
-      </dgm:t>
-    </dgm:pt>
-    <dgm:pt modelId="{B7983131-979F-411B-8A28-0AB6303BD615}">
-      <dgm:prSet/>
-      <dgm:spPr/>
-      <dgm:t>
-        <a:bodyPr/>
-        <a:lstStyle/>
-        <a:p>
-          <a:pPr>
-            <a:lnSpc>
-              <a:spcPct val="100000"/>
-            </a:lnSpc>
-          </a:pPr>
-          <a:r>
-            <a:rPr lang="en-GB"/>
-            <a:t>Individual stands that can be customised to better exhibit your work.</a:t>
-          </a:r>
-          <a:endParaRPr lang="en-US"/>
-        </a:p>
-      </dgm:t>
-    </dgm:pt>
-    <dgm:pt modelId="{8E76E9B1-F622-4ABD-BA01-84BB2640CF74}" type="parTrans" cxnId="{CC08ACDB-262B-4293-9FD6-CE44F2FEF239}">
-      <dgm:prSet/>
-      <dgm:spPr/>
-      <dgm:t>
-        <a:bodyPr/>
-        <a:lstStyle/>
-        <a:p>
-          <a:endParaRPr lang="en-US"/>
-        </a:p>
-      </dgm:t>
-    </dgm:pt>
-    <dgm:pt modelId="{7BBE687A-20D5-4109-A4DA-FF72F0056536}" type="sibTrans" cxnId="{CC08ACDB-262B-4293-9FD6-CE44F2FEF239}">
-      <dgm:prSet/>
-      <dgm:spPr/>
-      <dgm:t>
-        <a:bodyPr/>
-        <a:lstStyle/>
-        <a:p>
-          <a:endParaRPr lang="en-US"/>
-        </a:p>
-      </dgm:t>
-    </dgm:pt>
-    <dgm:pt modelId="{76DE8A5C-BFCF-4C92-BE68-CC13D6E1FC0F}">
-      <dgm:prSet/>
-      <dgm:spPr/>
-      <dgm:t>
-        <a:bodyPr/>
-        <a:lstStyle/>
-        <a:p>
-          <a:pPr>
-            <a:lnSpc>
-              <a:spcPct val="100000"/>
-            </a:lnSpc>
-          </a:pPr>
-          <a:r>
-            <a:rPr lang="en-GB"/>
-            <a:t>Budget allocated for each team to spend on marketing materials.</a:t>
-          </a:r>
-          <a:endParaRPr lang="en-US"/>
-        </a:p>
-      </dgm:t>
-    </dgm:pt>
-    <dgm:pt modelId="{90BCC469-9E0C-4946-8E86-BEBFCE0B2177}" type="parTrans" cxnId="{483C050F-4C6E-4A36-BFF0-ED712E447412}">
-      <dgm:prSet/>
-      <dgm:spPr/>
-      <dgm:t>
-        <a:bodyPr/>
-        <a:lstStyle/>
-        <a:p>
-          <a:endParaRPr lang="en-US"/>
-        </a:p>
-      </dgm:t>
-    </dgm:pt>
-    <dgm:pt modelId="{2CD3F6F9-06FD-4E07-AFE3-DC150B48D44E}" type="sibTrans" cxnId="{483C050F-4C6E-4A36-BFF0-ED712E447412}">
-      <dgm:prSet/>
-      <dgm:spPr/>
-      <dgm:t>
-        <a:bodyPr/>
-        <a:lstStyle/>
-        <a:p>
-          <a:endParaRPr lang="en-US"/>
-        </a:p>
-      </dgm:t>
-    </dgm:pt>
-    <dgm:pt modelId="{A752B6C4-28D6-4A1C-9D7F-56219E7041F3}">
-      <dgm:prSet/>
-      <dgm:spPr/>
-      <dgm:t>
-        <a:bodyPr/>
-        <a:lstStyle/>
-        <a:p>
-          <a:pPr>
-            <a:lnSpc>
-              <a:spcPct val="100000"/>
-            </a:lnSpc>
-          </a:pPr>
-          <a:r>
-            <a:rPr lang="en-GB"/>
-            <a:t>In week 6, your supervisor will begin talking to you about your plans. You are expected to research trade stands and submit ideas to your supervisor to check over before you apply for the budget. </a:t>
-          </a:r>
-          <a:endParaRPr lang="en-US"/>
-        </a:p>
-      </dgm:t>
-    </dgm:pt>
-    <dgm:pt modelId="{32058634-D4A3-4635-A8ED-28598E8EF9BF}" type="parTrans" cxnId="{EF7C4809-AC19-4E09-8B18-ECF1E14540A4}">
-      <dgm:prSet/>
-      <dgm:spPr/>
-      <dgm:t>
-        <a:bodyPr/>
-        <a:lstStyle/>
-        <a:p>
-          <a:endParaRPr lang="en-US"/>
-        </a:p>
-      </dgm:t>
-    </dgm:pt>
-    <dgm:pt modelId="{EC00572F-8897-4BA9-B24B-C342FA34FE62}" type="sibTrans" cxnId="{EF7C4809-AC19-4E09-8B18-ECF1E14540A4}">
-      <dgm:prSet/>
-      <dgm:spPr/>
-      <dgm:t>
-        <a:bodyPr/>
-        <a:lstStyle/>
-        <a:p>
-          <a:endParaRPr lang="en-US"/>
-        </a:p>
-      </dgm:t>
-    </dgm:pt>
-    <dgm:pt modelId="{0FF79521-E8C7-4CFC-A0A5-520989428B28}">
-      <dgm:prSet/>
-      <dgm:spPr/>
-      <dgm:t>
-        <a:bodyPr/>
-        <a:lstStyle/>
-        <a:p>
-          <a:pPr>
-            <a:lnSpc>
-              <a:spcPct val="100000"/>
-            </a:lnSpc>
-          </a:pPr>
-          <a:r>
-            <a:rPr lang="en-GB"/>
-            <a:t>Most importantly, staff and industry professionals will be judging your work in the mornings, so it is paramount that you test your game thoroughly and submit a fully functioning game on hand-in.</a:t>
-          </a:r>
-          <a:endParaRPr lang="en-US"/>
-        </a:p>
-      </dgm:t>
-    </dgm:pt>
-    <dgm:pt modelId="{1C2F386D-1085-4C04-98DE-F5D5CA3EC751}" type="parTrans" cxnId="{5A698B2C-BFE3-4082-81B0-E33E6ED55450}">
-      <dgm:prSet/>
-      <dgm:spPr/>
-      <dgm:t>
-        <a:bodyPr/>
-        <a:lstStyle/>
-        <a:p>
-          <a:endParaRPr lang="en-US"/>
-        </a:p>
-      </dgm:t>
-    </dgm:pt>
-    <dgm:pt modelId="{B0009E9E-9F91-40BC-8FC7-FE378905901D}" type="sibTrans" cxnId="{5A698B2C-BFE3-4082-81B0-E33E6ED55450}">
-      <dgm:prSet/>
-      <dgm:spPr/>
-      <dgm:t>
-        <a:bodyPr/>
-        <a:lstStyle/>
-        <a:p>
-          <a:endParaRPr lang="en-US"/>
-        </a:p>
-      </dgm:t>
-    </dgm:pt>
-    <dgm:pt modelId="{EF1F8182-1488-4A23-9AED-B7CEB87FFA8E}">
-      <dgm:prSet/>
-      <dgm:spPr/>
-      <dgm:t>
-        <a:bodyPr/>
-        <a:lstStyle/>
-        <a:p>
-          <a:pPr>
-            <a:lnSpc>
-              <a:spcPct val="100000"/>
-            </a:lnSpc>
-          </a:pPr>
-          <a:r>
-            <a:rPr lang="en-GB"/>
-            <a:t>No amount of fancy marketing can save a game that does not play!</a:t>
-          </a:r>
-          <a:endParaRPr lang="en-US"/>
-        </a:p>
-      </dgm:t>
-    </dgm:pt>
-    <dgm:pt modelId="{01B27D05-21AA-4FD7-9D11-7DCF2BD9A3EE}" type="parTrans" cxnId="{C0D2D1E8-C5EE-48CD-AD2C-82BB6D5487D3}">
-      <dgm:prSet/>
-      <dgm:spPr/>
-      <dgm:t>
-        <a:bodyPr/>
-        <a:lstStyle/>
-        <a:p>
-          <a:endParaRPr lang="en-US"/>
-        </a:p>
-      </dgm:t>
-    </dgm:pt>
-    <dgm:pt modelId="{6B55348B-890E-4F09-9955-F0BF3BBFFA46}" type="sibTrans" cxnId="{C0D2D1E8-C5EE-48CD-AD2C-82BB6D5487D3}">
-      <dgm:prSet/>
-      <dgm:spPr/>
-      <dgm:t>
-        <a:bodyPr/>
-        <a:lstStyle/>
-        <a:p>
-          <a:endParaRPr lang="en-US"/>
-        </a:p>
-      </dgm:t>
-    </dgm:pt>
-    <dgm:pt modelId="{9449410B-1754-4636-9701-90DD03F08720}" type="pres">
-      <dgm:prSet presAssocID="{59E1E3AD-0172-452F-B82A-4E58920FF251}" presName="linear" presStyleCnt="0">
-        <dgm:presLayoutVars>
-          <dgm:animLvl val="lvl"/>
-          <dgm:resizeHandles val="exact"/>
-        </dgm:presLayoutVars>
-      </dgm:prSet>
-      <dgm:spPr/>
-    </dgm:pt>
-    <dgm:pt modelId="{525F0978-37B8-4CBB-AFD8-D7178532FB6E}" type="pres">
-      <dgm:prSet presAssocID="{B7983131-979F-411B-8A28-0AB6303BD615}" presName="parentText" presStyleLbl="node1" presStyleIdx="0" presStyleCnt="4">
-        <dgm:presLayoutVars>
-          <dgm:chMax val="0"/>
-          <dgm:bulletEnabled val="1"/>
-        </dgm:presLayoutVars>
-      </dgm:prSet>
-      <dgm:spPr/>
-    </dgm:pt>
-    <dgm:pt modelId="{0276E4D1-8FDA-40DA-9D0D-EF6103807BC2}" type="pres">
-      <dgm:prSet presAssocID="{7BBE687A-20D5-4109-A4DA-FF72F0056536}" presName="spacer" presStyleCnt="0"/>
-      <dgm:spPr/>
-    </dgm:pt>
-    <dgm:pt modelId="{AADCAA9D-8110-4F0C-92BD-D48B6CB97CE0}" type="pres">
-      <dgm:prSet presAssocID="{76DE8A5C-BFCF-4C92-BE68-CC13D6E1FC0F}" presName="parentText" presStyleLbl="node1" presStyleIdx="1" presStyleCnt="4">
-        <dgm:presLayoutVars>
-          <dgm:chMax val="0"/>
-          <dgm:bulletEnabled val="1"/>
-        </dgm:presLayoutVars>
-      </dgm:prSet>
-      <dgm:spPr/>
-    </dgm:pt>
-    <dgm:pt modelId="{53BCB39E-F85A-424C-B4FB-CD8556261D5F}" type="pres">
-      <dgm:prSet presAssocID="{2CD3F6F9-06FD-4E07-AFE3-DC150B48D44E}" presName="spacer" presStyleCnt="0"/>
-      <dgm:spPr/>
-    </dgm:pt>
-    <dgm:pt modelId="{E7E69845-2443-4913-8E78-5D0AAE29E4AB}" type="pres">
-      <dgm:prSet presAssocID="{A752B6C4-28D6-4A1C-9D7F-56219E7041F3}" presName="parentText" presStyleLbl="node1" presStyleIdx="2" presStyleCnt="4">
-        <dgm:presLayoutVars>
-          <dgm:chMax val="0"/>
-          <dgm:bulletEnabled val="1"/>
-        </dgm:presLayoutVars>
-      </dgm:prSet>
-      <dgm:spPr/>
-    </dgm:pt>
-    <dgm:pt modelId="{209CD6A2-DD68-401A-A661-492191EEA994}" type="pres">
-      <dgm:prSet presAssocID="{EC00572F-8897-4BA9-B24B-C342FA34FE62}" presName="spacer" presStyleCnt="0"/>
-      <dgm:spPr/>
-    </dgm:pt>
-    <dgm:pt modelId="{E0FFA8E7-F79D-434D-947C-D7313E4DC863}" type="pres">
-      <dgm:prSet presAssocID="{0FF79521-E8C7-4CFC-A0A5-520989428B28}" presName="parentText" presStyleLbl="node1" presStyleIdx="3" presStyleCnt="4">
-        <dgm:presLayoutVars>
-          <dgm:chMax val="0"/>
-          <dgm:bulletEnabled val="1"/>
-        </dgm:presLayoutVars>
-      </dgm:prSet>
-      <dgm:spPr/>
-    </dgm:pt>
-    <dgm:pt modelId="{0C1F1709-E33C-492F-81E2-9467AB24D3D8}" type="pres">
-      <dgm:prSet presAssocID="{0FF79521-E8C7-4CFC-A0A5-520989428B28}" presName="childText" presStyleLbl="revTx" presStyleIdx="0" presStyleCnt="1">
-        <dgm:presLayoutVars>
-          <dgm:bulletEnabled val="1"/>
-        </dgm:presLayoutVars>
-      </dgm:prSet>
-      <dgm:spPr/>
-    </dgm:pt>
-  </dgm:ptLst>
-  <dgm:cxnLst>
-    <dgm:cxn modelId="{EF7C4809-AC19-4E09-8B18-ECF1E14540A4}" srcId="{59E1E3AD-0172-452F-B82A-4E58920FF251}" destId="{A752B6C4-28D6-4A1C-9D7F-56219E7041F3}" srcOrd="2" destOrd="0" parTransId="{32058634-D4A3-4635-A8ED-28598E8EF9BF}" sibTransId="{EC00572F-8897-4BA9-B24B-C342FA34FE62}"/>
-    <dgm:cxn modelId="{483C050F-4C6E-4A36-BFF0-ED712E447412}" srcId="{59E1E3AD-0172-452F-B82A-4E58920FF251}" destId="{76DE8A5C-BFCF-4C92-BE68-CC13D6E1FC0F}" srcOrd="1" destOrd="0" parTransId="{90BCC469-9E0C-4946-8E86-BEBFCE0B2177}" sibTransId="{2CD3F6F9-06FD-4E07-AFE3-DC150B48D44E}"/>
-    <dgm:cxn modelId="{59BF2326-7458-48DF-AFC3-3F6E92B4ED8D}" type="presOf" srcId="{B7983131-979F-411B-8A28-0AB6303BD615}" destId="{525F0978-37B8-4CBB-AFD8-D7178532FB6E}" srcOrd="0" destOrd="0" presId="urn:microsoft.com/office/officeart/2005/8/layout/vList2"/>
-    <dgm:cxn modelId="{08DCEC2A-6384-4508-8EA6-E7C529C74280}" type="presOf" srcId="{59E1E3AD-0172-452F-B82A-4E58920FF251}" destId="{9449410B-1754-4636-9701-90DD03F08720}" srcOrd="0" destOrd="0" presId="urn:microsoft.com/office/officeart/2005/8/layout/vList2"/>
-    <dgm:cxn modelId="{5A698B2C-BFE3-4082-81B0-E33E6ED55450}" srcId="{59E1E3AD-0172-452F-B82A-4E58920FF251}" destId="{0FF79521-E8C7-4CFC-A0A5-520989428B28}" srcOrd="3" destOrd="0" parTransId="{1C2F386D-1085-4C04-98DE-F5D5CA3EC751}" sibTransId="{B0009E9E-9F91-40BC-8FC7-FE378905901D}"/>
-    <dgm:cxn modelId="{082DBA35-737A-476E-B05A-F46A1C98D34D}" type="presOf" srcId="{76DE8A5C-BFCF-4C92-BE68-CC13D6E1FC0F}" destId="{AADCAA9D-8110-4F0C-92BD-D48B6CB97CE0}" srcOrd="0" destOrd="0" presId="urn:microsoft.com/office/officeart/2005/8/layout/vList2"/>
-    <dgm:cxn modelId="{831AB1B3-4D20-4530-96B5-865292EE0038}" type="presOf" srcId="{A752B6C4-28D6-4A1C-9D7F-56219E7041F3}" destId="{E7E69845-2443-4913-8E78-5D0AAE29E4AB}" srcOrd="0" destOrd="0" presId="urn:microsoft.com/office/officeart/2005/8/layout/vList2"/>
-    <dgm:cxn modelId="{C914FEC1-372F-4262-BD46-A85A9A0714DD}" type="presOf" srcId="{0FF79521-E8C7-4CFC-A0A5-520989428B28}" destId="{E0FFA8E7-F79D-434D-947C-D7313E4DC863}" srcOrd="0" destOrd="0" presId="urn:microsoft.com/office/officeart/2005/8/layout/vList2"/>
-    <dgm:cxn modelId="{CC08ACDB-262B-4293-9FD6-CE44F2FEF239}" srcId="{59E1E3AD-0172-452F-B82A-4E58920FF251}" destId="{B7983131-979F-411B-8A28-0AB6303BD615}" srcOrd="0" destOrd="0" parTransId="{8E76E9B1-F622-4ABD-BA01-84BB2640CF74}" sibTransId="{7BBE687A-20D5-4109-A4DA-FF72F0056536}"/>
-    <dgm:cxn modelId="{C0D2D1E8-C5EE-48CD-AD2C-82BB6D5487D3}" srcId="{0FF79521-E8C7-4CFC-A0A5-520989428B28}" destId="{EF1F8182-1488-4A23-9AED-B7CEB87FFA8E}" srcOrd="0" destOrd="0" parTransId="{01B27D05-21AA-4FD7-9D11-7DCF2BD9A3EE}" sibTransId="{6B55348B-890E-4F09-9955-F0BF3BBFFA46}"/>
-    <dgm:cxn modelId="{416C37F4-4606-4A6D-9B13-EA78F4FF4945}" type="presOf" srcId="{EF1F8182-1488-4A23-9AED-B7CEB87FFA8E}" destId="{0C1F1709-E33C-492F-81E2-9467AB24D3D8}" srcOrd="0" destOrd="0" presId="urn:microsoft.com/office/officeart/2005/8/layout/vList2"/>
-    <dgm:cxn modelId="{D069B005-C187-4719-938F-81AE50B93457}" type="presParOf" srcId="{9449410B-1754-4636-9701-90DD03F08720}" destId="{525F0978-37B8-4CBB-AFD8-D7178532FB6E}" srcOrd="0" destOrd="0" presId="urn:microsoft.com/office/officeart/2005/8/layout/vList2"/>
-    <dgm:cxn modelId="{778E7121-83CA-49E2-B886-889718BCD410}" type="presParOf" srcId="{9449410B-1754-4636-9701-90DD03F08720}" destId="{0276E4D1-8FDA-40DA-9D0D-EF6103807BC2}" srcOrd="1" destOrd="0" presId="urn:microsoft.com/office/officeart/2005/8/layout/vList2"/>
-    <dgm:cxn modelId="{037FF180-5C72-44BA-B1D1-5D691A986E72}" type="presParOf" srcId="{9449410B-1754-4636-9701-90DD03F08720}" destId="{AADCAA9D-8110-4F0C-92BD-D48B6CB97CE0}" srcOrd="2" destOrd="0" presId="urn:microsoft.com/office/officeart/2005/8/layout/vList2"/>
-    <dgm:cxn modelId="{348A8B43-5813-464B-AE21-A21115F91E05}" type="presParOf" srcId="{9449410B-1754-4636-9701-90DD03F08720}" destId="{53BCB39E-F85A-424C-B4FB-CD8556261D5F}" srcOrd="3" destOrd="0" presId="urn:microsoft.com/office/officeart/2005/8/layout/vList2"/>
-    <dgm:cxn modelId="{B35CC0BB-FA88-4B1C-9CA9-A05BBD20B3C0}" type="presParOf" srcId="{9449410B-1754-4636-9701-90DD03F08720}" destId="{E7E69845-2443-4913-8E78-5D0AAE29E4AB}" srcOrd="4" destOrd="0" presId="urn:microsoft.com/office/officeart/2005/8/layout/vList2"/>
-    <dgm:cxn modelId="{8D16BC78-3697-40AC-BF66-E4B1920204E6}" type="presParOf" srcId="{9449410B-1754-4636-9701-90DD03F08720}" destId="{209CD6A2-DD68-401A-A661-492191EEA994}" srcOrd="5" destOrd="0" presId="urn:microsoft.com/office/officeart/2005/8/layout/vList2"/>
-    <dgm:cxn modelId="{A24A5D2B-B6FB-46FD-A64D-1A6ED02AB753}" type="presParOf" srcId="{9449410B-1754-4636-9701-90DD03F08720}" destId="{E0FFA8E7-F79D-434D-947C-D7313E4DC863}" srcOrd="6" destOrd="0" presId="urn:microsoft.com/office/officeart/2005/8/layout/vList2"/>
-    <dgm:cxn modelId="{55122D68-62FA-4020-8279-327153C5ECEB}" type="presParOf" srcId="{9449410B-1754-4636-9701-90DD03F08720}" destId="{0C1F1709-E33C-492F-81E2-9467AB24D3D8}" srcOrd="7" destOrd="0" presId="urn:microsoft.com/office/officeart/2005/8/layout/vList2"/>
-  </dgm:cxnLst>
-  <dgm:bg/>
-  <dgm:whole/>
-  <dgm:extLst>
-    <a:ext uri="http://schemas.microsoft.com/office/drawing/2008/diagram">
-      <dsp:dataModelExt xmlns:dsp="http://schemas.microsoft.com/office/drawing/2008/diagram" relId="rId6" minVer="http://schemas.openxmlformats.org/drawingml/2006/diagram"/>
-    </a:ext>
-  </dgm:extLst>
-</dgm:dataModel>
-</file>
-
-<file path=ppt/diagrams/data3.xml><?xml version="1.0" encoding="utf-8"?>
-<dgm:dataModel xmlns:dgm="http://schemas.openxmlformats.org/drawingml/2006/diagram" xmlns:a="http://schemas.openxmlformats.org/drawingml/2006/main">
-  <dgm:ptLst>
     <dgm:pt modelId="{ADCACC3D-91C0-4A64-9E57-C4FA84CC3E6F}" type="doc">
       <dgm:prSet loTypeId="urn:microsoft.com/office/officeart/2005/8/layout/vList2" loCatId="list" qsTypeId="urn:microsoft.com/office/officeart/2005/8/quickstyle/simple1" qsCatId="simple" csTypeId="urn:microsoft.com/office/officeart/2005/8/colors/colorful2" csCatId="colorful" phldr="1"/>
       <dgm:spPr/>
@@ -5483,7 +4383,7 @@
 </dgm:dataModel>
 </file>
 
-<file path=ppt/diagrams/data4.xml><?xml version="1.0" encoding="utf-8"?>
+<file path=ppt/diagrams/data3.xml><?xml version="1.0" encoding="utf-8"?>
 <dgm:dataModel xmlns:dgm="http://schemas.openxmlformats.org/drawingml/2006/diagram" xmlns:a="http://schemas.openxmlformats.org/drawingml/2006/main">
   <dgm:ptLst>
     <dgm:pt modelId="{8DC3318D-0C66-4DA2-A1DB-FB36D23F18D0}" type="doc">
@@ -5716,9 +4616,9 @@
     <dgm:cxn modelId="{DF94C309-3EE5-4114-A538-09C34201CBAC}" type="presOf" srcId="{D300BFCC-1D6E-4DF7-84E8-CE39A1AE1314}" destId="{E46BA757-4EED-47A8-8AF5-D7CA6BE571F4}" srcOrd="0" destOrd="0" presId="urn:microsoft.com/office/officeart/2005/8/layout/vList2"/>
     <dgm:cxn modelId="{BBB5BE21-D732-473D-878D-2E69AC701245}" srcId="{8DC3318D-0C66-4DA2-A1DB-FB36D23F18D0}" destId="{6F0653D9-40EE-4089-A8F9-8AD4B3BBDB70}" srcOrd="1" destOrd="0" parTransId="{C0983C63-7A17-4D81-A388-8C7244BCCDA3}" sibTransId="{BC44EB0A-E651-4419-B332-07530EB386C1}"/>
     <dgm:cxn modelId="{C5CA3847-6C3A-428A-A0E9-6782DBCB98E7}" type="presOf" srcId="{8DC3318D-0C66-4DA2-A1DB-FB36D23F18D0}" destId="{515E2562-19A8-45DB-B3BC-FDB3F5C31620}" srcOrd="0" destOrd="0" presId="urn:microsoft.com/office/officeart/2005/8/layout/vList2"/>
-    <dgm:cxn modelId="{79A6276D-D6F1-469D-878E-4F14344B4CEC}" type="presOf" srcId="{6F0653D9-40EE-4089-A8F9-8AD4B3BBDB70}" destId="{8A304184-280B-4C5A-B6B2-3C9C99F9EACE}" srcOrd="0" destOrd="0" presId="urn:microsoft.com/office/officeart/2005/8/layout/vList2"/>
     <dgm:cxn modelId="{B8058B4E-39A3-4543-AC03-CA2B28834F5C}" srcId="{8DC3318D-0C66-4DA2-A1DB-FB36D23F18D0}" destId="{564591A1-E9E2-4652-B388-56DD465BBA73}" srcOrd="0" destOrd="0" parTransId="{0E7527AD-A9B3-42B9-9409-ABDFB881EE18}" sibTransId="{9A07C079-1916-44FC-910C-79566C2825EA}"/>
     <dgm:cxn modelId="{66597350-9A3E-4861-9FFB-2FE2C0116D46}" srcId="{8DC3318D-0C66-4DA2-A1DB-FB36D23F18D0}" destId="{B81AFC93-7069-49C8-8349-427A407CC99A}" srcOrd="2" destOrd="0" parTransId="{1E211A23-266B-4115-A2DD-2BC63CED1B5C}" sibTransId="{58468AE7-8840-415F-B565-E9A69ACE7EEE}"/>
+    <dgm:cxn modelId="{79A6276D-D6F1-469D-878E-4F14344B4CEC}" type="presOf" srcId="{6F0653D9-40EE-4089-A8F9-8AD4B3BBDB70}" destId="{8A304184-280B-4C5A-B6B2-3C9C99F9EACE}" srcOrd="0" destOrd="0" presId="urn:microsoft.com/office/officeart/2005/8/layout/vList2"/>
     <dgm:cxn modelId="{6919B281-158E-4836-B735-F733BECB6BB2}" type="presOf" srcId="{B81AFC93-7069-49C8-8349-427A407CC99A}" destId="{C082E4D3-04EC-44CA-A388-B0C22ABB8B8B}" srcOrd="0" destOrd="0" presId="urn:microsoft.com/office/officeart/2005/8/layout/vList2"/>
     <dgm:cxn modelId="{27A0089B-464B-4C33-A86C-9BC909EA5AC7}" type="presOf" srcId="{564591A1-E9E2-4652-B388-56DD465BBA73}" destId="{EF7F4814-0C53-4AA7-AE7E-94043D472844}" srcOrd="0" destOrd="0" presId="urn:microsoft.com/office/officeart/2005/8/layout/vList2"/>
     <dgm:cxn modelId="{33672225-A9AA-4840-BC82-2A4823607A40}" type="presParOf" srcId="{515E2562-19A8-45DB-B3BC-FDB3F5C31620}" destId="{EF7F4814-0C53-4AA7-AE7E-94043D472844}" srcOrd="0" destOrd="0" presId="urn:microsoft.com/office/officeart/2005/8/layout/vList2"/>
@@ -5739,7 +4639,7 @@
 </dgm:dataModel>
 </file>
 
-<file path=ppt/diagrams/data5.xml><?xml version="1.0" encoding="utf-8"?>
+<file path=ppt/diagrams/data4.xml><?xml version="1.0" encoding="utf-8"?>
 <dgm:dataModel xmlns:dgm="http://schemas.openxmlformats.org/drawingml/2006/diagram" xmlns:a="http://schemas.openxmlformats.org/drawingml/2006/main">
   <dgm:ptLst>
     <dgm:pt modelId="{E65D451B-7C34-44A4-B4BF-9FF7F8AF0D0E}" type="doc">
@@ -6055,9 +4955,9 @@
     <dgm:cxn modelId="{E6E8CA1C-873E-4013-A477-2E002287CBF9}" srcId="{EB52B90F-A19E-44D5-8F0A-D5E20E3C037B}" destId="{E656E436-2E02-4043-BF68-706549290604}" srcOrd="0" destOrd="0" parTransId="{C2915419-9CFF-4B86-A76C-E7D849690DCD}" sibTransId="{16ABAC30-1F59-41D2-9DB6-49885B979D6E}"/>
     <dgm:cxn modelId="{7307F024-DAE6-48C5-A2E2-8C9923530499}" type="presOf" srcId="{BF06D35C-AB06-4741-904D-6102835A749D}" destId="{0AA9D0E1-2220-4A6B-A110-3B145AE5E244}" srcOrd="0" destOrd="0" presId="urn:microsoft.com/office/officeart/2005/8/layout/vList5"/>
     <dgm:cxn modelId="{8699B440-C8F3-4F1C-BE89-092F0979B422}" srcId="{E65D451B-7C34-44A4-B4BF-9FF7F8AF0D0E}" destId="{EB52B90F-A19E-44D5-8F0A-D5E20E3C037B}" srcOrd="2" destOrd="0" parTransId="{BE2AC529-070F-4235-9BE4-981488D50A27}" sibTransId="{2B6C59D9-BFB0-45FE-9AC6-B485B922F227}"/>
+    <dgm:cxn modelId="{76071A54-DE3F-4A89-9F8C-22E0D7EBA65F}" srcId="{313B9CC3-BB1A-43C1-83B7-4D55A531EFED}" destId="{9CC16599-0967-4B68-9711-DB7D417604E8}" srcOrd="0" destOrd="0" parTransId="{691EAB34-28AC-48B0-82D0-B9791BA557F6}" sibTransId="{F813A4E0-E407-4B9A-956B-FD550C7B4AC0}"/>
     <dgm:cxn modelId="{864F7F62-95D7-4EDB-889F-A0F55C18C53E}" type="presOf" srcId="{EB52B90F-A19E-44D5-8F0A-D5E20E3C037B}" destId="{E1D3C486-4D00-4F86-9A6E-96D5800B9720}" srcOrd="0" destOrd="0" presId="urn:microsoft.com/office/officeart/2005/8/layout/vList5"/>
     <dgm:cxn modelId="{B405F070-140F-4C3E-AB83-090F0E948E8B}" type="presOf" srcId="{313B9CC3-BB1A-43C1-83B7-4D55A531EFED}" destId="{F739EFC5-E6CD-42A2-9976-D3BE6B6BED9B}" srcOrd="0" destOrd="0" presId="urn:microsoft.com/office/officeart/2005/8/layout/vList5"/>
-    <dgm:cxn modelId="{76071A54-DE3F-4A89-9F8C-22E0D7EBA65F}" srcId="{313B9CC3-BB1A-43C1-83B7-4D55A531EFED}" destId="{9CC16599-0967-4B68-9711-DB7D417604E8}" srcOrd="0" destOrd="0" parTransId="{691EAB34-28AC-48B0-82D0-B9791BA557F6}" sibTransId="{F813A4E0-E407-4B9A-956B-FD550C7B4AC0}"/>
     <dgm:cxn modelId="{E4188285-3A98-4A6D-85FF-BA2059268A73}" srcId="{E65D451B-7C34-44A4-B4BF-9FF7F8AF0D0E}" destId="{BF06D35C-AB06-4741-904D-6102835A749D}" srcOrd="0" destOrd="0" parTransId="{07E145B7-FBF7-4D6D-8995-3FEFFEFC0605}" sibTransId="{2569EB98-940C-405C-B661-04C0C2B00FB7}"/>
     <dgm:cxn modelId="{565B8A8C-E0A3-40D6-9C04-82D36B262BCC}" type="presOf" srcId="{E656E436-2E02-4043-BF68-706549290604}" destId="{399EF0A8-94BF-409B-82C4-4DF16500ED21}" srcOrd="0" destOrd="0" presId="urn:microsoft.com/office/officeart/2005/8/layout/vList5"/>
     <dgm:cxn modelId="{FDC18897-9262-43F5-8C59-254696976488}" srcId="{BF06D35C-AB06-4741-904D-6102835A749D}" destId="{CBD752A0-1F7C-475A-B10A-D88E821B47D6}" srcOrd="0" destOrd="0" parTransId="{F47F2BC0-6CE9-43B5-A0D4-7723EB52C351}" sibTransId="{06757E56-027D-4C68-A143-3BFADBFBD81F}"/>
@@ -6404,10 +5304,14 @@
             <a:buNone/>
           </a:pPr>
           <a:r>
+            <a:rPr lang="en-GB" sz="1600" kern="1200" dirty="0"/>
+            <a:t>Teams will have a table, with one monitor and keyboard. Please chat to your supervisor if you need </a:t>
+          </a:r>
+          <a:r>
             <a:rPr lang="en-GB" sz="1600" kern="1200"/>
-            <a:t>Teams will have pods (like that of an indie game expo) which will host a playable build of their game.</a:t>
+            <a:t>additional support.</a:t>
           </a:r>
-          <a:endParaRPr lang="en-US" sz="1600" kern="1200"/>
+          <a:endParaRPr lang="en-US" sz="1600" kern="1200" dirty="0"/>
         </a:p>
       </dsp:txBody>
       <dsp:txXfrm>
@@ -6893,395 +5797,6 @@
       <dsp:cNvGrpSpPr/>
     </dsp:nvGrpSpPr>
     <dsp:grpSpPr/>
-    <dsp:sp modelId="{525F0978-37B8-4CBB-AFD8-D7178532FB6E}">
-      <dsp:nvSpPr>
-        <dsp:cNvPr id="0" name=""/>
-        <dsp:cNvSpPr/>
-      </dsp:nvSpPr>
-      <dsp:spPr>
-        <a:xfrm>
-          <a:off x="0" y="73642"/>
-          <a:ext cx="4567238" cy="1255410"/>
-        </a:xfrm>
-        <a:prstGeom prst="roundRect">
-          <a:avLst/>
-        </a:prstGeom>
-        <a:solidFill>
-          <a:schemeClr val="accent2">
-            <a:hueOff val="0"/>
-            <a:satOff val="0"/>
-            <a:lumOff val="0"/>
-            <a:alphaOff val="0"/>
-          </a:schemeClr>
-        </a:solidFill>
-        <a:ln w="12700" cap="flat" cmpd="sng" algn="ctr">
-          <a:solidFill>
-            <a:schemeClr val="lt1">
-              <a:hueOff val="0"/>
-              <a:satOff val="0"/>
-              <a:lumOff val="0"/>
-              <a:alphaOff val="0"/>
-            </a:schemeClr>
-          </a:solidFill>
-          <a:prstDash val="solid"/>
-          <a:miter lim="800000"/>
-        </a:ln>
-        <a:effectLst/>
-      </dsp:spPr>
-      <dsp:style>
-        <a:lnRef idx="2">
-          <a:scrgbClr r="0" g="0" b="0"/>
-        </a:lnRef>
-        <a:fillRef idx="1">
-          <a:scrgbClr r="0" g="0" b="0"/>
-        </a:fillRef>
-        <a:effectRef idx="0">
-          <a:scrgbClr r="0" g="0" b="0"/>
-        </a:effectRef>
-        <a:fontRef idx="minor">
-          <a:schemeClr val="lt1"/>
-        </a:fontRef>
-      </dsp:style>
-      <dsp:txBody>
-        <a:bodyPr spcFirstLastPara="0" vert="horz" wrap="square" lIns="60960" tIns="60960" rIns="60960" bIns="60960" numCol="1" spcCol="1270" anchor="ctr" anchorCtr="0">
-          <a:noAutofit/>
-        </a:bodyPr>
-        <a:lstStyle/>
-        <a:p>
-          <a:pPr marL="0" lvl="0" indent="0" algn="l" defTabSz="711200">
-            <a:lnSpc>
-              <a:spcPct val="100000"/>
-            </a:lnSpc>
-            <a:spcBef>
-              <a:spcPct val="0"/>
-            </a:spcBef>
-            <a:spcAft>
-              <a:spcPct val="35000"/>
-            </a:spcAft>
-            <a:buNone/>
-          </a:pPr>
-          <a:r>
-            <a:rPr lang="en-GB" sz="1600" kern="1200"/>
-            <a:t>Individual stands that can be customised to better exhibit your work.</a:t>
-          </a:r>
-          <a:endParaRPr lang="en-US" sz="1600" kern="1200"/>
-        </a:p>
-      </dsp:txBody>
-      <dsp:txXfrm>
-        <a:off x="61284" y="134926"/>
-        <a:ext cx="4444670" cy="1132842"/>
-      </dsp:txXfrm>
-    </dsp:sp>
-    <dsp:sp modelId="{AADCAA9D-8110-4F0C-92BD-D48B6CB97CE0}">
-      <dsp:nvSpPr>
-        <dsp:cNvPr id="0" name=""/>
-        <dsp:cNvSpPr/>
-      </dsp:nvSpPr>
-      <dsp:spPr>
-        <a:xfrm>
-          <a:off x="0" y="1375132"/>
-          <a:ext cx="4567238" cy="1255410"/>
-        </a:xfrm>
-        <a:prstGeom prst="roundRect">
-          <a:avLst/>
-        </a:prstGeom>
-        <a:solidFill>
-          <a:schemeClr val="accent2">
-            <a:hueOff val="-485121"/>
-            <a:satOff val="-27976"/>
-            <a:lumOff val="2876"/>
-            <a:alphaOff val="0"/>
-          </a:schemeClr>
-        </a:solidFill>
-        <a:ln w="12700" cap="flat" cmpd="sng" algn="ctr">
-          <a:solidFill>
-            <a:schemeClr val="lt1">
-              <a:hueOff val="0"/>
-              <a:satOff val="0"/>
-              <a:lumOff val="0"/>
-              <a:alphaOff val="0"/>
-            </a:schemeClr>
-          </a:solidFill>
-          <a:prstDash val="solid"/>
-          <a:miter lim="800000"/>
-        </a:ln>
-        <a:effectLst/>
-      </dsp:spPr>
-      <dsp:style>
-        <a:lnRef idx="2">
-          <a:scrgbClr r="0" g="0" b="0"/>
-        </a:lnRef>
-        <a:fillRef idx="1">
-          <a:scrgbClr r="0" g="0" b="0"/>
-        </a:fillRef>
-        <a:effectRef idx="0">
-          <a:scrgbClr r="0" g="0" b="0"/>
-        </a:effectRef>
-        <a:fontRef idx="minor">
-          <a:schemeClr val="lt1"/>
-        </a:fontRef>
-      </dsp:style>
-      <dsp:txBody>
-        <a:bodyPr spcFirstLastPara="0" vert="horz" wrap="square" lIns="60960" tIns="60960" rIns="60960" bIns="60960" numCol="1" spcCol="1270" anchor="ctr" anchorCtr="0">
-          <a:noAutofit/>
-        </a:bodyPr>
-        <a:lstStyle/>
-        <a:p>
-          <a:pPr marL="0" lvl="0" indent="0" algn="l" defTabSz="711200">
-            <a:lnSpc>
-              <a:spcPct val="100000"/>
-            </a:lnSpc>
-            <a:spcBef>
-              <a:spcPct val="0"/>
-            </a:spcBef>
-            <a:spcAft>
-              <a:spcPct val="35000"/>
-            </a:spcAft>
-            <a:buNone/>
-          </a:pPr>
-          <a:r>
-            <a:rPr lang="en-GB" sz="1600" kern="1200"/>
-            <a:t>Budget allocated for each team to spend on marketing materials.</a:t>
-          </a:r>
-          <a:endParaRPr lang="en-US" sz="1600" kern="1200"/>
-        </a:p>
-      </dsp:txBody>
-      <dsp:txXfrm>
-        <a:off x="61284" y="1436416"/>
-        <a:ext cx="4444670" cy="1132842"/>
-      </dsp:txXfrm>
-    </dsp:sp>
-    <dsp:sp modelId="{E7E69845-2443-4913-8E78-5D0AAE29E4AB}">
-      <dsp:nvSpPr>
-        <dsp:cNvPr id="0" name=""/>
-        <dsp:cNvSpPr/>
-      </dsp:nvSpPr>
-      <dsp:spPr>
-        <a:xfrm>
-          <a:off x="0" y="2676622"/>
-          <a:ext cx="4567238" cy="1255410"/>
-        </a:xfrm>
-        <a:prstGeom prst="roundRect">
-          <a:avLst/>
-        </a:prstGeom>
-        <a:solidFill>
-          <a:schemeClr val="accent2">
-            <a:hueOff val="-970242"/>
-            <a:satOff val="-55952"/>
-            <a:lumOff val="5752"/>
-            <a:alphaOff val="0"/>
-          </a:schemeClr>
-        </a:solidFill>
-        <a:ln w="12700" cap="flat" cmpd="sng" algn="ctr">
-          <a:solidFill>
-            <a:schemeClr val="lt1">
-              <a:hueOff val="0"/>
-              <a:satOff val="0"/>
-              <a:lumOff val="0"/>
-              <a:alphaOff val="0"/>
-            </a:schemeClr>
-          </a:solidFill>
-          <a:prstDash val="solid"/>
-          <a:miter lim="800000"/>
-        </a:ln>
-        <a:effectLst/>
-      </dsp:spPr>
-      <dsp:style>
-        <a:lnRef idx="2">
-          <a:scrgbClr r="0" g="0" b="0"/>
-        </a:lnRef>
-        <a:fillRef idx="1">
-          <a:scrgbClr r="0" g="0" b="0"/>
-        </a:fillRef>
-        <a:effectRef idx="0">
-          <a:scrgbClr r="0" g="0" b="0"/>
-        </a:effectRef>
-        <a:fontRef idx="minor">
-          <a:schemeClr val="lt1"/>
-        </a:fontRef>
-      </dsp:style>
-      <dsp:txBody>
-        <a:bodyPr spcFirstLastPara="0" vert="horz" wrap="square" lIns="60960" tIns="60960" rIns="60960" bIns="60960" numCol="1" spcCol="1270" anchor="ctr" anchorCtr="0">
-          <a:noAutofit/>
-        </a:bodyPr>
-        <a:lstStyle/>
-        <a:p>
-          <a:pPr marL="0" lvl="0" indent="0" algn="l" defTabSz="711200">
-            <a:lnSpc>
-              <a:spcPct val="100000"/>
-            </a:lnSpc>
-            <a:spcBef>
-              <a:spcPct val="0"/>
-            </a:spcBef>
-            <a:spcAft>
-              <a:spcPct val="35000"/>
-            </a:spcAft>
-            <a:buNone/>
-          </a:pPr>
-          <a:r>
-            <a:rPr lang="en-GB" sz="1600" kern="1200"/>
-            <a:t>In week 6, your supervisor will begin talking to you about your plans. You are expected to research trade stands and submit ideas to your supervisor to check over before you apply for the budget. </a:t>
-          </a:r>
-          <a:endParaRPr lang="en-US" sz="1600" kern="1200"/>
-        </a:p>
-      </dsp:txBody>
-      <dsp:txXfrm>
-        <a:off x="61284" y="2737906"/>
-        <a:ext cx="4444670" cy="1132842"/>
-      </dsp:txXfrm>
-    </dsp:sp>
-    <dsp:sp modelId="{E0FFA8E7-F79D-434D-947C-D7313E4DC863}">
-      <dsp:nvSpPr>
-        <dsp:cNvPr id="0" name=""/>
-        <dsp:cNvSpPr/>
-      </dsp:nvSpPr>
-      <dsp:spPr>
-        <a:xfrm>
-          <a:off x="0" y="3978112"/>
-          <a:ext cx="4567238" cy="1255410"/>
-        </a:xfrm>
-        <a:prstGeom prst="roundRect">
-          <a:avLst/>
-        </a:prstGeom>
-        <a:solidFill>
-          <a:schemeClr val="accent2">
-            <a:hueOff val="-1455363"/>
-            <a:satOff val="-83928"/>
-            <a:lumOff val="8628"/>
-            <a:alphaOff val="0"/>
-          </a:schemeClr>
-        </a:solidFill>
-        <a:ln w="12700" cap="flat" cmpd="sng" algn="ctr">
-          <a:solidFill>
-            <a:schemeClr val="lt1">
-              <a:hueOff val="0"/>
-              <a:satOff val="0"/>
-              <a:lumOff val="0"/>
-              <a:alphaOff val="0"/>
-            </a:schemeClr>
-          </a:solidFill>
-          <a:prstDash val="solid"/>
-          <a:miter lim="800000"/>
-        </a:ln>
-        <a:effectLst/>
-      </dsp:spPr>
-      <dsp:style>
-        <a:lnRef idx="2">
-          <a:scrgbClr r="0" g="0" b="0"/>
-        </a:lnRef>
-        <a:fillRef idx="1">
-          <a:scrgbClr r="0" g="0" b="0"/>
-        </a:fillRef>
-        <a:effectRef idx="0">
-          <a:scrgbClr r="0" g="0" b="0"/>
-        </a:effectRef>
-        <a:fontRef idx="minor">
-          <a:schemeClr val="lt1"/>
-        </a:fontRef>
-      </dsp:style>
-      <dsp:txBody>
-        <a:bodyPr spcFirstLastPara="0" vert="horz" wrap="square" lIns="60960" tIns="60960" rIns="60960" bIns="60960" numCol="1" spcCol="1270" anchor="ctr" anchorCtr="0">
-          <a:noAutofit/>
-        </a:bodyPr>
-        <a:lstStyle/>
-        <a:p>
-          <a:pPr marL="0" lvl="0" indent="0" algn="l" defTabSz="711200">
-            <a:lnSpc>
-              <a:spcPct val="100000"/>
-            </a:lnSpc>
-            <a:spcBef>
-              <a:spcPct val="0"/>
-            </a:spcBef>
-            <a:spcAft>
-              <a:spcPct val="35000"/>
-            </a:spcAft>
-            <a:buNone/>
-          </a:pPr>
-          <a:r>
-            <a:rPr lang="en-GB" sz="1600" kern="1200"/>
-            <a:t>Most importantly, staff and industry professionals will be judging your work in the mornings, so it is paramount that you test your game thoroughly and submit a fully functioning game on hand-in.</a:t>
-          </a:r>
-          <a:endParaRPr lang="en-US" sz="1600" kern="1200"/>
-        </a:p>
-      </dsp:txBody>
-      <dsp:txXfrm>
-        <a:off x="61284" y="4039396"/>
-        <a:ext cx="4444670" cy="1132842"/>
-      </dsp:txXfrm>
-    </dsp:sp>
-    <dsp:sp modelId="{0C1F1709-E33C-492F-81E2-9467AB24D3D8}">
-      <dsp:nvSpPr>
-        <dsp:cNvPr id="0" name=""/>
-        <dsp:cNvSpPr/>
-      </dsp:nvSpPr>
-      <dsp:spPr>
-        <a:xfrm>
-          <a:off x="0" y="5233522"/>
-          <a:ext cx="4567238" cy="264960"/>
-        </a:xfrm>
-        <a:prstGeom prst="rect">
-          <a:avLst/>
-        </a:prstGeom>
-        <a:noFill/>
-        <a:ln>
-          <a:noFill/>
-        </a:ln>
-        <a:effectLst/>
-      </dsp:spPr>
-      <dsp:style>
-        <a:lnRef idx="0">
-          <a:scrgbClr r="0" g="0" b="0"/>
-        </a:lnRef>
-        <a:fillRef idx="0">
-          <a:scrgbClr r="0" g="0" b="0"/>
-        </a:fillRef>
-        <a:effectRef idx="0">
-          <a:scrgbClr r="0" g="0" b="0"/>
-        </a:effectRef>
-        <a:fontRef idx="minor"/>
-      </dsp:style>
-      <dsp:txBody>
-        <a:bodyPr spcFirstLastPara="0" vert="horz" wrap="square" lIns="145010" tIns="20320" rIns="113792" bIns="20320" numCol="1" spcCol="1270" anchor="t" anchorCtr="0">
-          <a:noAutofit/>
-        </a:bodyPr>
-        <a:lstStyle/>
-        <a:p>
-          <a:pPr marL="114300" lvl="1" indent="-114300" algn="l" defTabSz="533400">
-            <a:lnSpc>
-              <a:spcPct val="100000"/>
-            </a:lnSpc>
-            <a:spcBef>
-              <a:spcPct val="0"/>
-            </a:spcBef>
-            <a:spcAft>
-              <a:spcPct val="20000"/>
-            </a:spcAft>
-            <a:buChar char="•"/>
-          </a:pPr>
-          <a:r>
-            <a:rPr lang="en-GB" sz="1200" kern="1200"/>
-            <a:t>No amount of fancy marketing can save a game that does not play!</a:t>
-          </a:r>
-          <a:endParaRPr lang="en-US" sz="1200" kern="1200"/>
-        </a:p>
-      </dsp:txBody>
-      <dsp:txXfrm>
-        <a:off x="0" y="5233522"/>
-        <a:ext cx="4567238" cy="264960"/>
-      </dsp:txXfrm>
-    </dsp:sp>
-  </dsp:spTree>
-</dsp:drawing>
-</file>
-
-<file path=ppt/diagrams/drawing3.xml><?xml version="1.0" encoding="utf-8"?>
-<dsp:drawing xmlns:dgm="http://schemas.openxmlformats.org/drawingml/2006/diagram" xmlns:dsp="http://schemas.microsoft.com/office/drawing/2008/diagram" xmlns:a="http://schemas.openxmlformats.org/drawingml/2006/main">
-  <dsp:spTree>
-    <dsp:nvGrpSpPr>
-      <dsp:cNvPr id="0" name=""/>
-      <dsp:cNvGrpSpPr/>
-    </dsp:nvGrpSpPr>
-    <dsp:grpSpPr/>
     <dsp:sp modelId="{10918EA2-CCAF-4B97-9828-2B90E0193924}">
       <dsp:nvSpPr>
         <dsp:cNvPr id="0" name=""/>
@@ -7610,7 +6125,7 @@
 </dsp:drawing>
 </file>
 
-<file path=ppt/diagrams/drawing4.xml><?xml version="1.0" encoding="utf-8"?>
+<file path=ppt/diagrams/drawing3.xml><?xml version="1.0" encoding="utf-8"?>
 <dsp:drawing xmlns:dgm="http://schemas.openxmlformats.org/drawingml/2006/diagram" xmlns:dsp="http://schemas.microsoft.com/office/drawing/2008/diagram" xmlns:a="http://schemas.openxmlformats.org/drawingml/2006/main">
   <dsp:spTree>
     <dsp:nvGrpSpPr>
@@ -7946,7 +6461,7 @@
 </dsp:drawing>
 </file>
 
-<file path=ppt/diagrams/drawing5.xml><?xml version="1.0" encoding="utf-8"?>
+<file path=ppt/diagrams/drawing4.xml><?xml version="1.0" encoding="utf-8"?>
 <dsp:drawing xmlns:dgm="http://schemas.openxmlformats.org/drawingml/2006/diagram" xmlns:dsp="http://schemas.microsoft.com/office/drawing/2008/diagram" xmlns:a="http://schemas.openxmlformats.org/drawingml/2006/main">
   <dsp:spTree>
     <dsp:nvGrpSpPr>
@@ -9061,173 +7576,6 @@
 </file>
 
 <file path=ppt/diagrams/layout4.xml><?xml version="1.0" encoding="utf-8"?>
-<dgm:layoutDef xmlns:dgm="http://schemas.openxmlformats.org/drawingml/2006/diagram" xmlns:a="http://schemas.openxmlformats.org/drawingml/2006/main" uniqueId="urn:microsoft.com/office/officeart/2005/8/layout/vList2">
-  <dgm:title val=""/>
-  <dgm:desc val=""/>
-  <dgm:catLst>
-    <dgm:cat type="list" pri="3000"/>
-    <dgm:cat type="convert" pri="1000"/>
-  </dgm:catLst>
-  <dgm:sampData>
-    <dgm:dataModel>
-      <dgm:ptLst>
-        <dgm:pt modelId="0" type="doc"/>
-        <dgm:pt modelId="1">
-          <dgm:prSet phldr="1"/>
-        </dgm:pt>
-        <dgm:pt modelId="11">
-          <dgm:prSet phldr="1"/>
-        </dgm:pt>
-        <dgm:pt modelId="2">
-          <dgm:prSet phldr="1"/>
-        </dgm:pt>
-        <dgm:pt modelId="21">
-          <dgm:prSet phldr="1"/>
-        </dgm:pt>
-      </dgm:ptLst>
-      <dgm:cxnLst>
-        <dgm:cxn modelId="4" srcId="0" destId="1" srcOrd="0" destOrd="0"/>
-        <dgm:cxn modelId="5" srcId="0" destId="2" srcOrd="1" destOrd="0"/>
-        <dgm:cxn modelId="12" srcId="1" destId="11" srcOrd="0" destOrd="0"/>
-        <dgm:cxn modelId="23" srcId="2" destId="21" srcOrd="0" destOrd="0"/>
-      </dgm:cxnLst>
-      <dgm:bg/>
-      <dgm:whole/>
-    </dgm:dataModel>
-  </dgm:sampData>
-  <dgm:styleData>
-    <dgm:dataModel>
-      <dgm:ptLst>
-        <dgm:pt modelId="0" type="doc"/>
-        <dgm:pt modelId="1"/>
-        <dgm:pt modelId="2"/>
-      </dgm:ptLst>
-      <dgm:cxnLst>
-        <dgm:cxn modelId="3" srcId="0" destId="1" srcOrd="0" destOrd="0"/>
-        <dgm:cxn modelId="4" srcId="0" destId="2" srcOrd="1" destOrd="0"/>
-      </dgm:cxnLst>
-      <dgm:bg/>
-      <dgm:whole/>
-    </dgm:dataModel>
-  </dgm:styleData>
-  <dgm:clrData>
-    <dgm:dataModel>
-      <dgm:ptLst>
-        <dgm:pt modelId="0" type="doc"/>
-        <dgm:pt modelId="1"/>
-        <dgm:pt modelId="2"/>
-        <dgm:pt modelId="3"/>
-        <dgm:pt modelId="4"/>
-      </dgm:ptLst>
-      <dgm:cxnLst>
-        <dgm:cxn modelId="5" srcId="0" destId="1" srcOrd="0" destOrd="0"/>
-        <dgm:cxn modelId="6" srcId="0" destId="2" srcOrd="1" destOrd="0"/>
-        <dgm:cxn modelId="7" srcId="0" destId="3" srcOrd="2" destOrd="0"/>
-        <dgm:cxn modelId="8" srcId="0" destId="4" srcOrd="3" destOrd="0"/>
-      </dgm:cxnLst>
-      <dgm:bg/>
-      <dgm:whole/>
-    </dgm:dataModel>
-  </dgm:clrData>
-  <dgm:layoutNode name="linear">
-    <dgm:varLst>
-      <dgm:animLvl val="lvl"/>
-      <dgm:resizeHandles val="exact"/>
-    </dgm:varLst>
-    <dgm:alg type="lin">
-      <dgm:param type="linDir" val="fromT"/>
-      <dgm:param type="vertAlign" val="mid"/>
-    </dgm:alg>
-    <dgm:shape xmlns:r="http://schemas.openxmlformats.org/officeDocument/2006/relationships" r:blip="">
-      <dgm:adjLst/>
-    </dgm:shape>
-    <dgm:presOf/>
-    <dgm:constrLst>
-      <dgm:constr type="w" for="ch" forName="parentText" refType="w"/>
-      <dgm:constr type="h" for="ch" forName="parentText" refType="primFontSz" refFor="ch" refForName="parentText" fact="0.52"/>
-      <dgm:constr type="w" for="ch" forName="childText" refType="w"/>
-      <dgm:constr type="h" for="ch" forName="childText" refType="primFontSz" refFor="ch" refForName="parentText" fact="0.46"/>
-      <dgm:constr type="h" for="ch" forName="parentText" op="equ"/>
-      <dgm:constr type="primFontSz" for="ch" forName="parentText" op="equ" val="65"/>
-      <dgm:constr type="primFontSz" for="ch" forName="childText" refType="primFontSz" refFor="ch" refForName="parentText" op="equ"/>
-      <dgm:constr type="h" for="ch" forName="spacer" refType="primFontSz" refFor="ch" refForName="parentText" fact="0.08"/>
-    </dgm:constrLst>
-    <dgm:ruleLst>
-      <dgm:rule type="primFontSz" for="ch" forName="parentText" val="5" fact="NaN" max="NaN"/>
-    </dgm:ruleLst>
-    <dgm:forEach name="Name0" axis="ch" ptType="node">
-      <dgm:layoutNode name="parentText" styleLbl="node1">
-        <dgm:varLst>
-          <dgm:chMax val="0"/>
-          <dgm:bulletEnabled val="1"/>
-        </dgm:varLst>
-        <dgm:alg type="tx">
-          <dgm:param type="parTxLTRAlign" val="l"/>
-          <dgm:param type="parTxRTLAlign" val="r"/>
-        </dgm:alg>
-        <dgm:shape xmlns:r="http://schemas.openxmlformats.org/officeDocument/2006/relationships" type="roundRect" r:blip="">
-          <dgm:adjLst/>
-        </dgm:shape>
-        <dgm:presOf axis="self"/>
-        <dgm:constrLst>
-          <dgm:constr type="tMarg" refType="primFontSz" fact="0.3"/>
-          <dgm:constr type="bMarg" refType="primFontSz" fact="0.3"/>
-          <dgm:constr type="lMarg" refType="primFontSz" fact="0.3"/>
-          <dgm:constr type="rMarg" refType="primFontSz" fact="0.3"/>
-        </dgm:constrLst>
-        <dgm:ruleLst>
-          <dgm:rule type="h" val="INF" fact="NaN" max="NaN"/>
-        </dgm:ruleLst>
-      </dgm:layoutNode>
-      <dgm:choose name="Name1">
-        <dgm:if name="Name2" axis="ch" ptType="node" func="cnt" op="gte" val="1">
-          <dgm:layoutNode name="childText" styleLbl="revTx">
-            <dgm:varLst>
-              <dgm:bulletEnabled val="1"/>
-            </dgm:varLst>
-            <dgm:alg type="tx">
-              <dgm:param type="stBulletLvl" val="1"/>
-              <dgm:param type="lnSpAfChP" val="20"/>
-            </dgm:alg>
-            <dgm:shape xmlns:r="http://schemas.openxmlformats.org/officeDocument/2006/relationships" type="rect" r:blip="">
-              <dgm:adjLst/>
-            </dgm:shape>
-            <dgm:presOf axis="des" ptType="node"/>
-            <dgm:constrLst>
-              <dgm:constr type="tMarg" refType="primFontSz" fact="0.1"/>
-              <dgm:constr type="bMarg" refType="primFontSz" fact="0.1"/>
-              <dgm:constr type="lMarg" refType="w" fact="0.09"/>
-            </dgm:constrLst>
-            <dgm:ruleLst>
-              <dgm:rule type="h" val="INF" fact="NaN" max="NaN"/>
-            </dgm:ruleLst>
-          </dgm:layoutNode>
-        </dgm:if>
-        <dgm:else name="Name3">
-          <dgm:choose name="Name4">
-            <dgm:if name="Name5" axis="par ch" ptType="doc node" func="cnt" op="gte" val="2">
-              <dgm:forEach name="Name6" axis="followSib" ptType="sibTrans" cnt="1">
-                <dgm:layoutNode name="spacer">
-                  <dgm:alg type="sp"/>
-                  <dgm:shape xmlns:r="http://schemas.openxmlformats.org/officeDocument/2006/relationships" r:blip="">
-                    <dgm:adjLst/>
-                  </dgm:shape>
-                  <dgm:presOf/>
-                  <dgm:constrLst/>
-                  <dgm:ruleLst/>
-                </dgm:layoutNode>
-              </dgm:forEach>
-            </dgm:if>
-            <dgm:else name="Name7"/>
-          </dgm:choose>
-        </dgm:else>
-      </dgm:choose>
-    </dgm:forEach>
-  </dgm:layoutNode>
-</dgm:layoutDef>
-</file>
-
-<file path=ppt/diagrams/layout5.xml><?xml version="1.0" encoding="utf-8"?>
 <dgm:layoutDef xmlns:dgm="http://schemas.openxmlformats.org/drawingml/2006/diagram" xmlns:a="http://schemas.openxmlformats.org/drawingml/2006/main" uniqueId="urn:microsoft.com/office/officeart/2005/8/layout/vList5">
   <dgm:title val=""/>
   <dgm:desc val=""/>
@@ -13596,1040 +11944,6 @@
 </dgm:styleDef>
 </file>
 
-<file path=ppt/diagrams/quickStyle5.xml><?xml version="1.0" encoding="utf-8"?>
-<dgm:styleDef xmlns:dgm="http://schemas.openxmlformats.org/drawingml/2006/diagram" xmlns:a="http://schemas.openxmlformats.org/drawingml/2006/main" uniqueId="urn:microsoft.com/office/officeart/2005/8/quickstyle/simple1">
-  <dgm:title val=""/>
-  <dgm:desc val=""/>
-  <dgm:catLst>
-    <dgm:cat type="simple" pri="10100"/>
-  </dgm:catLst>
-  <dgm:scene3d>
-    <a:camera prst="orthographicFront"/>
-    <a:lightRig rig="threePt" dir="t"/>
-  </dgm:scene3d>
-  <dgm:styleLbl name="node0">
-    <dgm:scene3d>
-      <a:camera prst="orthographicFront"/>
-      <a:lightRig rig="threePt" dir="t"/>
-    </dgm:scene3d>
-    <dgm:sp3d/>
-    <dgm:txPr/>
-    <dgm:style>
-      <a:lnRef idx="2">
-        <a:scrgbClr r="0" g="0" b="0"/>
-      </a:lnRef>
-      <a:fillRef idx="1">
-        <a:scrgbClr r="0" g="0" b="0"/>
-      </a:fillRef>
-      <a:effectRef idx="0">
-        <a:scrgbClr r="0" g="0" b="0"/>
-      </a:effectRef>
-      <a:fontRef idx="minor">
-        <a:schemeClr val="lt1"/>
-      </a:fontRef>
-    </dgm:style>
-  </dgm:styleLbl>
-  <dgm:styleLbl name="lnNode1">
-    <dgm:scene3d>
-      <a:camera prst="orthographicFront"/>
-      <a:lightRig rig="threePt" dir="t"/>
-    </dgm:scene3d>
-    <dgm:sp3d/>
-    <dgm:txPr/>
-    <dgm:style>
-      <a:lnRef idx="2">
-        <a:scrgbClr r="0" g="0" b="0"/>
-      </a:lnRef>
-      <a:fillRef idx="1">
-        <a:scrgbClr r="0" g="0" b="0"/>
-      </a:fillRef>
-      <a:effectRef idx="0">
-        <a:scrgbClr r="0" g="0" b="0"/>
-      </a:effectRef>
-      <a:fontRef idx="minor">
-        <a:schemeClr val="lt1"/>
-      </a:fontRef>
-    </dgm:style>
-  </dgm:styleLbl>
-  <dgm:styleLbl name="vennNode1">
-    <dgm:scene3d>
-      <a:camera prst="orthographicFront"/>
-      <a:lightRig rig="threePt" dir="t"/>
-    </dgm:scene3d>
-    <dgm:sp3d/>
-    <dgm:txPr/>
-    <dgm:style>
-      <a:lnRef idx="2">
-        <a:scrgbClr r="0" g="0" b="0"/>
-      </a:lnRef>
-      <a:fillRef idx="1">
-        <a:scrgbClr r="0" g="0" b="0"/>
-      </a:fillRef>
-      <a:effectRef idx="0">
-        <a:scrgbClr r="0" g="0" b="0"/>
-      </a:effectRef>
-      <a:fontRef idx="minor">
-        <a:schemeClr val="tx1"/>
-      </a:fontRef>
-    </dgm:style>
-  </dgm:styleLbl>
-  <dgm:styleLbl name="alignNode1">
-    <dgm:scene3d>
-      <a:camera prst="orthographicFront"/>
-      <a:lightRig rig="threePt" dir="t"/>
-    </dgm:scene3d>
-    <dgm:sp3d/>
-    <dgm:txPr/>
-    <dgm:style>
-      <a:lnRef idx="2">
-        <a:scrgbClr r="0" g="0" b="0"/>
-      </a:lnRef>
-      <a:fillRef idx="1">
-        <a:scrgbClr r="0" g="0" b="0"/>
-      </a:fillRef>
-      <a:effectRef idx="0">
-        <a:scrgbClr r="0" g="0" b="0"/>
-      </a:effectRef>
-      <a:fontRef idx="minor">
-        <a:schemeClr val="lt1"/>
-      </a:fontRef>
-    </dgm:style>
-  </dgm:styleLbl>
-  <dgm:styleLbl name="node1">
-    <dgm:scene3d>
-      <a:camera prst="orthographicFront"/>
-      <a:lightRig rig="threePt" dir="t"/>
-    </dgm:scene3d>
-    <dgm:sp3d/>
-    <dgm:txPr/>
-    <dgm:style>
-      <a:lnRef idx="2">
-        <a:scrgbClr r="0" g="0" b="0"/>
-      </a:lnRef>
-      <a:fillRef idx="1">
-        <a:scrgbClr r="0" g="0" b="0"/>
-      </a:fillRef>
-      <a:effectRef idx="0">
-        <a:scrgbClr r="0" g="0" b="0"/>
-      </a:effectRef>
-      <a:fontRef idx="minor">
-        <a:schemeClr val="lt1"/>
-      </a:fontRef>
-    </dgm:style>
-  </dgm:styleLbl>
-  <dgm:styleLbl name="node2">
-    <dgm:scene3d>
-      <a:camera prst="orthographicFront"/>
-      <a:lightRig rig="threePt" dir="t"/>
-    </dgm:scene3d>
-    <dgm:sp3d/>
-    <dgm:txPr/>
-    <dgm:style>
-      <a:lnRef idx="2">
-        <a:scrgbClr r="0" g="0" b="0"/>
-      </a:lnRef>
-      <a:fillRef idx="1">
-        <a:scrgbClr r="0" g="0" b="0"/>
-      </a:fillRef>
-      <a:effectRef idx="0">
-        <a:scrgbClr r="0" g="0" b="0"/>
-      </a:effectRef>
-      <a:fontRef idx="minor">
-        <a:schemeClr val="lt1"/>
-      </a:fontRef>
-    </dgm:style>
-  </dgm:styleLbl>
-  <dgm:styleLbl name="node3">
-    <dgm:scene3d>
-      <a:camera prst="orthographicFront"/>
-      <a:lightRig rig="threePt" dir="t"/>
-    </dgm:scene3d>
-    <dgm:sp3d/>
-    <dgm:txPr/>
-    <dgm:style>
-      <a:lnRef idx="2">
-        <a:scrgbClr r="0" g="0" b="0"/>
-      </a:lnRef>
-      <a:fillRef idx="1">
-        <a:scrgbClr r="0" g="0" b="0"/>
-      </a:fillRef>
-      <a:effectRef idx="0">
-        <a:scrgbClr r="0" g="0" b="0"/>
-      </a:effectRef>
-      <a:fontRef idx="minor">
-        <a:schemeClr val="lt1"/>
-      </a:fontRef>
-    </dgm:style>
-  </dgm:styleLbl>
-  <dgm:styleLbl name="node4">
-    <dgm:scene3d>
-      <a:camera prst="orthographicFront"/>
-      <a:lightRig rig="threePt" dir="t"/>
-    </dgm:scene3d>
-    <dgm:sp3d/>
-    <dgm:txPr/>
-    <dgm:style>
-      <a:lnRef idx="2">
-        <a:scrgbClr r="0" g="0" b="0"/>
-      </a:lnRef>
-      <a:fillRef idx="1">
-        <a:scrgbClr r="0" g="0" b="0"/>
-      </a:fillRef>
-      <a:effectRef idx="0">
-        <a:scrgbClr r="0" g="0" b="0"/>
-      </a:effectRef>
-      <a:fontRef idx="minor">
-        <a:schemeClr val="lt1"/>
-      </a:fontRef>
-    </dgm:style>
-  </dgm:styleLbl>
-  <dgm:styleLbl name="fgImgPlace1">
-    <dgm:scene3d>
-      <a:camera prst="orthographicFront"/>
-      <a:lightRig rig="threePt" dir="t"/>
-    </dgm:scene3d>
-    <dgm:sp3d/>
-    <dgm:txPr/>
-    <dgm:style>
-      <a:lnRef idx="2">
-        <a:scrgbClr r="0" g="0" b="0"/>
-      </a:lnRef>
-      <a:fillRef idx="1">
-        <a:scrgbClr r="0" g="0" b="0"/>
-      </a:fillRef>
-      <a:effectRef idx="0">
-        <a:scrgbClr r="0" g="0" b="0"/>
-      </a:effectRef>
-      <a:fontRef idx="minor"/>
-    </dgm:style>
-  </dgm:styleLbl>
-  <dgm:styleLbl name="alignImgPlace1">
-    <dgm:scene3d>
-      <a:camera prst="orthographicFront"/>
-      <a:lightRig rig="threePt" dir="t"/>
-    </dgm:scene3d>
-    <dgm:sp3d/>
-    <dgm:txPr/>
-    <dgm:style>
-      <a:lnRef idx="2">
-        <a:scrgbClr r="0" g="0" b="0"/>
-      </a:lnRef>
-      <a:fillRef idx="1">
-        <a:scrgbClr r="0" g="0" b="0"/>
-      </a:fillRef>
-      <a:effectRef idx="0">
-        <a:scrgbClr r="0" g="0" b="0"/>
-      </a:effectRef>
-      <a:fontRef idx="minor"/>
-    </dgm:style>
-  </dgm:styleLbl>
-  <dgm:styleLbl name="bgImgPlace1">
-    <dgm:scene3d>
-      <a:camera prst="orthographicFront"/>
-      <a:lightRig rig="threePt" dir="t"/>
-    </dgm:scene3d>
-    <dgm:sp3d/>
-    <dgm:txPr/>
-    <dgm:style>
-      <a:lnRef idx="2">
-        <a:scrgbClr r="0" g="0" b="0"/>
-      </a:lnRef>
-      <a:fillRef idx="1">
-        <a:scrgbClr r="0" g="0" b="0"/>
-      </a:fillRef>
-      <a:effectRef idx="0">
-        <a:scrgbClr r="0" g="0" b="0"/>
-      </a:effectRef>
-      <a:fontRef idx="minor"/>
-    </dgm:style>
-  </dgm:styleLbl>
-  <dgm:styleLbl name="sibTrans2D1">
-    <dgm:scene3d>
-      <a:camera prst="orthographicFront"/>
-      <a:lightRig rig="threePt" dir="t"/>
-    </dgm:scene3d>
-    <dgm:sp3d/>
-    <dgm:txPr/>
-    <dgm:style>
-      <a:lnRef idx="0">
-        <a:scrgbClr r="0" g="0" b="0"/>
-      </a:lnRef>
-      <a:fillRef idx="1">
-        <a:scrgbClr r="0" g="0" b="0"/>
-      </a:fillRef>
-      <a:effectRef idx="0">
-        <a:scrgbClr r="0" g="0" b="0"/>
-      </a:effectRef>
-      <a:fontRef idx="minor">
-        <a:schemeClr val="lt1"/>
-      </a:fontRef>
-    </dgm:style>
-  </dgm:styleLbl>
-  <dgm:styleLbl name="fgSibTrans2D1">
-    <dgm:scene3d>
-      <a:camera prst="orthographicFront"/>
-      <a:lightRig rig="threePt" dir="t"/>
-    </dgm:scene3d>
-    <dgm:sp3d/>
-    <dgm:txPr/>
-    <dgm:style>
-      <a:lnRef idx="0">
-        <a:scrgbClr r="0" g="0" b="0"/>
-      </a:lnRef>
-      <a:fillRef idx="1">
-        <a:scrgbClr r="0" g="0" b="0"/>
-      </a:fillRef>
-      <a:effectRef idx="0">
-        <a:scrgbClr r="0" g="0" b="0"/>
-      </a:effectRef>
-      <a:fontRef idx="minor">
-        <a:schemeClr val="lt1"/>
-      </a:fontRef>
-    </dgm:style>
-  </dgm:styleLbl>
-  <dgm:styleLbl name="bgSibTrans2D1">
-    <dgm:scene3d>
-      <a:camera prst="orthographicFront"/>
-      <a:lightRig rig="threePt" dir="t"/>
-    </dgm:scene3d>
-    <dgm:sp3d/>
-    <dgm:txPr/>
-    <dgm:style>
-      <a:lnRef idx="0">
-        <a:scrgbClr r="0" g="0" b="0"/>
-      </a:lnRef>
-      <a:fillRef idx="1">
-        <a:scrgbClr r="0" g="0" b="0"/>
-      </a:fillRef>
-      <a:effectRef idx="0">
-        <a:scrgbClr r="0" g="0" b="0"/>
-      </a:effectRef>
-      <a:fontRef idx="minor">
-        <a:schemeClr val="lt1"/>
-      </a:fontRef>
-    </dgm:style>
-  </dgm:styleLbl>
-  <dgm:styleLbl name="sibTrans1D1">
-    <dgm:scene3d>
-      <a:camera prst="orthographicFront"/>
-      <a:lightRig rig="threePt" dir="t"/>
-    </dgm:scene3d>
-    <dgm:sp3d/>
-    <dgm:txPr/>
-    <dgm:style>
-      <a:lnRef idx="1">
-        <a:scrgbClr r="0" g="0" b="0"/>
-      </a:lnRef>
-      <a:fillRef idx="0">
-        <a:scrgbClr r="0" g="0" b="0"/>
-      </a:fillRef>
-      <a:effectRef idx="0">
-        <a:scrgbClr r="0" g="0" b="0"/>
-      </a:effectRef>
-      <a:fontRef idx="minor"/>
-    </dgm:style>
-  </dgm:styleLbl>
-  <dgm:styleLbl name="callout">
-    <dgm:scene3d>
-      <a:camera prst="orthographicFront"/>
-      <a:lightRig rig="threePt" dir="t"/>
-    </dgm:scene3d>
-    <dgm:sp3d/>
-    <dgm:txPr/>
-    <dgm:style>
-      <a:lnRef idx="2">
-        <a:scrgbClr r="0" g="0" b="0"/>
-      </a:lnRef>
-      <a:fillRef idx="1">
-        <a:scrgbClr r="0" g="0" b="0"/>
-      </a:fillRef>
-      <a:effectRef idx="0">
-        <a:scrgbClr r="0" g="0" b="0"/>
-      </a:effectRef>
-      <a:fontRef idx="minor"/>
-    </dgm:style>
-  </dgm:styleLbl>
-  <dgm:styleLbl name="asst0">
-    <dgm:scene3d>
-      <a:camera prst="orthographicFront"/>
-      <a:lightRig rig="threePt" dir="t"/>
-    </dgm:scene3d>
-    <dgm:sp3d/>
-    <dgm:txPr/>
-    <dgm:style>
-      <a:lnRef idx="2">
-        <a:scrgbClr r="0" g="0" b="0"/>
-      </a:lnRef>
-      <a:fillRef idx="1">
-        <a:scrgbClr r="0" g="0" b="0"/>
-      </a:fillRef>
-      <a:effectRef idx="0">
-        <a:scrgbClr r="0" g="0" b="0"/>
-      </a:effectRef>
-      <a:fontRef idx="minor">
-        <a:schemeClr val="lt1"/>
-      </a:fontRef>
-    </dgm:style>
-  </dgm:styleLbl>
-  <dgm:styleLbl name="asst1">
-    <dgm:scene3d>
-      <a:camera prst="orthographicFront"/>
-      <a:lightRig rig="threePt" dir="t"/>
-    </dgm:scene3d>
-    <dgm:sp3d/>
-    <dgm:txPr/>
-    <dgm:style>
-      <a:lnRef idx="2">
-        <a:scrgbClr r="0" g="0" b="0"/>
-      </a:lnRef>
-      <a:fillRef idx="1">
-        <a:scrgbClr r="0" g="0" b="0"/>
-      </a:fillRef>
-      <a:effectRef idx="0">
-        <a:scrgbClr r="0" g="0" b="0"/>
-      </a:effectRef>
-      <a:fontRef idx="minor">
-        <a:schemeClr val="lt1"/>
-      </a:fontRef>
-    </dgm:style>
-  </dgm:styleLbl>
-  <dgm:styleLbl name="asst2">
-    <dgm:scene3d>
-      <a:camera prst="orthographicFront"/>
-      <a:lightRig rig="threePt" dir="t"/>
-    </dgm:scene3d>
-    <dgm:sp3d/>
-    <dgm:txPr/>
-    <dgm:style>
-      <a:lnRef idx="2">
-        <a:scrgbClr r="0" g="0" b="0"/>
-      </a:lnRef>
-      <a:fillRef idx="1">
-        <a:scrgbClr r="0" g="0" b="0"/>
-      </a:fillRef>
-      <a:effectRef idx="0">
-        <a:scrgbClr r="0" g="0" b="0"/>
-      </a:effectRef>
-      <a:fontRef idx="minor">
-        <a:schemeClr val="lt1"/>
-      </a:fontRef>
-    </dgm:style>
-  </dgm:styleLbl>
-  <dgm:styleLbl name="asst3">
-    <dgm:scene3d>
-      <a:camera prst="orthographicFront"/>
-      <a:lightRig rig="threePt" dir="t"/>
-    </dgm:scene3d>
-    <dgm:sp3d/>
-    <dgm:txPr/>
-    <dgm:style>
-      <a:lnRef idx="2">
-        <a:scrgbClr r="0" g="0" b="0"/>
-      </a:lnRef>
-      <a:fillRef idx="1">
-        <a:scrgbClr r="0" g="0" b="0"/>
-      </a:fillRef>
-      <a:effectRef idx="0">
-        <a:scrgbClr r="0" g="0" b="0"/>
-      </a:effectRef>
-      <a:fontRef idx="minor">
-        <a:schemeClr val="lt1"/>
-      </a:fontRef>
-    </dgm:style>
-  </dgm:styleLbl>
-  <dgm:styleLbl name="asst4">
-    <dgm:scene3d>
-      <a:camera prst="orthographicFront"/>
-      <a:lightRig rig="threePt" dir="t"/>
-    </dgm:scene3d>
-    <dgm:sp3d/>
-    <dgm:txPr/>
-    <dgm:style>
-      <a:lnRef idx="2">
-        <a:scrgbClr r="0" g="0" b="0"/>
-      </a:lnRef>
-      <a:fillRef idx="1">
-        <a:scrgbClr r="0" g="0" b="0"/>
-      </a:fillRef>
-      <a:effectRef idx="0">
-        <a:scrgbClr r="0" g="0" b="0"/>
-      </a:effectRef>
-      <a:fontRef idx="minor">
-        <a:schemeClr val="lt1"/>
-      </a:fontRef>
-    </dgm:style>
-  </dgm:styleLbl>
-  <dgm:styleLbl name="parChTrans2D1">
-    <dgm:scene3d>
-      <a:camera prst="orthographicFront"/>
-      <a:lightRig rig="threePt" dir="t"/>
-    </dgm:scene3d>
-    <dgm:sp3d/>
-    <dgm:txPr/>
-    <dgm:style>
-      <a:lnRef idx="2">
-        <a:scrgbClr r="0" g="0" b="0"/>
-      </a:lnRef>
-      <a:fillRef idx="1">
-        <a:scrgbClr r="0" g="0" b="0"/>
-      </a:fillRef>
-      <a:effectRef idx="0">
-        <a:scrgbClr r="0" g="0" b="0"/>
-      </a:effectRef>
-      <a:fontRef idx="minor">
-        <a:schemeClr val="lt1"/>
-      </a:fontRef>
-    </dgm:style>
-  </dgm:styleLbl>
-  <dgm:styleLbl name="parChTrans2D2">
-    <dgm:scene3d>
-      <a:camera prst="orthographicFront"/>
-      <a:lightRig rig="threePt" dir="t"/>
-    </dgm:scene3d>
-    <dgm:sp3d/>
-    <dgm:txPr/>
-    <dgm:style>
-      <a:lnRef idx="2">
-        <a:scrgbClr r="0" g="0" b="0"/>
-      </a:lnRef>
-      <a:fillRef idx="1">
-        <a:scrgbClr r="0" g="0" b="0"/>
-      </a:fillRef>
-      <a:effectRef idx="0">
-        <a:scrgbClr r="0" g="0" b="0"/>
-      </a:effectRef>
-      <a:fontRef idx="minor">
-        <a:schemeClr val="lt1"/>
-      </a:fontRef>
-    </dgm:style>
-  </dgm:styleLbl>
-  <dgm:styleLbl name="parChTrans2D3">
-    <dgm:scene3d>
-      <a:camera prst="orthographicFront"/>
-      <a:lightRig rig="threePt" dir="t"/>
-    </dgm:scene3d>
-    <dgm:sp3d/>
-    <dgm:txPr/>
-    <dgm:style>
-      <a:lnRef idx="2">
-        <a:scrgbClr r="0" g="0" b="0"/>
-      </a:lnRef>
-      <a:fillRef idx="1">
-        <a:scrgbClr r="0" g="0" b="0"/>
-      </a:fillRef>
-      <a:effectRef idx="0">
-        <a:scrgbClr r="0" g="0" b="0"/>
-      </a:effectRef>
-      <a:fontRef idx="minor">
-        <a:schemeClr val="lt1"/>
-      </a:fontRef>
-    </dgm:style>
-  </dgm:styleLbl>
-  <dgm:styleLbl name="parChTrans2D4">
-    <dgm:scene3d>
-      <a:camera prst="orthographicFront"/>
-      <a:lightRig rig="threePt" dir="t"/>
-    </dgm:scene3d>
-    <dgm:sp3d/>
-    <dgm:txPr/>
-    <dgm:style>
-      <a:lnRef idx="2">
-        <a:scrgbClr r="0" g="0" b="0"/>
-      </a:lnRef>
-      <a:fillRef idx="1">
-        <a:scrgbClr r="0" g="0" b="0"/>
-      </a:fillRef>
-      <a:effectRef idx="0">
-        <a:scrgbClr r="0" g="0" b="0"/>
-      </a:effectRef>
-      <a:fontRef idx="minor">
-        <a:schemeClr val="lt1"/>
-      </a:fontRef>
-    </dgm:style>
-  </dgm:styleLbl>
-  <dgm:styleLbl name="parChTrans1D1">
-    <dgm:scene3d>
-      <a:camera prst="orthographicFront"/>
-      <a:lightRig rig="threePt" dir="t"/>
-    </dgm:scene3d>
-    <dgm:sp3d/>
-    <dgm:txPr/>
-    <dgm:style>
-      <a:lnRef idx="2">
-        <a:scrgbClr r="0" g="0" b="0"/>
-      </a:lnRef>
-      <a:fillRef idx="0">
-        <a:scrgbClr r="0" g="0" b="0"/>
-      </a:fillRef>
-      <a:effectRef idx="0">
-        <a:scrgbClr r="0" g="0" b="0"/>
-      </a:effectRef>
-      <a:fontRef idx="minor"/>
-    </dgm:style>
-  </dgm:styleLbl>
-  <dgm:styleLbl name="parChTrans1D2">
-    <dgm:scene3d>
-      <a:camera prst="orthographicFront"/>
-      <a:lightRig rig="threePt" dir="t"/>
-    </dgm:scene3d>
-    <dgm:sp3d/>
-    <dgm:txPr/>
-    <dgm:style>
-      <a:lnRef idx="2">
-        <a:scrgbClr r="0" g="0" b="0"/>
-      </a:lnRef>
-      <a:fillRef idx="0">
-        <a:scrgbClr r="0" g="0" b="0"/>
-      </a:fillRef>
-      <a:effectRef idx="0">
-        <a:scrgbClr r="0" g="0" b="0"/>
-      </a:effectRef>
-      <a:fontRef idx="minor"/>
-    </dgm:style>
-  </dgm:styleLbl>
-  <dgm:styleLbl name="parChTrans1D3">
-    <dgm:scene3d>
-      <a:camera prst="orthographicFront"/>
-      <a:lightRig rig="threePt" dir="t"/>
-    </dgm:scene3d>
-    <dgm:sp3d/>
-    <dgm:txPr/>
-    <dgm:style>
-      <a:lnRef idx="2">
-        <a:scrgbClr r="0" g="0" b="0"/>
-      </a:lnRef>
-      <a:fillRef idx="0">
-        <a:scrgbClr r="0" g="0" b="0"/>
-      </a:fillRef>
-      <a:effectRef idx="0">
-        <a:scrgbClr r="0" g="0" b="0"/>
-      </a:effectRef>
-      <a:fontRef idx="minor"/>
-    </dgm:style>
-  </dgm:styleLbl>
-  <dgm:styleLbl name="parChTrans1D4">
-    <dgm:scene3d>
-      <a:camera prst="orthographicFront"/>
-      <a:lightRig rig="threePt" dir="t"/>
-    </dgm:scene3d>
-    <dgm:sp3d/>
-    <dgm:txPr/>
-    <dgm:style>
-      <a:lnRef idx="2">
-        <a:scrgbClr r="0" g="0" b="0"/>
-      </a:lnRef>
-      <a:fillRef idx="0">
-        <a:scrgbClr r="0" g="0" b="0"/>
-      </a:fillRef>
-      <a:effectRef idx="0">
-        <a:scrgbClr r="0" g="0" b="0"/>
-      </a:effectRef>
-      <a:fontRef idx="minor"/>
-    </dgm:style>
-  </dgm:styleLbl>
-  <dgm:styleLbl name="fgAcc1">
-    <dgm:scene3d>
-      <a:camera prst="orthographicFront"/>
-      <a:lightRig rig="threePt" dir="t"/>
-    </dgm:scene3d>
-    <dgm:sp3d/>
-    <dgm:txPr/>
-    <dgm:style>
-      <a:lnRef idx="2">
-        <a:scrgbClr r="0" g="0" b="0"/>
-      </a:lnRef>
-      <a:fillRef idx="1">
-        <a:scrgbClr r="0" g="0" b="0"/>
-      </a:fillRef>
-      <a:effectRef idx="0">
-        <a:scrgbClr r="0" g="0" b="0"/>
-      </a:effectRef>
-      <a:fontRef idx="minor"/>
-    </dgm:style>
-  </dgm:styleLbl>
-  <dgm:styleLbl name="conFgAcc1">
-    <dgm:scene3d>
-      <a:camera prst="orthographicFront"/>
-      <a:lightRig rig="threePt" dir="t"/>
-    </dgm:scene3d>
-    <dgm:sp3d/>
-    <dgm:txPr/>
-    <dgm:style>
-      <a:lnRef idx="2">
-        <a:scrgbClr r="0" g="0" b="0"/>
-      </a:lnRef>
-      <a:fillRef idx="1">
-        <a:scrgbClr r="0" g="0" b="0"/>
-      </a:fillRef>
-      <a:effectRef idx="0">
-        <a:scrgbClr r="0" g="0" b="0"/>
-      </a:effectRef>
-      <a:fontRef idx="minor"/>
-    </dgm:style>
-  </dgm:styleLbl>
-  <dgm:styleLbl name="alignAcc1">
-    <dgm:scene3d>
-      <a:camera prst="orthographicFront"/>
-      <a:lightRig rig="threePt" dir="t"/>
-    </dgm:scene3d>
-    <dgm:sp3d/>
-    <dgm:txPr/>
-    <dgm:style>
-      <a:lnRef idx="2">
-        <a:scrgbClr r="0" g="0" b="0"/>
-      </a:lnRef>
-      <a:fillRef idx="1">
-        <a:scrgbClr r="0" g="0" b="0"/>
-      </a:fillRef>
-      <a:effectRef idx="0">
-        <a:scrgbClr r="0" g="0" b="0"/>
-      </a:effectRef>
-      <a:fontRef idx="minor"/>
-    </dgm:style>
-  </dgm:styleLbl>
-  <dgm:styleLbl name="trAlignAcc1">
-    <dgm:scene3d>
-      <a:camera prst="orthographicFront"/>
-      <a:lightRig rig="threePt" dir="t"/>
-    </dgm:scene3d>
-    <dgm:sp3d/>
-    <dgm:txPr/>
-    <dgm:style>
-      <a:lnRef idx="1">
-        <a:scrgbClr r="0" g="0" b="0"/>
-      </a:lnRef>
-      <a:fillRef idx="1">
-        <a:scrgbClr r="0" g="0" b="0"/>
-      </a:fillRef>
-      <a:effectRef idx="0">
-        <a:scrgbClr r="0" g="0" b="0"/>
-      </a:effectRef>
-      <a:fontRef idx="minor"/>
-    </dgm:style>
-  </dgm:styleLbl>
-  <dgm:styleLbl name="bgAcc1">
-    <dgm:scene3d>
-      <a:camera prst="orthographicFront"/>
-      <a:lightRig rig="threePt" dir="t"/>
-    </dgm:scene3d>
-    <dgm:sp3d/>
-    <dgm:txPr/>
-    <dgm:style>
-      <a:lnRef idx="2">
-        <a:scrgbClr r="0" g="0" b="0"/>
-      </a:lnRef>
-      <a:fillRef idx="1">
-        <a:scrgbClr r="0" g="0" b="0"/>
-      </a:fillRef>
-      <a:effectRef idx="0">
-        <a:scrgbClr r="0" g="0" b="0"/>
-      </a:effectRef>
-      <a:fontRef idx="minor"/>
-    </dgm:style>
-  </dgm:styleLbl>
-  <dgm:styleLbl name="solidFgAcc1">
-    <dgm:scene3d>
-      <a:camera prst="orthographicFront"/>
-      <a:lightRig rig="threePt" dir="t"/>
-    </dgm:scene3d>
-    <dgm:sp3d/>
-    <dgm:txPr/>
-    <dgm:style>
-      <a:lnRef idx="2">
-        <a:scrgbClr r="0" g="0" b="0"/>
-      </a:lnRef>
-      <a:fillRef idx="1">
-        <a:scrgbClr r="0" g="0" b="0"/>
-      </a:fillRef>
-      <a:effectRef idx="0">
-        <a:scrgbClr r="0" g="0" b="0"/>
-      </a:effectRef>
-      <a:fontRef idx="minor"/>
-    </dgm:style>
-  </dgm:styleLbl>
-  <dgm:styleLbl name="solidAlignAcc1">
-    <dgm:scene3d>
-      <a:camera prst="orthographicFront"/>
-      <a:lightRig rig="threePt" dir="t"/>
-    </dgm:scene3d>
-    <dgm:sp3d/>
-    <dgm:txPr/>
-    <dgm:style>
-      <a:lnRef idx="2">
-        <a:scrgbClr r="0" g="0" b="0"/>
-      </a:lnRef>
-      <a:fillRef idx="1">
-        <a:scrgbClr r="0" g="0" b="0"/>
-      </a:fillRef>
-      <a:effectRef idx="0">
-        <a:scrgbClr r="0" g="0" b="0"/>
-      </a:effectRef>
-      <a:fontRef idx="minor"/>
-    </dgm:style>
-  </dgm:styleLbl>
-  <dgm:styleLbl name="solidBgAcc1">
-    <dgm:scene3d>
-      <a:camera prst="orthographicFront"/>
-      <a:lightRig rig="threePt" dir="t"/>
-    </dgm:scene3d>
-    <dgm:sp3d/>
-    <dgm:txPr/>
-    <dgm:style>
-      <a:lnRef idx="2">
-        <a:scrgbClr r="0" g="0" b="0"/>
-      </a:lnRef>
-      <a:fillRef idx="1">
-        <a:scrgbClr r="0" g="0" b="0"/>
-      </a:fillRef>
-      <a:effectRef idx="0">
-        <a:scrgbClr r="0" g="0" b="0"/>
-      </a:effectRef>
-      <a:fontRef idx="minor"/>
-    </dgm:style>
-  </dgm:styleLbl>
-  <dgm:styleLbl name="fgAccFollowNode1">
-    <dgm:scene3d>
-      <a:camera prst="orthographicFront"/>
-      <a:lightRig rig="threePt" dir="t"/>
-    </dgm:scene3d>
-    <dgm:sp3d/>
-    <dgm:txPr/>
-    <dgm:style>
-      <a:lnRef idx="2">
-        <a:scrgbClr r="0" g="0" b="0"/>
-      </a:lnRef>
-      <a:fillRef idx="1">
-        <a:scrgbClr r="0" g="0" b="0"/>
-      </a:fillRef>
-      <a:effectRef idx="0">
-        <a:scrgbClr r="0" g="0" b="0"/>
-      </a:effectRef>
-      <a:fontRef idx="minor"/>
-    </dgm:style>
-  </dgm:styleLbl>
-  <dgm:styleLbl name="alignAccFollowNode1">
-    <dgm:scene3d>
-      <a:camera prst="orthographicFront"/>
-      <a:lightRig rig="threePt" dir="t"/>
-    </dgm:scene3d>
-    <dgm:sp3d/>
-    <dgm:txPr/>
-    <dgm:style>
-      <a:lnRef idx="2">
-        <a:scrgbClr r="0" g="0" b="0"/>
-      </a:lnRef>
-      <a:fillRef idx="1">
-        <a:scrgbClr r="0" g="0" b="0"/>
-      </a:fillRef>
-      <a:effectRef idx="0">
-        <a:scrgbClr r="0" g="0" b="0"/>
-      </a:effectRef>
-      <a:fontRef idx="minor"/>
-    </dgm:style>
-  </dgm:styleLbl>
-  <dgm:styleLbl name="bgAccFollowNode1">
-    <dgm:scene3d>
-      <a:camera prst="orthographicFront"/>
-      <a:lightRig rig="threePt" dir="t"/>
-    </dgm:scene3d>
-    <dgm:sp3d/>
-    <dgm:txPr/>
-    <dgm:style>
-      <a:lnRef idx="2">
-        <a:scrgbClr r="0" g="0" b="0"/>
-      </a:lnRef>
-      <a:fillRef idx="1">
-        <a:scrgbClr r="0" g="0" b="0"/>
-      </a:fillRef>
-      <a:effectRef idx="0">
-        <a:scrgbClr r="0" g="0" b="0"/>
-      </a:effectRef>
-      <a:fontRef idx="minor"/>
-    </dgm:style>
-  </dgm:styleLbl>
-  <dgm:styleLbl name="fgAcc0">
-    <dgm:scene3d>
-      <a:camera prst="orthographicFront"/>
-      <a:lightRig rig="threePt" dir="t"/>
-    </dgm:scene3d>
-    <dgm:sp3d/>
-    <dgm:txPr/>
-    <dgm:style>
-      <a:lnRef idx="2">
-        <a:scrgbClr r="0" g="0" b="0"/>
-      </a:lnRef>
-      <a:fillRef idx="1">
-        <a:scrgbClr r="0" g="0" b="0"/>
-      </a:fillRef>
-      <a:effectRef idx="0">
-        <a:scrgbClr r="0" g="0" b="0"/>
-      </a:effectRef>
-      <a:fontRef idx="minor"/>
-    </dgm:style>
-  </dgm:styleLbl>
-  <dgm:styleLbl name="fgAcc2">
-    <dgm:scene3d>
-      <a:camera prst="orthographicFront"/>
-      <a:lightRig rig="threePt" dir="t"/>
-    </dgm:scene3d>
-    <dgm:sp3d/>
-    <dgm:txPr/>
-    <dgm:style>
-      <a:lnRef idx="2">
-        <a:scrgbClr r="0" g="0" b="0"/>
-      </a:lnRef>
-      <a:fillRef idx="1">
-        <a:scrgbClr r="0" g="0" b="0"/>
-      </a:fillRef>
-      <a:effectRef idx="0">
-        <a:scrgbClr r="0" g="0" b="0"/>
-      </a:effectRef>
-      <a:fontRef idx="minor"/>
-    </dgm:style>
-  </dgm:styleLbl>
-  <dgm:styleLbl name="fgAcc3">
-    <dgm:scene3d>
-      <a:camera prst="orthographicFront"/>
-      <a:lightRig rig="threePt" dir="t"/>
-    </dgm:scene3d>
-    <dgm:sp3d/>
-    <dgm:txPr/>
-    <dgm:style>
-      <a:lnRef idx="2">
-        <a:scrgbClr r="0" g="0" b="0"/>
-      </a:lnRef>
-      <a:fillRef idx="1">
-        <a:scrgbClr r="0" g="0" b="0"/>
-      </a:fillRef>
-      <a:effectRef idx="0">
-        <a:scrgbClr r="0" g="0" b="0"/>
-      </a:effectRef>
-      <a:fontRef idx="minor"/>
-    </dgm:style>
-  </dgm:styleLbl>
-  <dgm:styleLbl name="fgAcc4">
-    <dgm:scene3d>
-      <a:camera prst="orthographicFront"/>
-      <a:lightRig rig="threePt" dir="t"/>
-    </dgm:scene3d>
-    <dgm:sp3d/>
-    <dgm:txPr/>
-    <dgm:style>
-      <a:lnRef idx="2">
-        <a:scrgbClr r="0" g="0" b="0"/>
-      </a:lnRef>
-      <a:fillRef idx="1">
-        <a:scrgbClr r="0" g="0" b="0"/>
-      </a:fillRef>
-      <a:effectRef idx="0">
-        <a:scrgbClr r="0" g="0" b="0"/>
-      </a:effectRef>
-      <a:fontRef idx="minor"/>
-    </dgm:style>
-  </dgm:styleLbl>
-  <dgm:styleLbl name="bgShp">
-    <dgm:scene3d>
-      <a:camera prst="orthographicFront"/>
-      <a:lightRig rig="threePt" dir="t"/>
-    </dgm:scene3d>
-    <dgm:sp3d/>
-    <dgm:txPr/>
-    <dgm:style>
-      <a:lnRef idx="0">
-        <a:scrgbClr r="0" g="0" b="0"/>
-      </a:lnRef>
-      <a:fillRef idx="1">
-        <a:scrgbClr r="0" g="0" b="0"/>
-      </a:fillRef>
-      <a:effectRef idx="0">
-        <a:scrgbClr r="0" g="0" b="0"/>
-      </a:effectRef>
-      <a:fontRef idx="minor"/>
-    </dgm:style>
-  </dgm:styleLbl>
-  <dgm:styleLbl name="dkBgShp">
-    <dgm:scene3d>
-      <a:camera prst="orthographicFront"/>
-      <a:lightRig rig="threePt" dir="t"/>
-    </dgm:scene3d>
-    <dgm:sp3d/>
-    <dgm:txPr/>
-    <dgm:style>
-      <a:lnRef idx="0">
-        <a:scrgbClr r="0" g="0" b="0"/>
-      </a:lnRef>
-      <a:fillRef idx="1">
-        <a:scrgbClr r="0" g="0" b="0"/>
-      </a:fillRef>
-      <a:effectRef idx="0">
-        <a:scrgbClr r="0" g="0" b="0"/>
-      </a:effectRef>
-      <a:fontRef idx="minor"/>
-    </dgm:style>
-  </dgm:styleLbl>
-  <dgm:styleLbl name="trBgShp">
-    <dgm:scene3d>
-      <a:camera prst="orthographicFront"/>
-      <a:lightRig rig="threePt" dir="t"/>
-    </dgm:scene3d>
-    <dgm:sp3d/>
-    <dgm:txPr/>
-    <dgm:style>
-      <a:lnRef idx="0">
-        <a:scrgbClr r="0" g="0" b="0"/>
-      </a:lnRef>
-      <a:fillRef idx="1">
-        <a:scrgbClr r="0" g="0" b="0"/>
-      </a:fillRef>
-      <a:effectRef idx="0">
-        <a:scrgbClr r="0" g="0" b="0"/>
-      </a:effectRef>
-      <a:fontRef idx="minor"/>
-    </dgm:style>
-  </dgm:styleLbl>
-  <dgm:styleLbl name="fgShp">
-    <dgm:scene3d>
-      <a:camera prst="orthographicFront"/>
-      <a:lightRig rig="threePt" dir="t"/>
-    </dgm:scene3d>
-    <dgm:sp3d/>
-    <dgm:txPr/>
-    <dgm:style>
-      <a:lnRef idx="2">
-        <a:scrgbClr r="0" g="0" b="0"/>
-      </a:lnRef>
-      <a:fillRef idx="1">
-        <a:scrgbClr r="0" g="0" b="0"/>
-      </a:fillRef>
-      <a:effectRef idx="0">
-        <a:scrgbClr r="0" g="0" b="0"/>
-      </a:effectRef>
-      <a:fontRef idx="minor"/>
-    </dgm:style>
-  </dgm:styleLbl>
-  <dgm:styleLbl name="revTx">
-    <dgm:scene3d>
-      <a:camera prst="orthographicFront"/>
-      <a:lightRig rig="threePt" dir="t"/>
-    </dgm:scene3d>
-    <dgm:sp3d/>
-    <dgm:txPr/>
-    <dgm:style>
-      <a:lnRef idx="0">
-        <a:scrgbClr r="0" g="0" b="0"/>
-      </a:lnRef>
-      <a:fillRef idx="0">
-        <a:scrgbClr r="0" g="0" b="0"/>
-      </a:fillRef>
-      <a:effectRef idx="0">
-        <a:scrgbClr r="0" g="0" b="0"/>
-      </a:effectRef>
-      <a:fontRef idx="minor"/>
-    </dgm:style>
-  </dgm:styleLbl>
-</dgm:styleDef>
-</file>
-
 <file path=ppt/slideLayouts/slideLayout1.xml><?xml version="1.0" encoding="utf-8"?>
 <p:sldLayout xmlns:a="http://schemas.openxmlformats.org/drawingml/2006/main" xmlns:r="http://schemas.openxmlformats.org/officeDocument/2006/relationships" xmlns:p="http://schemas.openxmlformats.org/presentationml/2006/main" type="title" preserve="1">
   <p:cSld name="Title Slide">
@@ -14779,7 +12093,7 @@
           <a:p>
             <a:fld id="{6B410BE4-3E7F-4034-8813-3BAFA9A2DA53}" type="datetimeFigureOut">
               <a:rPr lang="en-GB" smtClean="0"/>
-              <a:t>27/01/2020</a:t>
+              <a:t>28/01/2020</a:t>
             </a:fld>
             <a:endParaRPr lang="en-GB"/>
           </a:p>
@@ -14979,7 +12293,7 @@
           <a:p>
             <a:fld id="{6B410BE4-3E7F-4034-8813-3BAFA9A2DA53}" type="datetimeFigureOut">
               <a:rPr lang="en-GB" smtClean="0"/>
-              <a:t>27/01/2020</a:t>
+              <a:t>28/01/2020</a:t>
             </a:fld>
             <a:endParaRPr lang="en-GB"/>
           </a:p>
@@ -15189,7 +12503,7 @@
           <a:p>
             <a:fld id="{6B410BE4-3E7F-4034-8813-3BAFA9A2DA53}" type="datetimeFigureOut">
               <a:rPr lang="en-GB" smtClean="0"/>
-              <a:t>27/01/2020</a:t>
+              <a:t>28/01/2020</a:t>
             </a:fld>
             <a:endParaRPr lang="en-GB"/>
           </a:p>
@@ -15392,7 +12706,7 @@
             <a:fld id="{75B6E17D-98BB-401E-86C8-B9115934F2B1}" type="datetimeFigureOut">
               <a:rPr lang="en-GB" smtClean="0"/>
               <a:pPr/>
-              <a:t>27/01/2020</a:t>
+              <a:t>28/01/2020</a:t>
             </a:fld>
             <a:endParaRPr lang="en-GB"/>
           </a:p>
@@ -15809,7 +13123,7 @@
             <a:fld id="{75B6E17D-98BB-401E-86C8-B9115934F2B1}" type="datetimeFigureOut">
               <a:rPr lang="en-GB" smtClean="0"/>
               <a:pPr/>
-              <a:t>27/01/2020</a:t>
+              <a:t>28/01/2020</a:t>
             </a:fld>
             <a:endParaRPr lang="en-GB"/>
           </a:p>
@@ -16040,7 +13354,7 @@
             <a:fld id="{75B6E17D-98BB-401E-86C8-B9115934F2B1}" type="datetimeFigureOut">
               <a:rPr lang="en-GB" smtClean="0"/>
               <a:pPr/>
-              <a:t>27/01/2020</a:t>
+              <a:t>28/01/2020</a:t>
             </a:fld>
             <a:endParaRPr lang="en-GB"/>
           </a:p>
@@ -16406,7 +13720,7 @@
             <a:fld id="{75B6E17D-98BB-401E-86C8-B9115934F2B1}" type="datetimeFigureOut">
               <a:rPr lang="en-GB" smtClean="0"/>
               <a:pPr/>
-              <a:t>27/01/2020</a:t>
+              <a:t>28/01/2020</a:t>
             </a:fld>
             <a:endParaRPr lang="en-GB"/>
           </a:p>
@@ -16525,7 +13839,7 @@
             <a:fld id="{75B6E17D-98BB-401E-86C8-B9115934F2B1}" type="datetimeFigureOut">
               <a:rPr lang="en-GB" smtClean="0"/>
               <a:pPr/>
-              <a:t>27/01/2020</a:t>
+              <a:t>28/01/2020</a:t>
             </a:fld>
             <a:endParaRPr lang="en-GB"/>
           </a:p>
@@ -16622,7 +13936,7 @@
             <a:fld id="{75B6E17D-98BB-401E-86C8-B9115934F2B1}" type="datetimeFigureOut">
               <a:rPr lang="en-GB" smtClean="0"/>
               <a:pPr/>
-              <a:t>27/01/2020</a:t>
+              <a:t>28/01/2020</a:t>
             </a:fld>
             <a:endParaRPr lang="en-GB"/>
           </a:p>
@@ -16899,7 +14213,7 @@
             <a:fld id="{75B6E17D-98BB-401E-86C8-B9115934F2B1}" type="datetimeFigureOut">
               <a:rPr lang="en-GB" smtClean="0"/>
               <a:pPr/>
-              <a:t>27/01/2020</a:t>
+              <a:t>28/01/2020</a:t>
             </a:fld>
             <a:endParaRPr lang="en-GB"/>
           </a:p>
@@ -17088,7 +14402,7 @@
           <a:p>
             <a:fld id="{6B410BE4-3E7F-4034-8813-3BAFA9A2DA53}" type="datetimeFigureOut">
               <a:rPr lang="en-GB" smtClean="0"/>
-              <a:t>27/01/2020</a:t>
+              <a:t>28/01/2020</a:t>
             </a:fld>
             <a:endParaRPr lang="en-GB"/>
           </a:p>
@@ -17356,7 +14670,7 @@
             <a:fld id="{75B6E17D-98BB-401E-86C8-B9115934F2B1}" type="datetimeFigureOut">
               <a:rPr lang="en-GB" smtClean="0"/>
               <a:pPr/>
-              <a:t>27/01/2020</a:t>
+              <a:t>28/01/2020</a:t>
             </a:fld>
             <a:endParaRPr lang="en-GB"/>
           </a:p>
@@ -17526,7 +14840,7 @@
             <a:fld id="{75B6E17D-98BB-401E-86C8-B9115934F2B1}" type="datetimeFigureOut">
               <a:rPr lang="en-GB" smtClean="0"/>
               <a:pPr/>
-              <a:t>27/01/2020</a:t>
+              <a:t>28/01/2020</a:t>
             </a:fld>
             <a:endParaRPr lang="en-GB"/>
           </a:p>
@@ -17706,7 +15020,7 @@
             <a:fld id="{75B6E17D-98BB-401E-86C8-B9115934F2B1}" type="datetimeFigureOut">
               <a:rPr lang="en-GB" smtClean="0"/>
               <a:pPr/>
-              <a:t>27/01/2020</a:t>
+              <a:t>28/01/2020</a:t>
             </a:fld>
             <a:endParaRPr lang="en-GB"/>
           </a:p>
@@ -17971,7 +15285,7 @@
           <a:p>
             <a:fld id="{6B410BE4-3E7F-4034-8813-3BAFA9A2DA53}" type="datetimeFigureOut">
               <a:rPr lang="en-GB" smtClean="0"/>
-              <a:t>27/01/2020</a:t>
+              <a:t>28/01/2020</a:t>
             </a:fld>
             <a:endParaRPr lang="en-GB"/>
           </a:p>
@@ -18239,7 +15553,7 @@
           <a:p>
             <a:fld id="{6B410BE4-3E7F-4034-8813-3BAFA9A2DA53}" type="datetimeFigureOut">
               <a:rPr lang="en-GB" smtClean="0"/>
-              <a:t>27/01/2020</a:t>
+              <a:t>28/01/2020</a:t>
             </a:fld>
             <a:endParaRPr lang="en-GB"/>
           </a:p>
@@ -18654,7 +15968,7 @@
           <a:p>
             <a:fld id="{6B410BE4-3E7F-4034-8813-3BAFA9A2DA53}" type="datetimeFigureOut">
               <a:rPr lang="en-GB" smtClean="0"/>
-              <a:t>27/01/2020</a:t>
+              <a:t>28/01/2020</a:t>
             </a:fld>
             <a:endParaRPr lang="en-GB"/>
           </a:p>
@@ -18796,7 +16110,7 @@
           <a:p>
             <a:fld id="{6B410BE4-3E7F-4034-8813-3BAFA9A2DA53}" type="datetimeFigureOut">
               <a:rPr lang="en-GB" smtClean="0"/>
-              <a:t>27/01/2020</a:t>
+              <a:t>28/01/2020</a:t>
             </a:fld>
             <a:endParaRPr lang="en-GB"/>
           </a:p>
@@ -18909,7 +16223,7 @@
           <a:p>
             <a:fld id="{6B410BE4-3E7F-4034-8813-3BAFA9A2DA53}" type="datetimeFigureOut">
               <a:rPr lang="en-GB" smtClean="0"/>
-              <a:t>27/01/2020</a:t>
+              <a:t>28/01/2020</a:t>
             </a:fld>
             <a:endParaRPr lang="en-GB"/>
           </a:p>
@@ -19222,7 +16536,7 @@
           <a:p>
             <a:fld id="{6B410BE4-3E7F-4034-8813-3BAFA9A2DA53}" type="datetimeFigureOut">
               <a:rPr lang="en-GB" smtClean="0"/>
-              <a:t>27/01/2020</a:t>
+              <a:t>28/01/2020</a:t>
             </a:fld>
             <a:endParaRPr lang="en-GB"/>
           </a:p>
@@ -19511,7 +16825,7 @@
           <a:p>
             <a:fld id="{6B410BE4-3E7F-4034-8813-3BAFA9A2DA53}" type="datetimeFigureOut">
               <a:rPr lang="en-GB" smtClean="0"/>
-              <a:t>27/01/2020</a:t>
+              <a:t>28/01/2020</a:t>
             </a:fld>
             <a:endParaRPr lang="en-GB"/>
           </a:p>
@@ -19754,7 +17068,7 @@
           <a:p>
             <a:fld id="{6B410BE4-3E7F-4034-8813-3BAFA9A2DA53}" type="datetimeFigureOut">
               <a:rPr lang="en-GB" smtClean="0"/>
-              <a:t>27/01/2020</a:t>
+              <a:t>28/01/2020</a:t>
             </a:fld>
             <a:endParaRPr lang="en-GB"/>
           </a:p>
@@ -20311,7 +17625,7 @@
             <a:fld id="{75B6E17D-98BB-401E-86C8-B9115934F2B1}" type="datetimeFigureOut">
               <a:rPr lang="en-GB" smtClean="0"/>
               <a:pPr/>
-              <a:t>27/01/2020</a:t>
+              <a:t>28/01/2020</a:t>
             </a:fld>
             <a:endParaRPr lang="en-GB"/>
           </a:p>
@@ -20884,620 +18198,6 @@
 <file path=ppt/slides/slide10.xml><?xml version="1.0" encoding="utf-8"?>
 <p:sld xmlns:a="http://schemas.openxmlformats.org/drawingml/2006/main" xmlns:r="http://schemas.openxmlformats.org/officeDocument/2006/relationships" xmlns:p="http://schemas.openxmlformats.org/presentationml/2006/main">
   <p:cSld>
-    <p:bg>
-      <p:bgPr>
-        <a:solidFill>
-          <a:schemeClr val="tx1"/>
-        </a:solidFill>
-        <a:effectLst/>
-      </p:bgPr>
-    </p:bg>
-    <p:spTree>
-      <p:nvGrpSpPr>
-        <p:cNvPr id="1" name=""/>
-        <p:cNvGrpSpPr/>
-        <p:nvPr/>
-      </p:nvGrpSpPr>
-      <p:grpSpPr>
-        <a:xfrm>
-          <a:off x="0" y="0"/>
-          <a:ext cx="0" cy="0"/>
-          <a:chOff x="0" y="0"/>
-          <a:chExt cx="0" cy="0"/>
-        </a:xfrm>
-      </p:grpSpPr>
-      <p:pic>
-        <p:nvPicPr>
-          <p:cNvPr id="4" name="Content Placeholder 6">
-            <a:extLst>
-              <a:ext uri="{FF2B5EF4-FFF2-40B4-BE49-F238E27FC236}">
-                <a16:creationId xmlns:a16="http://schemas.microsoft.com/office/drawing/2014/main" id="{0A2AF877-4FBE-419B-94C2-DB8CA7105689}"/>
-              </a:ext>
-            </a:extLst>
-          </p:cNvPr>
-          <p:cNvPicPr>
-            <a:picLocks noChangeAspect="1"/>
-          </p:cNvPicPr>
-          <p:nvPr/>
-        </p:nvPicPr>
-        <p:blipFill rotWithShape="1">
-          <a:blip r:embed="rId2">
-            <a:extLst>
-              <a:ext uri="{28A0092B-C50C-407E-A947-70E740481C1C}">
-                <a14:useLocalDpi xmlns:a14="http://schemas.microsoft.com/office/drawing/2010/main" val="0"/>
-              </a:ext>
-            </a:extLst>
-          </a:blip>
-          <a:srcRect l="-4101" t="-4858" r="4101" b="4858"/>
-          <a:stretch/>
-        </p:blipFill>
-        <p:spPr>
-          <a:xfrm>
-            <a:off x="4205531" y="2408566"/>
-            <a:ext cx="7229087" cy="4068249"/>
-          </a:xfrm>
-          <a:prstGeom prst="rect">
-            <a:avLst/>
-          </a:prstGeom>
-        </p:spPr>
-      </p:pic>
-      <p:sp>
-        <p:nvSpPr>
-          <p:cNvPr id="5" name="Rectangle 4">
-            <a:extLst>
-              <a:ext uri="{FF2B5EF4-FFF2-40B4-BE49-F238E27FC236}">
-                <a16:creationId xmlns:a16="http://schemas.microsoft.com/office/drawing/2014/main" id="{E0AC499E-0CF9-4CC2-B705-0DA68E68EDDB}"/>
-              </a:ext>
-            </a:extLst>
-          </p:cNvPr>
-          <p:cNvSpPr/>
-          <p:nvPr/>
-        </p:nvSpPr>
-        <p:spPr>
-          <a:xfrm>
-            <a:off x="8054109" y="3768436"/>
-            <a:ext cx="1911927" cy="461818"/>
-          </a:xfrm>
-          <a:prstGeom prst="rect">
-            <a:avLst/>
-          </a:prstGeom>
-          <a:solidFill>
-            <a:schemeClr val="tx1"/>
-          </a:solidFill>
-          <a:ln>
-            <a:noFill/>
-          </a:ln>
-        </p:spPr>
-        <p:style>
-          <a:lnRef idx="2">
-            <a:schemeClr val="accent1">
-              <a:shade val="50000"/>
-            </a:schemeClr>
-          </a:lnRef>
-          <a:fillRef idx="1">
-            <a:schemeClr val="accent1"/>
-          </a:fillRef>
-          <a:effectRef idx="0">
-            <a:schemeClr val="accent1"/>
-          </a:effectRef>
-          <a:fontRef idx="minor">
-            <a:schemeClr val="lt1"/>
-          </a:fontRef>
-        </p:style>
-        <p:txBody>
-          <a:bodyPr rtlCol="0" anchor="ctr"/>
-          <a:lstStyle/>
-          <a:p>
-            <a:pPr algn="ctr"/>
-            <a:endParaRPr lang="en-GB"/>
-          </a:p>
-        </p:txBody>
-      </p:sp>
-      <p:sp>
-        <p:nvSpPr>
-          <p:cNvPr id="6" name="TextBox 5">
-            <a:extLst>
-              <a:ext uri="{FF2B5EF4-FFF2-40B4-BE49-F238E27FC236}">
-                <a16:creationId xmlns:a16="http://schemas.microsoft.com/office/drawing/2014/main" id="{AEC2F31B-B051-4F71-8428-F4660DC80A38}"/>
-              </a:ext>
-            </a:extLst>
-          </p:cNvPr>
-          <p:cNvSpPr txBox="1"/>
-          <p:nvPr/>
-        </p:nvSpPr>
-        <p:spPr>
-          <a:xfrm rot="19445185">
-            <a:off x="10060239" y="5310419"/>
-            <a:ext cx="2142836" cy="1015663"/>
-          </a:xfrm>
-          <a:prstGeom prst="rect">
-            <a:avLst/>
-          </a:prstGeom>
-          <a:noFill/>
-        </p:spPr>
-        <p:txBody>
-          <a:bodyPr wrap="square" rtlCol="0">
-            <a:spAutoFit/>
-          </a:bodyPr>
-          <a:lstStyle/>
-          <a:p>
-            <a:r>
-              <a:rPr lang="en-GB" sz="6000" dirty="0">
-                <a:solidFill>
-                  <a:schemeClr val="bg1"/>
-                </a:solidFill>
-                <a:latin typeface="Stencil" panose="040409050D0802020404" pitchFamily="82" charset="0"/>
-                <a:cs typeface="Aharoni" panose="020B0604020202020204" pitchFamily="2" charset="-79"/>
-              </a:rPr>
-              <a:t>EXPO</a:t>
-            </a:r>
-          </a:p>
-        </p:txBody>
-      </p:sp>
-      <p:sp>
-        <p:nvSpPr>
-          <p:cNvPr id="8" name="TextBox 7">
-            <a:extLst>
-              <a:ext uri="{FF2B5EF4-FFF2-40B4-BE49-F238E27FC236}">
-                <a16:creationId xmlns:a16="http://schemas.microsoft.com/office/drawing/2014/main" id="{C52CB9F7-4FB3-4142-B3B4-22BA9042E184}"/>
-              </a:ext>
-            </a:extLst>
-          </p:cNvPr>
-          <p:cNvSpPr txBox="1"/>
-          <p:nvPr/>
-        </p:nvSpPr>
-        <p:spPr>
-          <a:xfrm>
-            <a:off x="370883" y="774427"/>
-            <a:ext cx="5299737" cy="4693593"/>
-          </a:xfrm>
-          <a:prstGeom prst="rect">
-            <a:avLst/>
-          </a:prstGeom>
-          <a:noFill/>
-        </p:spPr>
-        <p:txBody>
-          <a:bodyPr wrap="square" rtlCol="0">
-            <a:spAutoFit/>
-          </a:bodyPr>
-          <a:lstStyle/>
-          <a:p>
-            <a:pPr algn="ctr"/>
-            <a:r>
-              <a:rPr lang="en-GB" sz="2500" dirty="0">
-                <a:solidFill>
-                  <a:schemeClr val="bg1"/>
-                </a:solidFill>
-                <a:latin typeface="Century Gothic" panose="020B0502020202020204" pitchFamily="34" charset="0"/>
-              </a:rPr>
-              <a:t>Supermassive Trophy for best third year game. </a:t>
-            </a:r>
-          </a:p>
-          <a:p>
-            <a:pPr algn="ctr"/>
-            <a:r>
-              <a:rPr lang="en-GB" sz="2500" dirty="0">
-                <a:solidFill>
-                  <a:schemeClr val="bg1"/>
-                </a:solidFill>
-                <a:latin typeface="Century Gothic" panose="020B0502020202020204" pitchFamily="34" charset="0"/>
-              </a:rPr>
-              <a:t>More to be announced!  </a:t>
-            </a:r>
-          </a:p>
-          <a:p>
-            <a:pPr algn="ctr"/>
-            <a:endParaRPr lang="en-GB" sz="3200" b="1" dirty="0">
-              <a:solidFill>
-                <a:schemeClr val="bg1"/>
-              </a:solidFill>
-              <a:latin typeface="Century Gothic" panose="020B0502020202020204" pitchFamily="34" charset="0"/>
-            </a:endParaRPr>
-          </a:p>
-          <a:p>
-            <a:pPr algn="ctr"/>
-            <a:endParaRPr lang="en-GB" sz="3200" b="1" dirty="0">
-              <a:solidFill>
-                <a:schemeClr val="bg1"/>
-              </a:solidFill>
-              <a:latin typeface="Century Gothic" panose="020B0502020202020204" pitchFamily="34" charset="0"/>
-            </a:endParaRPr>
-          </a:p>
-          <a:p>
-            <a:pPr algn="ctr"/>
-            <a:endParaRPr lang="en-GB" sz="3200" b="1" dirty="0">
-              <a:solidFill>
-                <a:schemeClr val="bg1"/>
-              </a:solidFill>
-              <a:latin typeface="Century Gothic" panose="020B0502020202020204" pitchFamily="34" charset="0"/>
-            </a:endParaRPr>
-          </a:p>
-          <a:p>
-            <a:pPr algn="ctr"/>
-            <a:endParaRPr lang="en-GB" sz="3200" b="1" dirty="0">
-              <a:solidFill>
-                <a:schemeClr val="bg1"/>
-              </a:solidFill>
-              <a:latin typeface="Century Gothic" panose="020B0502020202020204" pitchFamily="34" charset="0"/>
-            </a:endParaRPr>
-          </a:p>
-          <a:p>
-            <a:pPr algn="ctr"/>
-            <a:endParaRPr lang="en-GB" sz="3200" b="1" dirty="0">
-              <a:solidFill>
-                <a:schemeClr val="bg1"/>
-              </a:solidFill>
-              <a:latin typeface="Century Gothic" panose="020B0502020202020204" pitchFamily="34" charset="0"/>
-            </a:endParaRPr>
-          </a:p>
-          <a:p>
-            <a:pPr algn="ctr"/>
-            <a:endParaRPr lang="en-GB" sz="3200" b="1" dirty="0">
-              <a:solidFill>
-                <a:schemeClr val="bg1"/>
-              </a:solidFill>
-              <a:latin typeface="Century Gothic" panose="020B0502020202020204" pitchFamily="34" charset="0"/>
-            </a:endParaRPr>
-          </a:p>
-          <a:p>
-            <a:pPr algn="ctr"/>
-            <a:r>
-              <a:rPr lang="en-GB" sz="2500" dirty="0">
-                <a:solidFill>
-                  <a:schemeClr val="bg1"/>
-                </a:solidFill>
-                <a:latin typeface="Century Gothic" panose="020B0502020202020204" pitchFamily="34" charset="0"/>
-              </a:rPr>
-              <a:t>More to be announced!  </a:t>
-            </a:r>
-          </a:p>
-        </p:txBody>
-      </p:sp>
-      <p:sp>
-        <p:nvSpPr>
-          <p:cNvPr id="9" name="TextBox 8">
-            <a:extLst>
-              <a:ext uri="{FF2B5EF4-FFF2-40B4-BE49-F238E27FC236}">
-                <a16:creationId xmlns:a16="http://schemas.microsoft.com/office/drawing/2014/main" id="{2AFE0E8F-2269-444B-A619-E192DA9E3EBF}"/>
-              </a:ext>
-            </a:extLst>
-          </p:cNvPr>
-          <p:cNvSpPr txBox="1"/>
-          <p:nvPr/>
-        </p:nvSpPr>
-        <p:spPr>
-          <a:xfrm>
-            <a:off x="1803912" y="189652"/>
-            <a:ext cx="2367956" cy="584775"/>
-          </a:xfrm>
-          <a:prstGeom prst="rect">
-            <a:avLst/>
-          </a:prstGeom>
-          <a:noFill/>
-        </p:spPr>
-        <p:txBody>
-          <a:bodyPr wrap="none" rtlCol="0">
-            <a:spAutoFit/>
-          </a:bodyPr>
-          <a:lstStyle/>
-          <a:p>
-            <a:r>
-              <a:rPr lang="en-GB" sz="3200" b="1" dirty="0">
-                <a:solidFill>
-                  <a:schemeClr val="bg1"/>
-                </a:solidFill>
-                <a:latin typeface="Century Gothic" panose="020B0502020202020204" pitchFamily="34" charset="0"/>
-              </a:rPr>
-              <a:t>Expo Prizes</a:t>
-            </a:r>
-          </a:p>
-        </p:txBody>
-      </p:sp>
-      <p:sp>
-        <p:nvSpPr>
-          <p:cNvPr id="10" name="TextBox 9">
-            <a:extLst>
-              <a:ext uri="{FF2B5EF4-FFF2-40B4-BE49-F238E27FC236}">
-                <a16:creationId xmlns:a16="http://schemas.microsoft.com/office/drawing/2014/main" id="{0D1685BB-16AC-466B-AB10-3F2098625EB6}"/>
-              </a:ext>
-            </a:extLst>
-          </p:cNvPr>
-          <p:cNvSpPr txBox="1"/>
-          <p:nvPr/>
-        </p:nvSpPr>
-        <p:spPr>
-          <a:xfrm>
-            <a:off x="1679679" y="2220977"/>
-            <a:ext cx="2616422" cy="584775"/>
-          </a:xfrm>
-          <a:prstGeom prst="rect">
-            <a:avLst/>
-          </a:prstGeom>
-          <a:noFill/>
-        </p:spPr>
-        <p:txBody>
-          <a:bodyPr wrap="none" rtlCol="0">
-            <a:spAutoFit/>
-          </a:bodyPr>
-          <a:lstStyle/>
-          <a:p>
-            <a:r>
-              <a:rPr lang="en-GB" sz="3200" b="1" dirty="0">
-                <a:solidFill>
-                  <a:schemeClr val="bg1"/>
-                </a:solidFill>
-                <a:latin typeface="Century Gothic" panose="020B0502020202020204" pitchFamily="34" charset="0"/>
-              </a:rPr>
-              <a:t>Expo Guests</a:t>
-            </a:r>
-          </a:p>
-        </p:txBody>
-      </p:sp>
-      <p:pic>
-        <p:nvPicPr>
-          <p:cNvPr id="1026" name="Picture 2" descr="Image result for supermassive games">
-            <a:extLst>
-              <a:ext uri="{FF2B5EF4-FFF2-40B4-BE49-F238E27FC236}">
-                <a16:creationId xmlns:a16="http://schemas.microsoft.com/office/drawing/2014/main" id="{12B1824B-07E4-41C8-BBC5-2D875AF34E82}"/>
-              </a:ext>
-            </a:extLst>
-          </p:cNvPr>
-          <p:cNvPicPr>
-            <a:picLocks noChangeAspect="1" noChangeArrowheads="1"/>
-          </p:cNvPicPr>
-          <p:nvPr/>
-        </p:nvPicPr>
-        <p:blipFill>
-          <a:blip r:embed="rId3">
-            <a:extLst>
-              <a:ext uri="{28A0092B-C50C-407E-A947-70E740481C1C}">
-                <a14:useLocalDpi xmlns:a14="http://schemas.microsoft.com/office/drawing/2010/main" val="0"/>
-              </a:ext>
-            </a:extLst>
-          </a:blip>
-          <a:srcRect/>
-          <a:stretch>
-            <a:fillRect/>
-          </a:stretch>
-        </p:blipFill>
-        <p:spPr bwMode="auto">
-          <a:xfrm>
-            <a:off x="185203" y="3098851"/>
-            <a:ext cx="2757402" cy="1246497"/>
-          </a:xfrm>
-          <a:prstGeom prst="rect">
-            <a:avLst/>
-          </a:prstGeom>
-          <a:noFill/>
-          <a:extLst>
-            <a:ext uri="{909E8E84-426E-40DD-AFC4-6F175D3DCCD1}">
-              <a14:hiddenFill xmlns:a14="http://schemas.microsoft.com/office/drawing/2010/main">
-                <a:solidFill>
-                  <a:srgbClr val="FFFFFF"/>
-                </a:solidFill>
-              </a14:hiddenFill>
-            </a:ext>
-          </a:extLst>
-        </p:spPr>
-      </p:pic>
-      <p:pic>
-        <p:nvPicPr>
-          <p:cNvPr id="1028" name="Picture 4" descr="Image result for mediatonic">
-            <a:extLst>
-              <a:ext uri="{FF2B5EF4-FFF2-40B4-BE49-F238E27FC236}">
-                <a16:creationId xmlns:a16="http://schemas.microsoft.com/office/drawing/2014/main" id="{1C1B393D-253D-4AA8-AC2A-BAD46A46F8CF}"/>
-              </a:ext>
-            </a:extLst>
-          </p:cNvPr>
-          <p:cNvPicPr>
-            <a:picLocks noChangeAspect="1" noChangeArrowheads="1"/>
-          </p:cNvPicPr>
-          <p:nvPr/>
-        </p:nvPicPr>
-        <p:blipFill>
-          <a:blip r:embed="rId4">
-            <a:extLst>
-              <a:ext uri="{28A0092B-C50C-407E-A947-70E740481C1C}">
-                <a14:useLocalDpi xmlns:a14="http://schemas.microsoft.com/office/drawing/2010/main" val="0"/>
-              </a:ext>
-            </a:extLst>
-          </a:blip>
-          <a:srcRect/>
-          <a:stretch>
-            <a:fillRect/>
-          </a:stretch>
-        </p:blipFill>
-        <p:spPr bwMode="auto">
-          <a:xfrm>
-            <a:off x="3522380" y="3037608"/>
-            <a:ext cx="1461655" cy="1461655"/>
-          </a:xfrm>
-          <a:prstGeom prst="rect">
-            <a:avLst/>
-          </a:prstGeom>
-          <a:noFill/>
-          <a:extLst>
-            <a:ext uri="{909E8E84-426E-40DD-AFC4-6F175D3DCCD1}">
-              <a14:hiddenFill xmlns:a14="http://schemas.microsoft.com/office/drawing/2010/main">
-                <a:solidFill>
-                  <a:srgbClr val="FFFFFF"/>
-                </a:solidFill>
-              </a14:hiddenFill>
-            </a:ext>
-          </a:extLst>
-        </p:spPr>
-      </p:pic>
-      <p:sp>
-        <p:nvSpPr>
-          <p:cNvPr id="11" name="TextBox 10">
-            <a:extLst>
-              <a:ext uri="{FF2B5EF4-FFF2-40B4-BE49-F238E27FC236}">
-                <a16:creationId xmlns:a16="http://schemas.microsoft.com/office/drawing/2014/main" id="{242E59A0-24E9-43F8-9F71-74B405A586B8}"/>
-              </a:ext>
-            </a:extLst>
-          </p:cNvPr>
-          <p:cNvSpPr txBox="1"/>
-          <p:nvPr/>
-        </p:nvSpPr>
-        <p:spPr>
-          <a:xfrm>
-            <a:off x="6957285" y="447325"/>
-            <a:ext cx="4863832" cy="3046988"/>
-          </a:xfrm>
-          <a:prstGeom prst="rect">
-            <a:avLst/>
-          </a:prstGeom>
-          <a:noFill/>
-        </p:spPr>
-        <p:txBody>
-          <a:bodyPr wrap="none" rtlCol="0">
-            <a:spAutoFit/>
-          </a:bodyPr>
-          <a:lstStyle/>
-          <a:p>
-            <a:pPr algn="ctr"/>
-            <a:r>
-              <a:rPr lang="en-GB" sz="3200" dirty="0">
-                <a:solidFill>
-                  <a:schemeClr val="bg1"/>
-                </a:solidFill>
-                <a:latin typeface="Century Gothic" panose="020B0502020202020204" pitchFamily="34" charset="0"/>
-              </a:rPr>
-              <a:t>Industry Guests</a:t>
-            </a:r>
-          </a:p>
-          <a:p>
-            <a:pPr algn="ctr"/>
-            <a:r>
-              <a:rPr lang="en-GB" sz="3200" dirty="0">
-                <a:solidFill>
-                  <a:schemeClr val="bg1"/>
-                </a:solidFill>
-                <a:latin typeface="Century Gothic" panose="020B0502020202020204" pitchFamily="34" charset="0"/>
-              </a:rPr>
-              <a:t>Trade-Show Format</a:t>
-            </a:r>
-          </a:p>
-          <a:p>
-            <a:pPr algn="ctr"/>
-            <a:r>
-              <a:rPr lang="en-GB" sz="3200" dirty="0">
-                <a:solidFill>
-                  <a:schemeClr val="bg1"/>
-                </a:solidFill>
-                <a:latin typeface="Century Gothic" panose="020B0502020202020204" pitchFamily="34" charset="0"/>
-              </a:rPr>
-              <a:t>Grad Panel of Alumni</a:t>
-            </a:r>
-          </a:p>
-          <a:p>
-            <a:pPr algn="ctr"/>
-            <a:r>
-              <a:rPr lang="en-GB" sz="3200" dirty="0">
-                <a:solidFill>
-                  <a:schemeClr val="bg1"/>
-                </a:solidFill>
-                <a:latin typeface="Century Gothic" panose="020B0502020202020204" pitchFamily="34" charset="0"/>
-              </a:rPr>
-              <a:t>Tutors/Industry/Students</a:t>
-            </a:r>
-          </a:p>
-          <a:p>
-            <a:pPr algn="ctr"/>
-            <a:r>
-              <a:rPr lang="en-GB" sz="3200" dirty="0">
-                <a:solidFill>
-                  <a:schemeClr val="bg1"/>
-                </a:solidFill>
-                <a:latin typeface="Century Gothic" panose="020B0502020202020204" pitchFamily="34" charset="0"/>
-              </a:rPr>
-              <a:t>Dates : </a:t>
-            </a:r>
-            <a:r>
-              <a:rPr lang="en-GB" sz="3200" b="1" dirty="0">
-                <a:solidFill>
-                  <a:schemeClr val="bg1"/>
-                </a:solidFill>
-                <a:latin typeface="Century Gothic" panose="020B0502020202020204" pitchFamily="34" charset="0"/>
-              </a:rPr>
-              <a:t>4</a:t>
-            </a:r>
-            <a:r>
-              <a:rPr lang="en-GB" sz="3200" b="1" baseline="30000" dirty="0">
-                <a:solidFill>
-                  <a:schemeClr val="bg1"/>
-                </a:solidFill>
-                <a:latin typeface="Century Gothic" panose="020B0502020202020204" pitchFamily="34" charset="0"/>
-              </a:rPr>
-              <a:t>th</a:t>
-            </a:r>
-            <a:r>
-              <a:rPr lang="en-GB" sz="3200" b="1" dirty="0">
-                <a:solidFill>
-                  <a:schemeClr val="bg1"/>
-                </a:solidFill>
-                <a:latin typeface="Century Gothic" panose="020B0502020202020204" pitchFamily="34" charset="0"/>
-              </a:rPr>
-              <a:t> – 7</a:t>
-            </a:r>
-            <a:r>
-              <a:rPr lang="en-GB" sz="3200" b="1" baseline="30000" dirty="0">
-                <a:solidFill>
-                  <a:schemeClr val="bg1"/>
-                </a:solidFill>
-                <a:latin typeface="Century Gothic" panose="020B0502020202020204" pitchFamily="34" charset="0"/>
-              </a:rPr>
-              <a:t>th</a:t>
-            </a:r>
-            <a:r>
-              <a:rPr lang="en-GB" sz="3200" b="1" dirty="0">
-                <a:solidFill>
-                  <a:schemeClr val="bg1"/>
-                </a:solidFill>
-                <a:latin typeface="Century Gothic" panose="020B0502020202020204" pitchFamily="34" charset="0"/>
-              </a:rPr>
-              <a:t> MAY</a:t>
-            </a:r>
-          </a:p>
-          <a:p>
-            <a:pPr algn="ctr"/>
-            <a:r>
-              <a:rPr lang="en-GB" sz="3200" dirty="0">
-                <a:solidFill>
-                  <a:schemeClr val="bg1"/>
-                </a:solidFill>
-                <a:latin typeface="Century Gothic" panose="020B0502020202020204" pitchFamily="34" charset="0"/>
-              </a:rPr>
-              <a:t>Venue : </a:t>
-            </a:r>
-            <a:r>
-              <a:rPr lang="en-GB" sz="3200" b="1" dirty="0">
-                <a:solidFill>
-                  <a:schemeClr val="bg1"/>
-                </a:solidFill>
-                <a:latin typeface="Century Gothic" panose="020B0502020202020204" pitchFamily="34" charset="0"/>
-              </a:rPr>
-              <a:t>Sports Hall </a:t>
-            </a:r>
-          </a:p>
-        </p:txBody>
-      </p:sp>
-    </p:spTree>
-    <p:extLst>
-      <p:ext uri="{BB962C8B-B14F-4D97-AF65-F5344CB8AC3E}">
-        <p14:creationId xmlns:p14="http://schemas.microsoft.com/office/powerpoint/2010/main" val="2054516578"/>
-      </p:ext>
-    </p:extLst>
-  </p:cSld>
-  <p:clrMapOvr>
-    <a:masterClrMapping/>
-  </p:clrMapOvr>
-</p:sld>
-</file>
-
-<file path=ppt/slides/slide11.xml><?xml version="1.0" encoding="utf-8"?>
-<p:sld xmlns:a="http://schemas.openxmlformats.org/drawingml/2006/main" xmlns:r="http://schemas.openxmlformats.org/officeDocument/2006/relationships" xmlns:p="http://schemas.openxmlformats.org/presentationml/2006/main">
-  <p:cSld>
     <p:spTree>
       <p:nvGrpSpPr>
         <p:cNvPr id="1" name=""/>
@@ -21593,7 +18293,7 @@
 </p:sld>
 </file>
 
-<file path=ppt/slides/slide12.xml><?xml version="1.0" encoding="utf-8"?>
+<file path=ppt/slides/slide11.xml><?xml version="1.0" encoding="utf-8"?>
 <p:sld xmlns:a="http://schemas.openxmlformats.org/drawingml/2006/main" xmlns:r="http://schemas.openxmlformats.org/officeDocument/2006/relationships" xmlns:p="http://schemas.openxmlformats.org/presentationml/2006/main">
   <p:cSld>
     <p:bg>
@@ -23061,7 +19761,7 @@
             <p:ph idx="1"/>
             <p:extLst>
               <p:ext uri="{D42A27DB-BD31-4B8C-83A1-F6EECF244321}">
-                <p14:modId xmlns:p14="http://schemas.microsoft.com/office/powerpoint/2010/main" val="4071193731"/>
+                <p14:modId xmlns:p14="http://schemas.microsoft.com/office/powerpoint/2010/main" val="1436424250"/>
               </p:ext>
             </p:extLst>
           </p:nvPr>
@@ -24803,279 +21503,6 @@
 </file>
 
 <file path=ppt/slides/slide7.xml><?xml version="1.0" encoding="utf-8"?>
-<p:sld xmlns:a="http://schemas.openxmlformats.org/drawingml/2006/main" xmlns:r="http://schemas.openxmlformats.org/officeDocument/2006/relationships" xmlns:p="http://schemas.openxmlformats.org/presentationml/2006/main">
-  <p:cSld>
-    <p:bg>
-      <p:bgPr>
-        <a:solidFill>
-          <a:schemeClr val="bg1"/>
-        </a:solidFill>
-        <a:effectLst/>
-      </p:bgPr>
-    </p:bg>
-    <p:spTree>
-      <p:nvGrpSpPr>
-        <p:cNvPr id="1" name=""/>
-        <p:cNvGrpSpPr/>
-        <p:nvPr/>
-      </p:nvGrpSpPr>
-      <p:grpSpPr>
-        <a:xfrm>
-          <a:off x="0" y="0"/>
-          <a:ext cx="0" cy="0"/>
-          <a:chOff x="0" y="0"/>
-          <a:chExt cx="0" cy="0"/>
-        </a:xfrm>
-      </p:grpSpPr>
-      <p:sp>
-        <p:nvSpPr>
-          <p:cNvPr id="21" name="Rectangle 20">
-            <a:extLst>
-              <a:ext uri="{FF2B5EF4-FFF2-40B4-BE49-F238E27FC236}">
-                <a16:creationId xmlns:a16="http://schemas.microsoft.com/office/drawing/2014/main" id="{BE95D989-81FA-4BAD-9AD5-E46CEDA91B36}"/>
-              </a:ext>
-              <a:ext uri="{C183D7F6-B498-43B3-948B-1728B52AA6E4}">
-                <adec:decorative xmlns:adec="http://schemas.microsoft.com/office/drawing/2017/decorative" val="1"/>
-              </a:ext>
-            </a:extLst>
-          </p:cNvPr>
-          <p:cNvSpPr>
-            <a:spLocks noGrp="1" noRot="1" noChangeAspect="1" noMove="1" noResize="1" noEditPoints="1" noAdjustHandles="1" noChangeArrowheads="1" noChangeShapeType="1" noTextEdit="1"/>
-          </p:cNvSpPr>
-          <p:nvPr>
-            <p:extLst>
-              <p:ext uri="{386F3935-93C4-4BCD-93E2-E3B085C9AB24}">
-                <p16:designElem xmlns:p16="http://schemas.microsoft.com/office/powerpoint/2015/main" val="1"/>
-              </p:ext>
-            </p:extLst>
-          </p:nvPr>
-        </p:nvSpPr>
-        <p:spPr>
-          <a:xfrm>
-            <a:off x="1524001" y="0"/>
-            <a:ext cx="3490719" cy="6858000"/>
-          </a:xfrm>
-          <a:prstGeom prst="rect">
-            <a:avLst/>
-          </a:prstGeom>
-          <a:solidFill>
-            <a:srgbClr val="404040"/>
-          </a:solidFill>
-          <a:ln>
-            <a:noFill/>
-          </a:ln>
-        </p:spPr>
-        <p:style>
-          <a:lnRef idx="2">
-            <a:schemeClr val="accent1">
-              <a:shade val="50000"/>
-            </a:schemeClr>
-          </a:lnRef>
-          <a:fillRef idx="1">
-            <a:schemeClr val="accent1"/>
-          </a:fillRef>
-          <a:effectRef idx="0">
-            <a:schemeClr val="accent1"/>
-          </a:effectRef>
-          <a:fontRef idx="minor">
-            <a:schemeClr val="lt1"/>
-          </a:fontRef>
-        </p:style>
-        <p:txBody>
-          <a:bodyPr rtlCol="0" anchor="ctr"/>
-          <a:lstStyle/>
-          <a:p>
-            <a:pPr algn="ctr">
-              <a:defRPr/>
-            </a:pPr>
-            <a:endParaRPr lang="en-US">
-              <a:solidFill>
-                <a:prstClr val="white"/>
-              </a:solidFill>
-              <a:latin typeface="Calibri" panose="020F0502020204030204"/>
-            </a:endParaRPr>
-          </a:p>
-        </p:txBody>
-      </p:sp>
-      <p:sp>
-        <p:nvSpPr>
-          <p:cNvPr id="2" name="Title 1">
-            <a:extLst>
-              <a:ext uri="{FF2B5EF4-FFF2-40B4-BE49-F238E27FC236}">
-                <a16:creationId xmlns:a16="http://schemas.microsoft.com/office/drawing/2014/main" id="{CCE59AFC-DB85-49E7-968F-1E3C7EF31FA2}"/>
-              </a:ext>
-            </a:extLst>
-          </p:cNvPr>
-          <p:cNvSpPr>
-            <a:spLocks noGrp="1"/>
-          </p:cNvSpPr>
-          <p:nvPr>
-            <p:ph type="title"/>
-          </p:nvPr>
-        </p:nvSpPr>
-        <p:spPr>
-          <a:xfrm>
-            <a:off x="2152651" y="811161"/>
-            <a:ext cx="2501695" cy="5403370"/>
-          </a:xfrm>
-        </p:spPr>
-        <p:txBody>
-          <a:bodyPr>
-            <a:normAutofit/>
-          </a:bodyPr>
-          <a:lstStyle/>
-          <a:p>
-            <a:r>
-              <a:rPr lang="en-GB">
-                <a:solidFill>
-                  <a:srgbClr val="FFFFFF"/>
-                </a:solidFill>
-              </a:rPr>
-              <a:t>3</a:t>
-            </a:r>
-            <a:r>
-              <a:rPr lang="en-GB" baseline="30000">
-                <a:solidFill>
-                  <a:srgbClr val="FFFFFF"/>
-                </a:solidFill>
-              </a:rPr>
-              <a:t>rd</a:t>
-            </a:r>
-            <a:r>
-              <a:rPr lang="en-GB">
-                <a:solidFill>
-                  <a:srgbClr val="FFFFFF"/>
-                </a:solidFill>
-              </a:rPr>
-              <a:t> year teams</a:t>
-            </a:r>
-            <a:br>
-              <a:rPr lang="en-GB">
-                <a:solidFill>
-                  <a:srgbClr val="FFFFFF"/>
-                </a:solidFill>
-              </a:rPr>
-            </a:br>
-            <a:endParaRPr lang="en-GB">
-              <a:solidFill>
-                <a:srgbClr val="FFFFFF"/>
-              </a:solidFill>
-            </a:endParaRPr>
-          </a:p>
-        </p:txBody>
-      </p:sp>
-      <p:sp>
-        <p:nvSpPr>
-          <p:cNvPr id="23" name="Rectangle 22">
-            <a:extLst>
-              <a:ext uri="{FF2B5EF4-FFF2-40B4-BE49-F238E27FC236}">
-                <a16:creationId xmlns:a16="http://schemas.microsoft.com/office/drawing/2014/main" id="{156189E5-8A3E-4CFD-B71B-CCD0F8495E56}"/>
-              </a:ext>
-              <a:ext uri="{C183D7F6-B498-43B3-948B-1728B52AA6E4}">
-                <adec:decorative xmlns:adec="http://schemas.microsoft.com/office/drawing/2017/decorative" val="1"/>
-              </a:ext>
-            </a:extLst>
-          </p:cNvPr>
-          <p:cNvSpPr>
-            <a:spLocks noGrp="1" noRot="1" noChangeAspect="1" noMove="1" noResize="1" noEditPoints="1" noAdjustHandles="1" noChangeArrowheads="1" noChangeShapeType="1" noTextEdit="1"/>
-          </p:cNvSpPr>
-          <p:nvPr>
-            <p:extLst>
-              <p:ext uri="{386F3935-93C4-4BCD-93E2-E3B085C9AB24}">
-                <p16:designElem xmlns:p16="http://schemas.microsoft.com/office/powerpoint/2015/main" val="1"/>
-              </p:ext>
-            </p:extLst>
-          </p:nvPr>
-        </p:nvSpPr>
-        <p:spPr>
-          <a:xfrm>
-            <a:off x="5014719" y="0"/>
-            <a:ext cx="106556" cy="6858000"/>
-          </a:xfrm>
-          <a:prstGeom prst="rect">
-            <a:avLst/>
-          </a:prstGeom>
-          <a:solidFill>
-            <a:schemeClr val="tx1">
-              <a:alpha val="20000"/>
-            </a:schemeClr>
-          </a:solidFill>
-          <a:ln>
-            <a:noFill/>
-          </a:ln>
-        </p:spPr>
-        <p:style>
-          <a:lnRef idx="2">
-            <a:schemeClr val="accent1">
-              <a:shade val="50000"/>
-            </a:schemeClr>
-          </a:lnRef>
-          <a:fillRef idx="1">
-            <a:schemeClr val="accent1"/>
-          </a:fillRef>
-          <a:effectRef idx="0">
-            <a:schemeClr val="accent1"/>
-          </a:effectRef>
-          <a:fontRef idx="minor">
-            <a:schemeClr val="lt1"/>
-          </a:fontRef>
-        </p:style>
-        <p:txBody>
-          <a:bodyPr rtlCol="0" anchor="ctr"/>
-          <a:lstStyle/>
-          <a:p>
-            <a:pPr algn="ctr">
-              <a:defRPr/>
-            </a:pPr>
-            <a:endParaRPr lang="en-US">
-              <a:solidFill>
-                <a:prstClr val="white"/>
-              </a:solidFill>
-              <a:latin typeface="Calibri" panose="020F0502020204030204"/>
-            </a:endParaRPr>
-          </a:p>
-        </p:txBody>
-      </p:sp>
-      <p:graphicFrame>
-        <p:nvGraphicFramePr>
-          <p:cNvPr id="16" name="Content Placeholder 2">
-            <a:extLst>
-              <a:ext uri="{FF2B5EF4-FFF2-40B4-BE49-F238E27FC236}">
-                <a16:creationId xmlns:a16="http://schemas.microsoft.com/office/drawing/2014/main" id="{16CFF832-2E59-4B05-8D5B-70F79172B43B}"/>
-              </a:ext>
-            </a:extLst>
-          </p:cNvPr>
-          <p:cNvGraphicFramePr>
-            <a:graphicFrameLocks noGrp="1"/>
-          </p:cNvGraphicFramePr>
-          <p:nvPr>
-            <p:ph idx="1"/>
-          </p:nvPr>
-        </p:nvGraphicFramePr>
-        <p:xfrm>
-          <a:off x="5618559" y="642939"/>
-          <a:ext cx="4567238" cy="5572125"/>
-        </p:xfrm>
-        <a:graphic>
-          <a:graphicData uri="http://schemas.openxmlformats.org/drawingml/2006/diagram">
-            <dgm:relIds xmlns:dgm="http://schemas.openxmlformats.org/drawingml/2006/diagram" xmlns:r="http://schemas.openxmlformats.org/officeDocument/2006/relationships" r:dm="rId2" r:lo="rId3" r:qs="rId4" r:cs="rId5"/>
-          </a:graphicData>
-        </a:graphic>
-      </p:graphicFrame>
-    </p:spTree>
-    <p:extLst>
-      <p:ext uri="{BB962C8B-B14F-4D97-AF65-F5344CB8AC3E}">
-        <p14:creationId xmlns:p14="http://schemas.microsoft.com/office/powerpoint/2010/main" val="955542843"/>
-      </p:ext>
-    </p:extLst>
-  </p:cSld>
-  <p:clrMapOvr>
-    <a:masterClrMapping/>
-  </p:clrMapOvr>
-</p:sld>
-</file>
-
-<file path=ppt/slides/slide8.xml><?xml version="1.0" encoding="utf-8"?>
 <p:sld xmlns:a="http://schemas.openxmlformats.org/drawingml/2006/main" xmlns:r="http://schemas.openxmlformats.org/officeDocument/2006/relationships" xmlns:p="http://schemas.openxmlformats.org/presentationml/2006/main">
   <p:cSld>
     <p:bg>
@@ -25669,7 +22096,7 @@
 </p:sld>
 </file>
 
-<file path=ppt/slides/slide9.xml><?xml version="1.0" encoding="utf-8"?>
+<file path=ppt/slides/slide8.xml><?xml version="1.0" encoding="utf-8"?>
 <p:sld xmlns:a="http://schemas.openxmlformats.org/drawingml/2006/main" xmlns:r="http://schemas.openxmlformats.org/officeDocument/2006/relationships" xmlns:p="http://schemas.openxmlformats.org/presentationml/2006/main">
   <p:cSld>
     <p:bg>
@@ -26234,6 +22661,620 @@
     <p:extLst>
       <p:ext uri="{BB962C8B-B14F-4D97-AF65-F5344CB8AC3E}">
         <p14:creationId xmlns:p14="http://schemas.microsoft.com/office/powerpoint/2010/main" val="1133474713"/>
+      </p:ext>
+    </p:extLst>
+  </p:cSld>
+  <p:clrMapOvr>
+    <a:masterClrMapping/>
+  </p:clrMapOvr>
+</p:sld>
+</file>
+
+<file path=ppt/slides/slide9.xml><?xml version="1.0" encoding="utf-8"?>
+<p:sld xmlns:a="http://schemas.openxmlformats.org/drawingml/2006/main" xmlns:r="http://schemas.openxmlformats.org/officeDocument/2006/relationships" xmlns:p="http://schemas.openxmlformats.org/presentationml/2006/main">
+  <p:cSld>
+    <p:bg>
+      <p:bgPr>
+        <a:solidFill>
+          <a:schemeClr val="tx1"/>
+        </a:solidFill>
+        <a:effectLst/>
+      </p:bgPr>
+    </p:bg>
+    <p:spTree>
+      <p:nvGrpSpPr>
+        <p:cNvPr id="1" name=""/>
+        <p:cNvGrpSpPr/>
+        <p:nvPr/>
+      </p:nvGrpSpPr>
+      <p:grpSpPr>
+        <a:xfrm>
+          <a:off x="0" y="0"/>
+          <a:ext cx="0" cy="0"/>
+          <a:chOff x="0" y="0"/>
+          <a:chExt cx="0" cy="0"/>
+        </a:xfrm>
+      </p:grpSpPr>
+      <p:pic>
+        <p:nvPicPr>
+          <p:cNvPr id="4" name="Content Placeholder 6">
+            <a:extLst>
+              <a:ext uri="{FF2B5EF4-FFF2-40B4-BE49-F238E27FC236}">
+                <a16:creationId xmlns:a16="http://schemas.microsoft.com/office/drawing/2014/main" id="{0A2AF877-4FBE-419B-94C2-DB8CA7105689}"/>
+              </a:ext>
+            </a:extLst>
+          </p:cNvPr>
+          <p:cNvPicPr>
+            <a:picLocks noChangeAspect="1"/>
+          </p:cNvPicPr>
+          <p:nvPr/>
+        </p:nvPicPr>
+        <p:blipFill rotWithShape="1">
+          <a:blip r:embed="rId2">
+            <a:extLst>
+              <a:ext uri="{28A0092B-C50C-407E-A947-70E740481C1C}">
+                <a14:useLocalDpi xmlns:a14="http://schemas.microsoft.com/office/drawing/2010/main" val="0"/>
+              </a:ext>
+            </a:extLst>
+          </a:blip>
+          <a:srcRect l="-4101" t="-4858" r="4101" b="4858"/>
+          <a:stretch/>
+        </p:blipFill>
+        <p:spPr>
+          <a:xfrm>
+            <a:off x="4205531" y="2408566"/>
+            <a:ext cx="7229087" cy="4068249"/>
+          </a:xfrm>
+          <a:prstGeom prst="rect">
+            <a:avLst/>
+          </a:prstGeom>
+        </p:spPr>
+      </p:pic>
+      <p:sp>
+        <p:nvSpPr>
+          <p:cNvPr id="5" name="Rectangle 4">
+            <a:extLst>
+              <a:ext uri="{FF2B5EF4-FFF2-40B4-BE49-F238E27FC236}">
+                <a16:creationId xmlns:a16="http://schemas.microsoft.com/office/drawing/2014/main" id="{E0AC499E-0CF9-4CC2-B705-0DA68E68EDDB}"/>
+              </a:ext>
+            </a:extLst>
+          </p:cNvPr>
+          <p:cNvSpPr/>
+          <p:nvPr/>
+        </p:nvSpPr>
+        <p:spPr>
+          <a:xfrm>
+            <a:off x="8054109" y="3768436"/>
+            <a:ext cx="1911927" cy="461818"/>
+          </a:xfrm>
+          <a:prstGeom prst="rect">
+            <a:avLst/>
+          </a:prstGeom>
+          <a:solidFill>
+            <a:schemeClr val="tx1"/>
+          </a:solidFill>
+          <a:ln>
+            <a:noFill/>
+          </a:ln>
+        </p:spPr>
+        <p:style>
+          <a:lnRef idx="2">
+            <a:schemeClr val="accent1">
+              <a:shade val="50000"/>
+            </a:schemeClr>
+          </a:lnRef>
+          <a:fillRef idx="1">
+            <a:schemeClr val="accent1"/>
+          </a:fillRef>
+          <a:effectRef idx="0">
+            <a:schemeClr val="accent1"/>
+          </a:effectRef>
+          <a:fontRef idx="minor">
+            <a:schemeClr val="lt1"/>
+          </a:fontRef>
+        </p:style>
+        <p:txBody>
+          <a:bodyPr rtlCol="0" anchor="ctr"/>
+          <a:lstStyle/>
+          <a:p>
+            <a:pPr algn="ctr"/>
+            <a:endParaRPr lang="en-GB"/>
+          </a:p>
+        </p:txBody>
+      </p:sp>
+      <p:sp>
+        <p:nvSpPr>
+          <p:cNvPr id="6" name="TextBox 5">
+            <a:extLst>
+              <a:ext uri="{FF2B5EF4-FFF2-40B4-BE49-F238E27FC236}">
+                <a16:creationId xmlns:a16="http://schemas.microsoft.com/office/drawing/2014/main" id="{AEC2F31B-B051-4F71-8428-F4660DC80A38}"/>
+              </a:ext>
+            </a:extLst>
+          </p:cNvPr>
+          <p:cNvSpPr txBox="1"/>
+          <p:nvPr/>
+        </p:nvSpPr>
+        <p:spPr>
+          <a:xfrm rot="19445185">
+            <a:off x="10060239" y="5310419"/>
+            <a:ext cx="2142836" cy="1015663"/>
+          </a:xfrm>
+          <a:prstGeom prst="rect">
+            <a:avLst/>
+          </a:prstGeom>
+          <a:noFill/>
+        </p:spPr>
+        <p:txBody>
+          <a:bodyPr wrap="square" rtlCol="0">
+            <a:spAutoFit/>
+          </a:bodyPr>
+          <a:lstStyle/>
+          <a:p>
+            <a:r>
+              <a:rPr lang="en-GB" sz="6000" dirty="0">
+                <a:solidFill>
+                  <a:schemeClr val="bg1"/>
+                </a:solidFill>
+                <a:latin typeface="Stencil" panose="040409050D0802020404" pitchFamily="82" charset="0"/>
+                <a:cs typeface="Aharoni" panose="020B0604020202020204" pitchFamily="2" charset="-79"/>
+              </a:rPr>
+              <a:t>EXPO</a:t>
+            </a:r>
+          </a:p>
+        </p:txBody>
+      </p:sp>
+      <p:sp>
+        <p:nvSpPr>
+          <p:cNvPr id="8" name="TextBox 7">
+            <a:extLst>
+              <a:ext uri="{FF2B5EF4-FFF2-40B4-BE49-F238E27FC236}">
+                <a16:creationId xmlns:a16="http://schemas.microsoft.com/office/drawing/2014/main" id="{C52CB9F7-4FB3-4142-B3B4-22BA9042E184}"/>
+              </a:ext>
+            </a:extLst>
+          </p:cNvPr>
+          <p:cNvSpPr txBox="1"/>
+          <p:nvPr/>
+        </p:nvSpPr>
+        <p:spPr>
+          <a:xfrm>
+            <a:off x="370883" y="774427"/>
+            <a:ext cx="5299737" cy="4693593"/>
+          </a:xfrm>
+          <a:prstGeom prst="rect">
+            <a:avLst/>
+          </a:prstGeom>
+          <a:noFill/>
+        </p:spPr>
+        <p:txBody>
+          <a:bodyPr wrap="square" rtlCol="0">
+            <a:spAutoFit/>
+          </a:bodyPr>
+          <a:lstStyle/>
+          <a:p>
+            <a:pPr algn="ctr"/>
+            <a:r>
+              <a:rPr lang="en-GB" sz="2500" dirty="0">
+                <a:solidFill>
+                  <a:schemeClr val="bg1"/>
+                </a:solidFill>
+                <a:latin typeface="Century Gothic" panose="020B0502020202020204" pitchFamily="34" charset="0"/>
+              </a:rPr>
+              <a:t>Supermassive Trophy for best third year game. </a:t>
+            </a:r>
+          </a:p>
+          <a:p>
+            <a:pPr algn="ctr"/>
+            <a:r>
+              <a:rPr lang="en-GB" sz="2500" dirty="0">
+                <a:solidFill>
+                  <a:schemeClr val="bg1"/>
+                </a:solidFill>
+                <a:latin typeface="Century Gothic" panose="020B0502020202020204" pitchFamily="34" charset="0"/>
+              </a:rPr>
+              <a:t>More to be announced!  </a:t>
+            </a:r>
+          </a:p>
+          <a:p>
+            <a:pPr algn="ctr"/>
+            <a:endParaRPr lang="en-GB" sz="3200" b="1" dirty="0">
+              <a:solidFill>
+                <a:schemeClr val="bg1"/>
+              </a:solidFill>
+              <a:latin typeface="Century Gothic" panose="020B0502020202020204" pitchFamily="34" charset="0"/>
+            </a:endParaRPr>
+          </a:p>
+          <a:p>
+            <a:pPr algn="ctr"/>
+            <a:endParaRPr lang="en-GB" sz="3200" b="1" dirty="0">
+              <a:solidFill>
+                <a:schemeClr val="bg1"/>
+              </a:solidFill>
+              <a:latin typeface="Century Gothic" panose="020B0502020202020204" pitchFamily="34" charset="0"/>
+            </a:endParaRPr>
+          </a:p>
+          <a:p>
+            <a:pPr algn="ctr"/>
+            <a:endParaRPr lang="en-GB" sz="3200" b="1" dirty="0">
+              <a:solidFill>
+                <a:schemeClr val="bg1"/>
+              </a:solidFill>
+              <a:latin typeface="Century Gothic" panose="020B0502020202020204" pitchFamily="34" charset="0"/>
+            </a:endParaRPr>
+          </a:p>
+          <a:p>
+            <a:pPr algn="ctr"/>
+            <a:endParaRPr lang="en-GB" sz="3200" b="1" dirty="0">
+              <a:solidFill>
+                <a:schemeClr val="bg1"/>
+              </a:solidFill>
+              <a:latin typeface="Century Gothic" panose="020B0502020202020204" pitchFamily="34" charset="0"/>
+            </a:endParaRPr>
+          </a:p>
+          <a:p>
+            <a:pPr algn="ctr"/>
+            <a:endParaRPr lang="en-GB" sz="3200" b="1" dirty="0">
+              <a:solidFill>
+                <a:schemeClr val="bg1"/>
+              </a:solidFill>
+              <a:latin typeface="Century Gothic" panose="020B0502020202020204" pitchFamily="34" charset="0"/>
+            </a:endParaRPr>
+          </a:p>
+          <a:p>
+            <a:pPr algn="ctr"/>
+            <a:endParaRPr lang="en-GB" sz="3200" b="1" dirty="0">
+              <a:solidFill>
+                <a:schemeClr val="bg1"/>
+              </a:solidFill>
+              <a:latin typeface="Century Gothic" panose="020B0502020202020204" pitchFamily="34" charset="0"/>
+            </a:endParaRPr>
+          </a:p>
+          <a:p>
+            <a:pPr algn="ctr"/>
+            <a:r>
+              <a:rPr lang="en-GB" sz="2500" dirty="0">
+                <a:solidFill>
+                  <a:schemeClr val="bg1"/>
+                </a:solidFill>
+                <a:latin typeface="Century Gothic" panose="020B0502020202020204" pitchFamily="34" charset="0"/>
+              </a:rPr>
+              <a:t>More to be announced!  </a:t>
+            </a:r>
+          </a:p>
+        </p:txBody>
+      </p:sp>
+      <p:sp>
+        <p:nvSpPr>
+          <p:cNvPr id="9" name="TextBox 8">
+            <a:extLst>
+              <a:ext uri="{FF2B5EF4-FFF2-40B4-BE49-F238E27FC236}">
+                <a16:creationId xmlns:a16="http://schemas.microsoft.com/office/drawing/2014/main" id="{2AFE0E8F-2269-444B-A619-E192DA9E3EBF}"/>
+              </a:ext>
+            </a:extLst>
+          </p:cNvPr>
+          <p:cNvSpPr txBox="1"/>
+          <p:nvPr/>
+        </p:nvSpPr>
+        <p:spPr>
+          <a:xfrm>
+            <a:off x="1803912" y="189652"/>
+            <a:ext cx="2367956" cy="584775"/>
+          </a:xfrm>
+          <a:prstGeom prst="rect">
+            <a:avLst/>
+          </a:prstGeom>
+          <a:noFill/>
+        </p:spPr>
+        <p:txBody>
+          <a:bodyPr wrap="none" rtlCol="0">
+            <a:spAutoFit/>
+          </a:bodyPr>
+          <a:lstStyle/>
+          <a:p>
+            <a:r>
+              <a:rPr lang="en-GB" sz="3200" b="1" dirty="0">
+                <a:solidFill>
+                  <a:schemeClr val="bg1"/>
+                </a:solidFill>
+                <a:latin typeface="Century Gothic" panose="020B0502020202020204" pitchFamily="34" charset="0"/>
+              </a:rPr>
+              <a:t>Expo Prizes</a:t>
+            </a:r>
+          </a:p>
+        </p:txBody>
+      </p:sp>
+      <p:sp>
+        <p:nvSpPr>
+          <p:cNvPr id="10" name="TextBox 9">
+            <a:extLst>
+              <a:ext uri="{FF2B5EF4-FFF2-40B4-BE49-F238E27FC236}">
+                <a16:creationId xmlns:a16="http://schemas.microsoft.com/office/drawing/2014/main" id="{0D1685BB-16AC-466B-AB10-3F2098625EB6}"/>
+              </a:ext>
+            </a:extLst>
+          </p:cNvPr>
+          <p:cNvSpPr txBox="1"/>
+          <p:nvPr/>
+        </p:nvSpPr>
+        <p:spPr>
+          <a:xfrm>
+            <a:off x="1679679" y="2220977"/>
+            <a:ext cx="2616422" cy="584775"/>
+          </a:xfrm>
+          <a:prstGeom prst="rect">
+            <a:avLst/>
+          </a:prstGeom>
+          <a:noFill/>
+        </p:spPr>
+        <p:txBody>
+          <a:bodyPr wrap="none" rtlCol="0">
+            <a:spAutoFit/>
+          </a:bodyPr>
+          <a:lstStyle/>
+          <a:p>
+            <a:r>
+              <a:rPr lang="en-GB" sz="3200" b="1" dirty="0">
+                <a:solidFill>
+                  <a:schemeClr val="bg1"/>
+                </a:solidFill>
+                <a:latin typeface="Century Gothic" panose="020B0502020202020204" pitchFamily="34" charset="0"/>
+              </a:rPr>
+              <a:t>Expo Guests</a:t>
+            </a:r>
+          </a:p>
+        </p:txBody>
+      </p:sp>
+      <p:pic>
+        <p:nvPicPr>
+          <p:cNvPr id="1026" name="Picture 2" descr="Image result for supermassive games">
+            <a:extLst>
+              <a:ext uri="{FF2B5EF4-FFF2-40B4-BE49-F238E27FC236}">
+                <a16:creationId xmlns:a16="http://schemas.microsoft.com/office/drawing/2014/main" id="{12B1824B-07E4-41C8-BBC5-2D875AF34E82}"/>
+              </a:ext>
+            </a:extLst>
+          </p:cNvPr>
+          <p:cNvPicPr>
+            <a:picLocks noChangeAspect="1" noChangeArrowheads="1"/>
+          </p:cNvPicPr>
+          <p:nvPr/>
+        </p:nvPicPr>
+        <p:blipFill>
+          <a:blip r:embed="rId3">
+            <a:extLst>
+              <a:ext uri="{28A0092B-C50C-407E-A947-70E740481C1C}">
+                <a14:useLocalDpi xmlns:a14="http://schemas.microsoft.com/office/drawing/2010/main" val="0"/>
+              </a:ext>
+            </a:extLst>
+          </a:blip>
+          <a:srcRect/>
+          <a:stretch>
+            <a:fillRect/>
+          </a:stretch>
+        </p:blipFill>
+        <p:spPr bwMode="auto">
+          <a:xfrm>
+            <a:off x="185203" y="3098851"/>
+            <a:ext cx="2757402" cy="1246497"/>
+          </a:xfrm>
+          <a:prstGeom prst="rect">
+            <a:avLst/>
+          </a:prstGeom>
+          <a:noFill/>
+          <a:extLst>
+            <a:ext uri="{909E8E84-426E-40DD-AFC4-6F175D3DCCD1}">
+              <a14:hiddenFill xmlns:a14="http://schemas.microsoft.com/office/drawing/2010/main">
+                <a:solidFill>
+                  <a:srgbClr val="FFFFFF"/>
+                </a:solidFill>
+              </a14:hiddenFill>
+            </a:ext>
+          </a:extLst>
+        </p:spPr>
+      </p:pic>
+      <p:pic>
+        <p:nvPicPr>
+          <p:cNvPr id="1028" name="Picture 4" descr="Image result for mediatonic">
+            <a:extLst>
+              <a:ext uri="{FF2B5EF4-FFF2-40B4-BE49-F238E27FC236}">
+                <a16:creationId xmlns:a16="http://schemas.microsoft.com/office/drawing/2014/main" id="{1C1B393D-253D-4AA8-AC2A-BAD46A46F8CF}"/>
+              </a:ext>
+            </a:extLst>
+          </p:cNvPr>
+          <p:cNvPicPr>
+            <a:picLocks noChangeAspect="1" noChangeArrowheads="1"/>
+          </p:cNvPicPr>
+          <p:nvPr/>
+        </p:nvPicPr>
+        <p:blipFill>
+          <a:blip r:embed="rId4">
+            <a:extLst>
+              <a:ext uri="{28A0092B-C50C-407E-A947-70E740481C1C}">
+                <a14:useLocalDpi xmlns:a14="http://schemas.microsoft.com/office/drawing/2010/main" val="0"/>
+              </a:ext>
+            </a:extLst>
+          </a:blip>
+          <a:srcRect/>
+          <a:stretch>
+            <a:fillRect/>
+          </a:stretch>
+        </p:blipFill>
+        <p:spPr bwMode="auto">
+          <a:xfrm>
+            <a:off x="3522380" y="3037608"/>
+            <a:ext cx="1461655" cy="1461655"/>
+          </a:xfrm>
+          <a:prstGeom prst="rect">
+            <a:avLst/>
+          </a:prstGeom>
+          <a:noFill/>
+          <a:extLst>
+            <a:ext uri="{909E8E84-426E-40DD-AFC4-6F175D3DCCD1}">
+              <a14:hiddenFill xmlns:a14="http://schemas.microsoft.com/office/drawing/2010/main">
+                <a:solidFill>
+                  <a:srgbClr val="FFFFFF"/>
+                </a:solidFill>
+              </a14:hiddenFill>
+            </a:ext>
+          </a:extLst>
+        </p:spPr>
+      </p:pic>
+      <p:sp>
+        <p:nvSpPr>
+          <p:cNvPr id="11" name="TextBox 10">
+            <a:extLst>
+              <a:ext uri="{FF2B5EF4-FFF2-40B4-BE49-F238E27FC236}">
+                <a16:creationId xmlns:a16="http://schemas.microsoft.com/office/drawing/2014/main" id="{242E59A0-24E9-43F8-9F71-74B405A586B8}"/>
+              </a:ext>
+            </a:extLst>
+          </p:cNvPr>
+          <p:cNvSpPr txBox="1"/>
+          <p:nvPr/>
+        </p:nvSpPr>
+        <p:spPr>
+          <a:xfrm>
+            <a:off x="6957285" y="447325"/>
+            <a:ext cx="4863832" cy="3046988"/>
+          </a:xfrm>
+          <a:prstGeom prst="rect">
+            <a:avLst/>
+          </a:prstGeom>
+          <a:noFill/>
+        </p:spPr>
+        <p:txBody>
+          <a:bodyPr wrap="none" rtlCol="0">
+            <a:spAutoFit/>
+          </a:bodyPr>
+          <a:lstStyle/>
+          <a:p>
+            <a:pPr algn="ctr"/>
+            <a:r>
+              <a:rPr lang="en-GB" sz="3200" dirty="0">
+                <a:solidFill>
+                  <a:schemeClr val="bg1"/>
+                </a:solidFill>
+                <a:latin typeface="Century Gothic" panose="020B0502020202020204" pitchFamily="34" charset="0"/>
+              </a:rPr>
+              <a:t>Industry Guests</a:t>
+            </a:r>
+          </a:p>
+          <a:p>
+            <a:pPr algn="ctr"/>
+            <a:r>
+              <a:rPr lang="en-GB" sz="3200" dirty="0">
+                <a:solidFill>
+                  <a:schemeClr val="bg1"/>
+                </a:solidFill>
+                <a:latin typeface="Century Gothic" panose="020B0502020202020204" pitchFamily="34" charset="0"/>
+              </a:rPr>
+              <a:t>Trade-Show Format</a:t>
+            </a:r>
+          </a:p>
+          <a:p>
+            <a:pPr algn="ctr"/>
+            <a:r>
+              <a:rPr lang="en-GB" sz="3200" dirty="0">
+                <a:solidFill>
+                  <a:schemeClr val="bg1"/>
+                </a:solidFill>
+                <a:latin typeface="Century Gothic" panose="020B0502020202020204" pitchFamily="34" charset="0"/>
+              </a:rPr>
+              <a:t>Grad Panel of Alumni</a:t>
+            </a:r>
+          </a:p>
+          <a:p>
+            <a:pPr algn="ctr"/>
+            <a:r>
+              <a:rPr lang="en-GB" sz="3200" dirty="0">
+                <a:solidFill>
+                  <a:schemeClr val="bg1"/>
+                </a:solidFill>
+                <a:latin typeface="Century Gothic" panose="020B0502020202020204" pitchFamily="34" charset="0"/>
+              </a:rPr>
+              <a:t>Tutors/Industry/Students</a:t>
+            </a:r>
+          </a:p>
+          <a:p>
+            <a:pPr algn="ctr"/>
+            <a:r>
+              <a:rPr lang="en-GB" sz="3200" dirty="0">
+                <a:solidFill>
+                  <a:schemeClr val="bg1"/>
+                </a:solidFill>
+                <a:latin typeface="Century Gothic" panose="020B0502020202020204" pitchFamily="34" charset="0"/>
+              </a:rPr>
+              <a:t>Dates : </a:t>
+            </a:r>
+            <a:r>
+              <a:rPr lang="en-GB" sz="3200" b="1" dirty="0">
+                <a:solidFill>
+                  <a:schemeClr val="bg1"/>
+                </a:solidFill>
+                <a:latin typeface="Century Gothic" panose="020B0502020202020204" pitchFamily="34" charset="0"/>
+              </a:rPr>
+              <a:t>4</a:t>
+            </a:r>
+            <a:r>
+              <a:rPr lang="en-GB" sz="3200" b="1" baseline="30000" dirty="0">
+                <a:solidFill>
+                  <a:schemeClr val="bg1"/>
+                </a:solidFill>
+                <a:latin typeface="Century Gothic" panose="020B0502020202020204" pitchFamily="34" charset="0"/>
+              </a:rPr>
+              <a:t>th</a:t>
+            </a:r>
+            <a:r>
+              <a:rPr lang="en-GB" sz="3200" b="1" dirty="0">
+                <a:solidFill>
+                  <a:schemeClr val="bg1"/>
+                </a:solidFill>
+                <a:latin typeface="Century Gothic" panose="020B0502020202020204" pitchFamily="34" charset="0"/>
+              </a:rPr>
+              <a:t> – 7</a:t>
+            </a:r>
+            <a:r>
+              <a:rPr lang="en-GB" sz="3200" b="1" baseline="30000" dirty="0">
+                <a:solidFill>
+                  <a:schemeClr val="bg1"/>
+                </a:solidFill>
+                <a:latin typeface="Century Gothic" panose="020B0502020202020204" pitchFamily="34" charset="0"/>
+              </a:rPr>
+              <a:t>th</a:t>
+            </a:r>
+            <a:r>
+              <a:rPr lang="en-GB" sz="3200" b="1" dirty="0">
+                <a:solidFill>
+                  <a:schemeClr val="bg1"/>
+                </a:solidFill>
+                <a:latin typeface="Century Gothic" panose="020B0502020202020204" pitchFamily="34" charset="0"/>
+              </a:rPr>
+              <a:t> MAY</a:t>
+            </a:r>
+          </a:p>
+          <a:p>
+            <a:pPr algn="ctr"/>
+            <a:r>
+              <a:rPr lang="en-GB" sz="3200" dirty="0">
+                <a:solidFill>
+                  <a:schemeClr val="bg1"/>
+                </a:solidFill>
+                <a:latin typeface="Century Gothic" panose="020B0502020202020204" pitchFamily="34" charset="0"/>
+              </a:rPr>
+              <a:t>Venue : </a:t>
+            </a:r>
+            <a:r>
+              <a:rPr lang="en-GB" sz="3200" b="1" dirty="0">
+                <a:solidFill>
+                  <a:schemeClr val="bg1"/>
+                </a:solidFill>
+                <a:latin typeface="Century Gothic" panose="020B0502020202020204" pitchFamily="34" charset="0"/>
+              </a:rPr>
+              <a:t>Sports Hall </a:t>
+            </a:r>
+          </a:p>
+        </p:txBody>
+      </p:sp>
+    </p:spTree>
+    <p:extLst>
+      <p:ext uri="{BB962C8B-B14F-4D97-AF65-F5344CB8AC3E}">
+        <p14:creationId xmlns:p14="http://schemas.microsoft.com/office/powerpoint/2010/main" val="2054516578"/>
       </p:ext>
     </p:extLst>
   </p:cSld>
@@ -26800,18 +23841,18 @@
 </file>
 
 <file path=customXml/item1.xml><?xml version="1.0" encoding="utf-8"?>
+<p:properties xmlns:p="http://schemas.microsoft.com/office/2006/metadata/properties" xmlns:xsi="http://www.w3.org/2001/XMLSchema-instance" xmlns:pc="http://schemas.microsoft.com/office/infopath/2007/PartnerControls">
+  <documentManagement/>
+</p:properties>
+</file>
+
+<file path=customXml/item2.xml><?xml version="1.0" encoding="utf-8"?>
 <?mso-contentType ?>
 <FormTemplates xmlns="http://schemas.microsoft.com/sharepoint/v3/contenttype/forms">
   <Display>DocumentLibraryForm</Display>
   <Edit>DocumentLibraryForm</Edit>
   <New>DocumentLibraryForm</New>
 </FormTemplates>
-</file>
-
-<file path=customXml/item2.xml><?xml version="1.0" encoding="utf-8"?>
-<p:properties xmlns:p="http://schemas.microsoft.com/office/2006/metadata/properties" xmlns:xsi="http://www.w3.org/2001/XMLSchema-instance" xmlns:pc="http://schemas.microsoft.com/office/infopath/2007/PartnerControls">
-  <documentManagement/>
-</p:properties>
 </file>
 
 <file path=customXml/item3.xml><?xml version="1.0" encoding="utf-8"?>
@@ -26986,18 +24027,18 @@
 </file>
 
 <file path=customXml/itemProps1.xml><?xml version="1.0" encoding="utf-8"?>
-<ds:datastoreItem xmlns:ds="http://schemas.openxmlformats.org/officeDocument/2006/customXml" ds:itemID="{F2411C3A-2AAC-46A3-9ECA-D3BC493A15E6}">
+<ds:datastoreItem xmlns:ds="http://schemas.openxmlformats.org/officeDocument/2006/customXml" ds:itemID="{AD02F048-50DE-4879-9E6F-91B97EB154DE}">
   <ds:schemaRefs>
-    <ds:schemaRef ds:uri="http://schemas.microsoft.com/sharepoint/v3/contenttype/forms"/>
+    <ds:schemaRef ds:uri="http://schemas.microsoft.com/office/2006/metadata/properties"/>
+    <ds:schemaRef ds:uri="http://schemas.microsoft.com/office/infopath/2007/PartnerControls"/>
   </ds:schemaRefs>
 </ds:datastoreItem>
 </file>
 
 <file path=customXml/itemProps2.xml><?xml version="1.0" encoding="utf-8"?>
-<ds:datastoreItem xmlns:ds="http://schemas.openxmlformats.org/officeDocument/2006/customXml" ds:itemID="{AD02F048-50DE-4879-9E6F-91B97EB154DE}">
+<ds:datastoreItem xmlns:ds="http://schemas.openxmlformats.org/officeDocument/2006/customXml" ds:itemID="{F2411C3A-2AAC-46A3-9ECA-D3BC493A15E6}">
   <ds:schemaRefs>
-    <ds:schemaRef ds:uri="http://schemas.microsoft.com/office/2006/metadata/properties"/>
-    <ds:schemaRef ds:uri="http://schemas.microsoft.com/office/infopath/2007/PartnerControls"/>
+    <ds:schemaRef ds:uri="http://schemas.microsoft.com/sharepoint/v3/contenttype/forms"/>
   </ds:schemaRefs>
 </ds:datastoreItem>
 </file>

</xml_diff>